<commit_message>
First blood of your DP revision. Keep Going ...
</commit_message>
<xml_diff>
--- a/Dynamic_Programming/Dynamic Programming.pptx
+++ b/Dynamic_Programming/Dynamic Programming.pptx
@@ -6,6 +6,8 @@
   </p:sldMasterIdLst>
   <p:sldIdLst>
     <p:sldId id="257" r:id="rId2"/>
+    <p:sldId id="258" r:id="rId3"/>
+    <p:sldId id="259" r:id="rId4"/>
   </p:sldIdLst>
   <p:sldSz cx="12192000" cy="6858000"/>
   <p:notesSz cx="6858000" cy="9144000"/>
@@ -110,6 +112,8 @@
         <p14:section name="Default Section" id="{CBCF7014-AC49-4B94-9F77-B6EBEF64067C}">
           <p14:sldIdLst>
             <p14:sldId id="257"/>
+            <p14:sldId id="258"/>
+            <p14:sldId id="259"/>
           </p14:sldIdLst>
         </p14:section>
       </p14:sectionLst>
@@ -3406,18 +3410,14 @@
           <a:p>
             <a:pPr algn="ctr"/>
             <a:r>
-              <a:rPr lang="en-IN" b="1" dirty="0">
+              <a:rPr lang="en-US" b="1" dirty="0">
                 <a:latin typeface="Nunito Sans" pitchFamily="2" charset="0"/>
               </a:rPr>
-              <a:t>Level 01 - Dynamic Programming</a:t>
-            </a:r>
-            <a:r>
-              <a:rPr lang="en-IN" b="1" i="0" dirty="0">
-                <a:effectLst/>
-                <a:latin typeface="Nunito Sans" pitchFamily="2" charset="0"/>
-              </a:rPr>
-              <a:t> – Fundamentals </a:t>
-            </a:r>
+              <a:t>Dynamic Programming - Characteristics</a:t>
+            </a:r>
+            <a:endParaRPr lang="en-IN" b="1" dirty="0">
+              <a:latin typeface="Nunito Sans" pitchFamily="2" charset="0"/>
+            </a:endParaRPr>
           </a:p>
           <a:p>
             <a:pPr algn="ctr"/>
@@ -3441,8 +3441,8 @@
         </p:nvSpPr>
         <p:spPr>
           <a:xfrm>
-            <a:off x="447675" y="865841"/>
-            <a:ext cx="10906125" cy="5126318"/>
+            <a:off x="222191" y="865841"/>
+            <a:ext cx="5873809" cy="5339650"/>
           </a:xfrm>
           <a:prstGeom prst="rect">
             <a:avLst/>
@@ -3621,6 +3621,35 @@
               <a:buNone/>
             </a:pPr>
             <a:r>
+              <a:rPr lang="en-US" sz="1000" dirty="0">
+                <a:solidFill>
+                  <a:srgbClr val="3D3D4E"/>
+                </a:solidFill>
+                <a:highlight>
+                  <a:srgbClr val="FFFF00"/>
+                </a:highlight>
+                <a:latin typeface="Century Gothic" panose="020B0502020202020204" pitchFamily="34" charset="0"/>
+              </a:rPr>
+              <a:t>In this category, I want to invest little more time because , in my complete coding interview experience, I feel that most of the time people are went blank, especially senior people who are not practicing code that often.</a:t>
+            </a:r>
+          </a:p>
+          <a:p>
+            <a:pPr marL="0" indent="0" algn="l">
+              <a:buNone/>
+            </a:pPr>
+            <a:endParaRPr lang="en-IN" sz="1000" b="1" i="0" dirty="0">
+              <a:solidFill>
+                <a:srgbClr val="000000"/>
+              </a:solidFill>
+              <a:effectLst/>
+              <a:latin typeface="Century Gothic" panose="020B0502020202020204" pitchFamily="34" charset="0"/>
+            </a:endParaRPr>
+          </a:p>
+          <a:p>
+            <a:pPr marL="0" indent="0" algn="l">
+              <a:buNone/>
+            </a:pPr>
+            <a:r>
               <a:rPr lang="en-IN" sz="1000" b="1" i="0" dirty="0">
                 <a:solidFill>
                   <a:srgbClr val="000000"/>
@@ -3628,7 +3657,7 @@
                 <a:effectLst/>
                 <a:latin typeface="Century Gothic" panose="020B0502020202020204" pitchFamily="34" charset="0"/>
               </a:rPr>
-              <a:t>What is DP?</a:t>
+              <a:t>What is Dynamic Programming?</a:t>
             </a:r>
           </a:p>
           <a:p>
@@ -3637,15 +3666,298 @@
               <a:buNone/>
             </a:pPr>
             <a:r>
-              <a:rPr lang="en-US" sz="1000" b="1" dirty="0">
+              <a:rPr lang="en-US" sz="1000" i="0" dirty="0">
                 <a:solidFill>
                   <a:srgbClr val="3D3D4E"/>
                 </a:solidFill>
+                <a:effectLst/>
                 <a:latin typeface="Century Gothic" panose="020B0502020202020204" pitchFamily="34" charset="0"/>
               </a:rPr>
-              <a:t>TBD</a:t>
-            </a:r>
-            <a:endParaRPr lang="en-US" sz="1000" b="1" i="0" dirty="0">
+              <a:t>This is one of the favorite topic of coding interview.</a:t>
+            </a:r>
+          </a:p>
+          <a:p>
+            <a:pPr marL="0" indent="0">
+              <a:buFont typeface="Arial" panose="020B0604020202020204" pitchFamily="34" charset="0"/>
+              <a:buNone/>
+            </a:pPr>
+            <a:r>
+              <a:rPr lang="en-US" sz="1000" b="0" i="0" dirty="0">
+                <a:solidFill>
+                  <a:srgbClr val="3D3D4E"/>
+                </a:solidFill>
+                <a:effectLst/>
+                <a:latin typeface="Century Gothic" panose="020B0502020202020204" pitchFamily="34" charset="0"/>
+              </a:rPr>
+              <a:t>Dynamic Programming </a:t>
+            </a:r>
+            <a:r>
+              <a:rPr lang="en-US" sz="1000" b="1" i="0" dirty="0">
+                <a:solidFill>
+                  <a:srgbClr val="3D3D4E"/>
+                </a:solidFill>
+                <a:effectLst/>
+                <a:latin typeface="Century Gothic" panose="020B0502020202020204" pitchFamily="34" charset="0"/>
+              </a:rPr>
+              <a:t>(DP) is an algorithmic technique for solving an optimization problem </a:t>
+            </a:r>
+            <a:r>
+              <a:rPr lang="en-US" sz="1000" b="0" i="0" dirty="0">
+                <a:solidFill>
+                  <a:srgbClr val="3D3D4E"/>
+                </a:solidFill>
+                <a:effectLst/>
+                <a:latin typeface="Century Gothic" panose="020B0502020202020204" pitchFamily="34" charset="0"/>
+              </a:rPr>
+              <a:t>by breaking it down into simpler subproblems and utilizing the fact that the optimal solution to the overall problem depends upon the optimal solution to its subproblems.</a:t>
+            </a:r>
+          </a:p>
+          <a:p>
+            <a:pPr marL="0" indent="0">
+              <a:buFont typeface="Arial" panose="020B0604020202020204" pitchFamily="34" charset="0"/>
+              <a:buNone/>
+            </a:pPr>
+            <a:endParaRPr lang="en-US" sz="1000" dirty="0">
+              <a:solidFill>
+                <a:srgbClr val="3D3D4E"/>
+              </a:solidFill>
+              <a:latin typeface="Century Gothic" panose="020B0502020202020204" pitchFamily="34" charset="0"/>
+            </a:endParaRPr>
+          </a:p>
+          <a:p>
+            <a:pPr marL="0" indent="0">
+              <a:spcBef>
+                <a:spcPts val="0"/>
+              </a:spcBef>
+              <a:buFont typeface="Arial" panose="020B0604020202020204" pitchFamily="34" charset="0"/>
+              <a:buNone/>
+            </a:pPr>
+            <a:r>
+              <a:rPr lang="en-US" sz="1000" b="0" i="0" dirty="0">
+                <a:solidFill>
+                  <a:srgbClr val="3D3D4E"/>
+                </a:solidFill>
+                <a:effectLst/>
+                <a:latin typeface="Century Gothic" panose="020B0502020202020204" pitchFamily="34" charset="0"/>
+              </a:rPr>
+              <a:t>Let’s take the example of the </a:t>
+            </a:r>
+            <a:r>
+              <a:rPr lang="en-US" sz="1000" b="1" i="0" dirty="0">
+                <a:solidFill>
+                  <a:srgbClr val="3D3D4E"/>
+                </a:solidFill>
+                <a:effectLst/>
+                <a:latin typeface="Century Gothic" panose="020B0502020202020204" pitchFamily="34" charset="0"/>
+              </a:rPr>
+              <a:t>Fibonacci numbers</a:t>
+            </a:r>
+            <a:r>
+              <a:rPr lang="en-US" sz="1000" b="0" i="0" dirty="0">
+                <a:solidFill>
+                  <a:srgbClr val="3D3D4E"/>
+                </a:solidFill>
+                <a:effectLst/>
+                <a:latin typeface="Century Gothic" panose="020B0502020202020204" pitchFamily="34" charset="0"/>
+              </a:rPr>
+              <a:t>. </a:t>
+            </a:r>
+          </a:p>
+          <a:p>
+            <a:pPr marL="0" indent="0">
+              <a:spcBef>
+                <a:spcPts val="0"/>
+              </a:spcBef>
+              <a:buFont typeface="Arial" panose="020B0604020202020204" pitchFamily="34" charset="0"/>
+              <a:buNone/>
+            </a:pPr>
+            <a:endParaRPr lang="pt-BR" sz="1000" dirty="0">
+              <a:solidFill>
+                <a:srgbClr val="3D3D4E"/>
+              </a:solidFill>
+              <a:latin typeface="Century Gothic" panose="020B0502020202020204" pitchFamily="34" charset="0"/>
+            </a:endParaRPr>
+          </a:p>
+          <a:p>
+            <a:pPr marL="0" indent="0">
+              <a:spcBef>
+                <a:spcPts val="0"/>
+              </a:spcBef>
+              <a:buFont typeface="Arial" panose="020B0604020202020204" pitchFamily="34" charset="0"/>
+              <a:buNone/>
+            </a:pPr>
+            <a:r>
+              <a:rPr lang="pt-BR" sz="1000" dirty="0">
+                <a:solidFill>
+                  <a:srgbClr val="3D3D4E"/>
+                </a:solidFill>
+                <a:latin typeface="Century Gothic" panose="020B0502020202020204" pitchFamily="34" charset="0"/>
+              </a:rPr>
+              <a:t>Fib(n) = Fib(n-1) + Fib(n-2), for n &gt; 1</a:t>
+            </a:r>
+            <a:endParaRPr lang="en-US" sz="1000" dirty="0">
+              <a:solidFill>
+                <a:srgbClr val="3D3D4E"/>
+              </a:solidFill>
+              <a:latin typeface="Century Gothic" panose="020B0502020202020204" pitchFamily="34" charset="0"/>
+            </a:endParaRPr>
+          </a:p>
+          <a:p>
+            <a:pPr marL="0" indent="0">
+              <a:buFont typeface="Arial" panose="020B0604020202020204" pitchFamily="34" charset="0"/>
+              <a:buNone/>
+            </a:pPr>
+            <a:endParaRPr lang="en-US" sz="1000" dirty="0">
+              <a:solidFill>
+                <a:srgbClr val="3D3D4E"/>
+              </a:solidFill>
+              <a:latin typeface="Century Gothic" panose="020B0502020202020204" pitchFamily="34" charset="0"/>
+            </a:endParaRPr>
+          </a:p>
+          <a:p>
+            <a:pPr marL="0" indent="0">
+              <a:buFont typeface="Arial" panose="020B0604020202020204" pitchFamily="34" charset="0"/>
+              <a:buNone/>
+            </a:pPr>
+            <a:r>
+              <a:rPr lang="en-US" sz="1000" dirty="0">
+                <a:solidFill>
+                  <a:srgbClr val="3D3D4E"/>
+                </a:solidFill>
+                <a:latin typeface="Century Gothic" panose="020B0502020202020204" pitchFamily="34" charset="0"/>
+              </a:rPr>
+              <a:t>One important aspects of this set of problem that How to make sure or exact characteristics to define dynamic programing?</a:t>
+            </a:r>
+          </a:p>
+          <a:p>
+            <a:pPr marL="0" indent="0">
+              <a:buFont typeface="Arial" panose="020B0604020202020204" pitchFamily="34" charset="0"/>
+              <a:buNone/>
+            </a:pPr>
+            <a:endParaRPr lang="en-US" sz="1000" dirty="0">
+              <a:solidFill>
+                <a:srgbClr val="3D3D4E"/>
+              </a:solidFill>
+              <a:latin typeface="Century Gothic" panose="020B0502020202020204" pitchFamily="34" charset="0"/>
+            </a:endParaRPr>
+          </a:p>
+          <a:p>
+            <a:pPr marL="0" indent="0">
+              <a:buFont typeface="Arial" panose="020B0604020202020204" pitchFamily="34" charset="0"/>
+              <a:buNone/>
+            </a:pPr>
+            <a:r>
+              <a:rPr lang="en-US" sz="1000" dirty="0">
+                <a:solidFill>
+                  <a:srgbClr val="3D3D4E"/>
+                </a:solidFill>
+                <a:latin typeface="Century Gothic" panose="020B0502020202020204" pitchFamily="34" charset="0"/>
+              </a:rPr>
+              <a:t>There are two characteristics of DP mainly</a:t>
+            </a:r>
+          </a:p>
+          <a:p>
+            <a:pPr>
+              <a:buFont typeface="Arial" panose="020B0604020202020204" pitchFamily="34" charset="0"/>
+              <a:buAutoNum type="arabicPeriod"/>
+            </a:pPr>
+            <a:r>
+              <a:rPr lang="en-US" sz="1000" dirty="0">
+                <a:solidFill>
+                  <a:srgbClr val="3D3D4E"/>
+                </a:solidFill>
+                <a:latin typeface="Century Gothic" panose="020B0502020202020204" pitchFamily="34" charset="0"/>
+              </a:rPr>
+              <a:t>Overlapping sub problems</a:t>
+            </a:r>
+          </a:p>
+          <a:p>
+            <a:pPr>
+              <a:buFont typeface="Arial" panose="020B0604020202020204" pitchFamily="34" charset="0"/>
+              <a:buAutoNum type="arabicPeriod"/>
+            </a:pPr>
+            <a:r>
+              <a:rPr lang="en-US" sz="1000" dirty="0">
+                <a:solidFill>
+                  <a:srgbClr val="3D3D4E"/>
+                </a:solidFill>
+                <a:latin typeface="Century Gothic" panose="020B0502020202020204" pitchFamily="34" charset="0"/>
+              </a:rPr>
+              <a:t>Optimal sub structure Property </a:t>
+            </a:r>
+          </a:p>
+          <a:p>
+            <a:pPr marL="0" indent="0">
+              <a:buNone/>
+            </a:pPr>
+            <a:r>
+              <a:rPr lang="en-US" sz="1000" dirty="0">
+                <a:solidFill>
+                  <a:srgbClr val="3D3D4E"/>
+                </a:solidFill>
+                <a:highlight>
+                  <a:srgbClr val="FFFF00"/>
+                </a:highlight>
+                <a:latin typeface="Century Gothic" panose="020B0502020202020204" pitchFamily="34" charset="0"/>
+              </a:rPr>
+              <a:t>“</a:t>
+            </a:r>
+            <a:r>
+              <a:rPr lang="en-US" sz="1000" b="0" i="0" dirty="0">
+                <a:solidFill>
+                  <a:srgbClr val="3D3D4E"/>
+                </a:solidFill>
+                <a:effectLst/>
+                <a:highlight>
+                  <a:srgbClr val="FFFF00"/>
+                </a:highlight>
+                <a:latin typeface="Century Gothic" panose="020B0502020202020204" pitchFamily="34" charset="0"/>
+              </a:rPr>
+              <a:t>Any problem has optimal substructure property if its overall optimal solution can be constructed from the optimal solutions of its subproblems</a:t>
+            </a:r>
+            <a:r>
+              <a:rPr lang="en-US" sz="1000" dirty="0">
+                <a:solidFill>
+                  <a:srgbClr val="3D3D4E"/>
+                </a:solidFill>
+                <a:highlight>
+                  <a:srgbClr val="FFFF00"/>
+                </a:highlight>
+                <a:latin typeface="Century Gothic" panose="020B0502020202020204" pitchFamily="34" charset="0"/>
+              </a:rPr>
+              <a:t>”</a:t>
+            </a:r>
+          </a:p>
+          <a:p>
+            <a:pPr marL="0" indent="0">
+              <a:buFont typeface="Arial" panose="020B0604020202020204" pitchFamily="34" charset="0"/>
+              <a:buNone/>
+            </a:pPr>
+            <a:endParaRPr lang="en-US" sz="1000" dirty="0">
+              <a:solidFill>
+                <a:srgbClr val="3D3D4E"/>
+              </a:solidFill>
+              <a:latin typeface="Century Gothic" panose="020B0502020202020204" pitchFamily="34" charset="0"/>
+            </a:endParaRPr>
+          </a:p>
+          <a:p>
+            <a:pPr marL="0" indent="0">
+              <a:buFont typeface="Arial" panose="020B0604020202020204" pitchFamily="34" charset="0"/>
+              <a:buNone/>
+            </a:pPr>
+            <a:endParaRPr lang="en-US" sz="1000" dirty="0">
+              <a:solidFill>
+                <a:srgbClr val="3D3D4E"/>
+              </a:solidFill>
+              <a:latin typeface="Century Gothic" panose="020B0502020202020204" pitchFamily="34" charset="0"/>
+            </a:endParaRPr>
+          </a:p>
+          <a:p>
+            <a:pPr marL="0" indent="0">
+              <a:buFont typeface="Arial" panose="020B0604020202020204" pitchFamily="34" charset="0"/>
+              <a:buNone/>
+            </a:pPr>
+            <a:endParaRPr lang="en-US" sz="1000" i="0" dirty="0">
               <a:effectLst/>
               <a:latin typeface="Century Gothic" panose="020B0502020202020204" pitchFamily="34" charset="0"/>
             </a:endParaRPr>
@@ -3706,10 +4018,1842 @@
           </a:p>
         </p:txBody>
       </p:sp>
+      <p:pic>
+        <p:nvPicPr>
+          <p:cNvPr id="5" name="Picture 4">
+            <a:extLst>
+              <a:ext uri="{FF2B5EF4-FFF2-40B4-BE49-F238E27FC236}">
+                <a16:creationId xmlns:a16="http://schemas.microsoft.com/office/drawing/2014/main" id="{B027FE70-9F87-44CD-BA82-8A267AC0B33E}"/>
+              </a:ext>
+            </a:extLst>
+          </p:cNvPr>
+          <p:cNvPicPr>
+            <a:picLocks noChangeAspect="1"/>
+          </p:cNvPicPr>
+          <p:nvPr/>
+        </p:nvPicPr>
+        <p:blipFill>
+          <a:blip r:embed="rId2"/>
+          <a:stretch>
+            <a:fillRect/>
+          </a:stretch>
+        </p:blipFill>
+        <p:spPr>
+          <a:xfrm>
+            <a:off x="6989094" y="2683378"/>
+            <a:ext cx="3921036" cy="2244364"/>
+          </a:xfrm>
+          <a:prstGeom prst="rect">
+            <a:avLst/>
+          </a:prstGeom>
+        </p:spPr>
+      </p:pic>
+      <p:cxnSp>
+        <p:nvCxnSpPr>
+          <p:cNvPr id="11" name="Straight Arrow Connector 10">
+            <a:extLst>
+              <a:ext uri="{FF2B5EF4-FFF2-40B4-BE49-F238E27FC236}">
+                <a16:creationId xmlns:a16="http://schemas.microsoft.com/office/drawing/2014/main" id="{270D2173-85D7-43CC-BB5C-22C73BF1001F}"/>
+              </a:ext>
+            </a:extLst>
+          </p:cNvPr>
+          <p:cNvCxnSpPr/>
+          <p:nvPr/>
+        </p:nvCxnSpPr>
+        <p:spPr>
+          <a:xfrm flipV="1">
+            <a:off x="2264636" y="3580957"/>
+            <a:ext cx="7033188" cy="1127776"/>
+          </a:xfrm>
+          <a:prstGeom prst="straightConnector1">
+            <a:avLst/>
+          </a:prstGeom>
+          <a:ln>
+            <a:tailEnd type="triangle"/>
+          </a:ln>
+        </p:spPr>
+        <p:style>
+          <a:lnRef idx="1">
+            <a:schemeClr val="accent1"/>
+          </a:lnRef>
+          <a:fillRef idx="0">
+            <a:schemeClr val="accent1"/>
+          </a:fillRef>
+          <a:effectRef idx="0">
+            <a:schemeClr val="accent1"/>
+          </a:effectRef>
+          <a:fontRef idx="minor">
+            <a:schemeClr val="tx1"/>
+          </a:fontRef>
+        </p:style>
+      </p:cxnSp>
+      <p:cxnSp>
+        <p:nvCxnSpPr>
+          <p:cNvPr id="13" name="Straight Arrow Connector 12">
+            <a:extLst>
+              <a:ext uri="{FF2B5EF4-FFF2-40B4-BE49-F238E27FC236}">
+                <a16:creationId xmlns:a16="http://schemas.microsoft.com/office/drawing/2014/main" id="{ABE63F6C-C399-4964-89E5-8DA177E87EB4}"/>
+              </a:ext>
+            </a:extLst>
+          </p:cNvPr>
+          <p:cNvCxnSpPr/>
+          <p:nvPr/>
+        </p:nvCxnSpPr>
+        <p:spPr>
+          <a:xfrm flipV="1">
+            <a:off x="2247544" y="4187439"/>
+            <a:ext cx="5443671" cy="529840"/>
+          </a:xfrm>
+          <a:prstGeom prst="straightConnector1">
+            <a:avLst/>
+          </a:prstGeom>
+          <a:ln>
+            <a:tailEnd type="triangle"/>
+          </a:ln>
+        </p:spPr>
+        <p:style>
+          <a:lnRef idx="1">
+            <a:schemeClr val="accent1"/>
+          </a:lnRef>
+          <a:fillRef idx="0">
+            <a:schemeClr val="accent1"/>
+          </a:fillRef>
+          <a:effectRef idx="0">
+            <a:schemeClr val="accent1"/>
+          </a:effectRef>
+          <a:fontRef idx="minor">
+            <a:schemeClr val="tx1"/>
+          </a:fontRef>
+        </p:style>
+      </p:cxnSp>
+      <p:sp>
+        <p:nvSpPr>
+          <p:cNvPr id="14" name="Rectangle 13">
+            <a:extLst>
+              <a:ext uri="{FF2B5EF4-FFF2-40B4-BE49-F238E27FC236}">
+                <a16:creationId xmlns:a16="http://schemas.microsoft.com/office/drawing/2014/main" id="{BFF4AF5A-1614-42BB-9A6E-09E3F18DA9BB}"/>
+              </a:ext>
+            </a:extLst>
+          </p:cNvPr>
+          <p:cNvSpPr/>
+          <p:nvPr/>
+        </p:nvSpPr>
+        <p:spPr>
+          <a:xfrm>
+            <a:off x="167539" y="871671"/>
+            <a:ext cx="5983111" cy="5349667"/>
+          </a:xfrm>
+          <a:prstGeom prst="rect">
+            <a:avLst/>
+          </a:prstGeom>
+          <a:noFill/>
+          <a:ln w="9525" cap="flat" cmpd="sng" algn="ctr">
+            <a:solidFill>
+              <a:schemeClr val="accent2"/>
+            </a:solidFill>
+            <a:prstDash val="solid"/>
+            <a:round/>
+            <a:headEnd type="none" w="med" len="med"/>
+            <a:tailEnd type="none" w="med" len="med"/>
+          </a:ln>
+        </p:spPr>
+        <p:style>
+          <a:lnRef idx="0">
+            <a:scrgbClr r="0" g="0" b="0"/>
+          </a:lnRef>
+          <a:fillRef idx="0">
+            <a:scrgbClr r="0" g="0" b="0"/>
+          </a:fillRef>
+          <a:effectRef idx="0">
+            <a:scrgbClr r="0" g="0" b="0"/>
+          </a:effectRef>
+          <a:fontRef idx="minor">
+            <a:schemeClr val="accent2"/>
+          </a:fontRef>
+        </p:style>
+        <p:txBody>
+          <a:bodyPr rtlCol="0" anchor="ctr"/>
+          <a:lstStyle/>
+          <a:p>
+            <a:pPr algn="ctr"/>
+            <a:endParaRPr lang="en-IN" dirty="0"/>
+          </a:p>
+        </p:txBody>
+      </p:sp>
+      <p:sp>
+        <p:nvSpPr>
+          <p:cNvPr id="15" name="Rectangle 14">
+            <a:extLst>
+              <a:ext uri="{FF2B5EF4-FFF2-40B4-BE49-F238E27FC236}">
+                <a16:creationId xmlns:a16="http://schemas.microsoft.com/office/drawing/2014/main" id="{AAE3E814-93EF-40EF-9C87-676C7B4C9625}"/>
+              </a:ext>
+            </a:extLst>
+          </p:cNvPr>
+          <p:cNvSpPr/>
+          <p:nvPr/>
+        </p:nvSpPr>
+        <p:spPr>
+          <a:xfrm>
+            <a:off x="6682811" y="2264636"/>
+            <a:ext cx="4854011" cy="3264493"/>
+          </a:xfrm>
+          <a:prstGeom prst="rect">
+            <a:avLst/>
+          </a:prstGeom>
+          <a:solidFill>
+            <a:schemeClr val="accent6">
+              <a:alpha val="50000"/>
+            </a:schemeClr>
+          </a:solidFill>
+          <a:ln>
+            <a:noFill/>
+          </a:ln>
+        </p:spPr>
+        <p:style>
+          <a:lnRef idx="0">
+            <a:scrgbClr r="0" g="0" b="0"/>
+          </a:lnRef>
+          <a:fillRef idx="0">
+            <a:scrgbClr r="0" g="0" b="0"/>
+          </a:fillRef>
+          <a:effectRef idx="0">
+            <a:scrgbClr r="0" g="0" b="0"/>
+          </a:effectRef>
+          <a:fontRef idx="minor">
+            <a:schemeClr val="lt1"/>
+          </a:fontRef>
+        </p:style>
+        <p:txBody>
+          <a:bodyPr rtlCol="0" anchor="ctr"/>
+          <a:lstStyle/>
+          <a:p>
+            <a:pPr algn="ctr"/>
+            <a:endParaRPr lang="en-IN" dirty="0"/>
+          </a:p>
+        </p:txBody>
+      </p:sp>
     </p:spTree>
     <p:extLst>
       <p:ext uri="{BB962C8B-B14F-4D97-AF65-F5344CB8AC3E}">
         <p14:creationId xmlns:p14="http://schemas.microsoft.com/office/powerpoint/2010/main" val="2199079306"/>
+      </p:ext>
+    </p:extLst>
+  </p:cSld>
+  <p:clrMapOvr>
+    <a:masterClrMapping/>
+  </p:clrMapOvr>
+</p:sld>
+</file>
+
+<file path=ppt/slides/slide2.xml><?xml version="1.0" encoding="utf-8"?>
+<p:sld xmlns:a="http://schemas.openxmlformats.org/drawingml/2006/main" xmlns:r="http://schemas.openxmlformats.org/officeDocument/2006/relationships" xmlns:p="http://schemas.openxmlformats.org/presentationml/2006/main">
+  <p:cSld>
+    <p:spTree>
+      <p:nvGrpSpPr>
+        <p:cNvPr id="1" name=""/>
+        <p:cNvGrpSpPr/>
+        <p:nvPr/>
+      </p:nvGrpSpPr>
+      <p:grpSpPr>
+        <a:xfrm>
+          <a:off x="0" y="0"/>
+          <a:ext cx="0" cy="0"/>
+          <a:chOff x="0" y="0"/>
+          <a:chExt cx="0" cy="0"/>
+        </a:xfrm>
+      </p:grpSpPr>
+      <p:sp>
+        <p:nvSpPr>
+          <p:cNvPr id="6" name="Rectangle 5">
+            <a:extLst>
+              <a:ext uri="{FF2B5EF4-FFF2-40B4-BE49-F238E27FC236}">
+                <a16:creationId xmlns:a16="http://schemas.microsoft.com/office/drawing/2014/main" id="{23D9A284-E705-4058-BC97-E411758071E2}"/>
+              </a:ext>
+            </a:extLst>
+          </p:cNvPr>
+          <p:cNvSpPr/>
+          <p:nvPr/>
+        </p:nvSpPr>
+        <p:spPr>
+          <a:xfrm>
+            <a:off x="0" y="0"/>
+            <a:ext cx="12192000" cy="623843"/>
+          </a:xfrm>
+          <a:prstGeom prst="rect">
+            <a:avLst/>
+          </a:prstGeom>
+        </p:spPr>
+        <p:style>
+          <a:lnRef idx="2">
+            <a:schemeClr val="accent1">
+              <a:shade val="50000"/>
+            </a:schemeClr>
+          </a:lnRef>
+          <a:fillRef idx="1">
+            <a:schemeClr val="accent1"/>
+          </a:fillRef>
+          <a:effectRef idx="0">
+            <a:schemeClr val="accent1"/>
+          </a:effectRef>
+          <a:fontRef idx="minor">
+            <a:schemeClr val="lt1"/>
+          </a:fontRef>
+        </p:style>
+        <p:txBody>
+          <a:bodyPr rtlCol="0" anchor="ctr"/>
+          <a:lstStyle/>
+          <a:p>
+            <a:pPr algn="ctr"/>
+            <a:endParaRPr lang="en-IN" b="1" i="0" dirty="0">
+              <a:effectLst/>
+              <a:latin typeface="Nunito Sans" pitchFamily="2" charset="0"/>
+            </a:endParaRPr>
+          </a:p>
+          <a:p>
+            <a:pPr algn="ctr"/>
+            <a:r>
+              <a:rPr lang="en-US" b="1" dirty="0">
+                <a:latin typeface="Nunito Sans" pitchFamily="2" charset="0"/>
+              </a:rPr>
+              <a:t>Dynamic Programming - Methods</a:t>
+            </a:r>
+            <a:endParaRPr lang="en-IN" b="1" dirty="0">
+              <a:latin typeface="Nunito Sans" pitchFamily="2" charset="0"/>
+            </a:endParaRPr>
+          </a:p>
+          <a:p>
+            <a:pPr algn="ctr"/>
+            <a:endParaRPr lang="en-IN" dirty="0"/>
+          </a:p>
+        </p:txBody>
+      </p:sp>
+      <p:sp>
+        <p:nvSpPr>
+          <p:cNvPr id="9" name="Content Placeholder 7">
+            <a:extLst>
+              <a:ext uri="{FF2B5EF4-FFF2-40B4-BE49-F238E27FC236}">
+                <a16:creationId xmlns:a16="http://schemas.microsoft.com/office/drawing/2014/main" id="{A5D67D54-6D66-4C14-8EAC-A9B924086C06}"/>
+              </a:ext>
+            </a:extLst>
+          </p:cNvPr>
+          <p:cNvSpPr txBox="1">
+            <a:spLocks/>
+          </p:cNvSpPr>
+          <p:nvPr/>
+        </p:nvSpPr>
+        <p:spPr>
+          <a:xfrm>
+            <a:off x="222191" y="865841"/>
+            <a:ext cx="5873809" cy="5339650"/>
+          </a:xfrm>
+          <a:prstGeom prst="rect">
+            <a:avLst/>
+          </a:prstGeom>
+        </p:spPr>
+        <p:txBody>
+          <a:bodyPr vert="horz" lIns="91440" tIns="45720" rIns="91440" bIns="45720" rtlCol="0">
+            <a:normAutofit/>
+          </a:bodyPr>
+          <a:lstStyle>
+            <a:lvl1pPr marL="228600" indent="-228600" algn="l" defTabSz="914400" rtl="0" eaLnBrk="1" latinLnBrk="0" hangingPunct="1">
+              <a:lnSpc>
+                <a:spcPct val="90000"/>
+              </a:lnSpc>
+              <a:spcBef>
+                <a:spcPts val="1000"/>
+              </a:spcBef>
+              <a:buFont typeface="Arial" panose="020B0604020202020204" pitchFamily="34" charset="0"/>
+              <a:buChar char="•"/>
+              <a:defRPr sz="2800" kern="1200">
+                <a:solidFill>
+                  <a:schemeClr val="tx1"/>
+                </a:solidFill>
+                <a:latin typeface="+mn-lt"/>
+                <a:ea typeface="+mn-ea"/>
+                <a:cs typeface="+mn-cs"/>
+              </a:defRPr>
+            </a:lvl1pPr>
+            <a:lvl2pPr marL="685800" indent="-228600" algn="l" defTabSz="914400" rtl="0" eaLnBrk="1" latinLnBrk="0" hangingPunct="1">
+              <a:lnSpc>
+                <a:spcPct val="90000"/>
+              </a:lnSpc>
+              <a:spcBef>
+                <a:spcPts val="500"/>
+              </a:spcBef>
+              <a:buFont typeface="Arial" panose="020B0604020202020204" pitchFamily="34" charset="0"/>
+              <a:buChar char="•"/>
+              <a:defRPr sz="2400" kern="1200">
+                <a:solidFill>
+                  <a:schemeClr val="tx1"/>
+                </a:solidFill>
+                <a:latin typeface="+mn-lt"/>
+                <a:ea typeface="+mn-ea"/>
+                <a:cs typeface="+mn-cs"/>
+              </a:defRPr>
+            </a:lvl2pPr>
+            <a:lvl3pPr marL="1143000" indent="-228600" algn="l" defTabSz="914400" rtl="0" eaLnBrk="1" latinLnBrk="0" hangingPunct="1">
+              <a:lnSpc>
+                <a:spcPct val="90000"/>
+              </a:lnSpc>
+              <a:spcBef>
+                <a:spcPts val="500"/>
+              </a:spcBef>
+              <a:buFont typeface="Arial" panose="020B0604020202020204" pitchFamily="34" charset="0"/>
+              <a:buChar char="•"/>
+              <a:defRPr sz="2000" kern="1200">
+                <a:solidFill>
+                  <a:schemeClr val="tx1"/>
+                </a:solidFill>
+                <a:latin typeface="+mn-lt"/>
+                <a:ea typeface="+mn-ea"/>
+                <a:cs typeface="+mn-cs"/>
+              </a:defRPr>
+            </a:lvl3pPr>
+            <a:lvl4pPr marL="1600200" indent="-228600" algn="l" defTabSz="914400" rtl="0" eaLnBrk="1" latinLnBrk="0" hangingPunct="1">
+              <a:lnSpc>
+                <a:spcPct val="90000"/>
+              </a:lnSpc>
+              <a:spcBef>
+                <a:spcPts val="500"/>
+              </a:spcBef>
+              <a:buFont typeface="Arial" panose="020B0604020202020204" pitchFamily="34" charset="0"/>
+              <a:buChar char="•"/>
+              <a:defRPr sz="1800" kern="1200">
+                <a:solidFill>
+                  <a:schemeClr val="tx1"/>
+                </a:solidFill>
+                <a:latin typeface="+mn-lt"/>
+                <a:ea typeface="+mn-ea"/>
+                <a:cs typeface="+mn-cs"/>
+              </a:defRPr>
+            </a:lvl4pPr>
+            <a:lvl5pPr marL="2057400" indent="-228600" algn="l" defTabSz="914400" rtl="0" eaLnBrk="1" latinLnBrk="0" hangingPunct="1">
+              <a:lnSpc>
+                <a:spcPct val="90000"/>
+              </a:lnSpc>
+              <a:spcBef>
+                <a:spcPts val="500"/>
+              </a:spcBef>
+              <a:buFont typeface="Arial" panose="020B0604020202020204" pitchFamily="34" charset="0"/>
+              <a:buChar char="•"/>
+              <a:defRPr sz="1800" kern="1200">
+                <a:solidFill>
+                  <a:schemeClr val="tx1"/>
+                </a:solidFill>
+                <a:latin typeface="+mn-lt"/>
+                <a:ea typeface="+mn-ea"/>
+                <a:cs typeface="+mn-cs"/>
+              </a:defRPr>
+            </a:lvl5pPr>
+            <a:lvl6pPr marL="2514600" indent="-228600" algn="l" defTabSz="914400" rtl="0" eaLnBrk="1" latinLnBrk="0" hangingPunct="1">
+              <a:lnSpc>
+                <a:spcPct val="90000"/>
+              </a:lnSpc>
+              <a:spcBef>
+                <a:spcPts val="500"/>
+              </a:spcBef>
+              <a:buFont typeface="Arial" panose="020B0604020202020204" pitchFamily="34" charset="0"/>
+              <a:buChar char="•"/>
+              <a:defRPr sz="1800" kern="1200">
+                <a:solidFill>
+                  <a:schemeClr val="tx1"/>
+                </a:solidFill>
+                <a:latin typeface="+mn-lt"/>
+                <a:ea typeface="+mn-ea"/>
+                <a:cs typeface="+mn-cs"/>
+              </a:defRPr>
+            </a:lvl6pPr>
+            <a:lvl7pPr marL="2971800" indent="-228600" algn="l" defTabSz="914400" rtl="0" eaLnBrk="1" latinLnBrk="0" hangingPunct="1">
+              <a:lnSpc>
+                <a:spcPct val="90000"/>
+              </a:lnSpc>
+              <a:spcBef>
+                <a:spcPts val="500"/>
+              </a:spcBef>
+              <a:buFont typeface="Arial" panose="020B0604020202020204" pitchFamily="34" charset="0"/>
+              <a:buChar char="•"/>
+              <a:defRPr sz="1800" kern="1200">
+                <a:solidFill>
+                  <a:schemeClr val="tx1"/>
+                </a:solidFill>
+                <a:latin typeface="+mn-lt"/>
+                <a:ea typeface="+mn-ea"/>
+                <a:cs typeface="+mn-cs"/>
+              </a:defRPr>
+            </a:lvl7pPr>
+            <a:lvl8pPr marL="3429000" indent="-228600" algn="l" defTabSz="914400" rtl="0" eaLnBrk="1" latinLnBrk="0" hangingPunct="1">
+              <a:lnSpc>
+                <a:spcPct val="90000"/>
+              </a:lnSpc>
+              <a:spcBef>
+                <a:spcPts val="500"/>
+              </a:spcBef>
+              <a:buFont typeface="Arial" panose="020B0604020202020204" pitchFamily="34" charset="0"/>
+              <a:buChar char="•"/>
+              <a:defRPr sz="1800" kern="1200">
+                <a:solidFill>
+                  <a:schemeClr val="tx1"/>
+                </a:solidFill>
+                <a:latin typeface="+mn-lt"/>
+                <a:ea typeface="+mn-ea"/>
+                <a:cs typeface="+mn-cs"/>
+              </a:defRPr>
+            </a:lvl8pPr>
+            <a:lvl9pPr marL="3886200" indent="-228600" algn="l" defTabSz="914400" rtl="0" eaLnBrk="1" latinLnBrk="0" hangingPunct="1">
+              <a:lnSpc>
+                <a:spcPct val="90000"/>
+              </a:lnSpc>
+              <a:spcBef>
+                <a:spcPts val="500"/>
+              </a:spcBef>
+              <a:buFont typeface="Arial" panose="020B0604020202020204" pitchFamily="34" charset="0"/>
+              <a:buChar char="•"/>
+              <a:defRPr sz="1800" kern="1200">
+                <a:solidFill>
+                  <a:schemeClr val="tx1"/>
+                </a:solidFill>
+                <a:latin typeface="+mn-lt"/>
+                <a:ea typeface="+mn-ea"/>
+                <a:cs typeface="+mn-cs"/>
+              </a:defRPr>
+            </a:lvl9pPr>
+          </a:lstStyle>
+          <a:p>
+            <a:pPr marL="0" indent="0">
+              <a:buFont typeface="Arial" panose="020B0604020202020204" pitchFamily="34" charset="0"/>
+              <a:buNone/>
+            </a:pPr>
+            <a:r>
+              <a:rPr lang="en-US" sz="1000" dirty="0">
+                <a:solidFill>
+                  <a:srgbClr val="3D3D4E"/>
+                </a:solidFill>
+                <a:latin typeface="Century Gothic" panose="020B0502020202020204" pitchFamily="34" charset="0"/>
+              </a:rPr>
+              <a:t>DP offers two methods to solve a problem.</a:t>
+            </a:r>
+          </a:p>
+          <a:p>
+            <a:pPr marL="0" indent="0">
+              <a:buFont typeface="Arial" panose="020B0604020202020204" pitchFamily="34" charset="0"/>
+              <a:buNone/>
+            </a:pPr>
+            <a:r>
+              <a:rPr lang="en-US" sz="1000" b="1" i="0" dirty="0">
+                <a:solidFill>
+                  <a:srgbClr val="3D3D4E"/>
+                </a:solidFill>
+                <a:effectLst/>
+                <a:latin typeface="Century Gothic" panose="020B0502020202020204" pitchFamily="34" charset="0"/>
+              </a:rPr>
+              <a:t>Top</a:t>
+            </a:r>
+            <a:r>
+              <a:rPr lang="en-US" sz="1000" b="1" dirty="0">
+                <a:solidFill>
+                  <a:srgbClr val="3D3D4E"/>
+                </a:solidFill>
+                <a:latin typeface="Century Gothic" panose="020B0502020202020204" pitchFamily="34" charset="0"/>
+              </a:rPr>
+              <a:t>-down with Memorization – Approach 01</a:t>
+            </a:r>
+          </a:p>
+          <a:p>
+            <a:pPr marL="0" indent="0">
+              <a:buFont typeface="Arial" panose="020B0604020202020204" pitchFamily="34" charset="0"/>
+              <a:buNone/>
+            </a:pPr>
+            <a:r>
+              <a:rPr lang="en-US" sz="1000" b="0" i="0" dirty="0">
+                <a:solidFill>
+                  <a:srgbClr val="3D3D4E"/>
+                </a:solidFill>
+                <a:effectLst/>
+                <a:latin typeface="Century Gothic" panose="020B0502020202020204" pitchFamily="34" charset="0"/>
+              </a:rPr>
+              <a:t>In this approach, we will try to solve the bigger problem by recursively finding the solution to smaller sub-problems. And by the way this is the most realistic and practical approach to solve any complex problem.</a:t>
+            </a:r>
+          </a:p>
+          <a:p>
+            <a:pPr marL="0" indent="0">
+              <a:buFont typeface="Arial" panose="020B0604020202020204" pitchFamily="34" charset="0"/>
+              <a:buNone/>
+            </a:pPr>
+            <a:r>
+              <a:rPr lang="en-US" sz="1000" dirty="0">
+                <a:solidFill>
+                  <a:srgbClr val="3D3D4E"/>
+                </a:solidFill>
+                <a:latin typeface="Century Gothic" panose="020B0502020202020204" pitchFamily="34" charset="0"/>
+              </a:rPr>
+              <a:t>	whenever we solve sub problems, we will cache them for future re-use. While reusing the cached solution, our benefit is in avoiding the re-solution to the problem which is already solved.  </a:t>
+            </a:r>
+            <a:r>
+              <a:rPr lang="en-US" sz="1000" b="1" dirty="0">
+                <a:solidFill>
+                  <a:srgbClr val="3D3D4E"/>
+                </a:solidFill>
+                <a:highlight>
+                  <a:srgbClr val="FFFF00"/>
+                </a:highlight>
+                <a:latin typeface="Century Gothic" panose="020B0502020202020204" pitchFamily="34" charset="0"/>
+              </a:rPr>
+              <a:t>This approach is called Memorization.</a:t>
+            </a:r>
+          </a:p>
+          <a:p>
+            <a:pPr marL="0" indent="0">
+              <a:buFont typeface="Arial" panose="020B0604020202020204" pitchFamily="34" charset="0"/>
+              <a:buNone/>
+            </a:pPr>
+            <a:endParaRPr lang="en-US" sz="1000" dirty="0">
+              <a:solidFill>
+                <a:srgbClr val="3D3D4E"/>
+              </a:solidFill>
+              <a:latin typeface="Century Gothic" panose="020B0502020202020204" pitchFamily="34" charset="0"/>
+            </a:endParaRPr>
+          </a:p>
+          <a:p>
+            <a:pPr marL="0" indent="0">
+              <a:buFont typeface="Arial" panose="020B0604020202020204" pitchFamily="34" charset="0"/>
+              <a:buNone/>
+            </a:pPr>
+            <a:r>
+              <a:rPr lang="en-US" sz="1000" dirty="0">
+                <a:solidFill>
+                  <a:srgbClr val="3D3D4E"/>
+                </a:solidFill>
+                <a:latin typeface="Century Gothic" panose="020B0502020202020204" pitchFamily="34" charset="0"/>
+              </a:rPr>
+              <a:t>One Example of Fibonacci  - </a:t>
+            </a:r>
+          </a:p>
+          <a:p>
+            <a:pPr marL="0" indent="0">
+              <a:buFont typeface="Arial" panose="020B0604020202020204" pitchFamily="34" charset="0"/>
+              <a:buNone/>
+            </a:pPr>
+            <a:endParaRPr lang="en-US" sz="1000" dirty="0">
+              <a:solidFill>
+                <a:srgbClr val="3D3D4E"/>
+              </a:solidFill>
+              <a:latin typeface="Century Gothic" panose="020B0502020202020204" pitchFamily="34" charset="0"/>
+            </a:endParaRPr>
+          </a:p>
+          <a:p>
+            <a:pPr marL="0" indent="0">
+              <a:buFont typeface="Arial" panose="020B0604020202020204" pitchFamily="34" charset="0"/>
+              <a:buNone/>
+            </a:pPr>
+            <a:endParaRPr lang="en-US" sz="1000" b="0" i="0" dirty="0">
+              <a:solidFill>
+                <a:srgbClr val="3D3D4E"/>
+              </a:solidFill>
+              <a:effectLst/>
+              <a:latin typeface="Century Gothic" panose="020B0502020202020204" pitchFamily="34" charset="0"/>
+            </a:endParaRPr>
+          </a:p>
+          <a:p>
+            <a:pPr marL="0" indent="0">
+              <a:buFont typeface="Arial" panose="020B0604020202020204" pitchFamily="34" charset="0"/>
+              <a:buNone/>
+            </a:pPr>
+            <a:endParaRPr lang="en-US" sz="1000" b="1" i="0" dirty="0">
+              <a:solidFill>
+                <a:srgbClr val="3D3D4E"/>
+              </a:solidFill>
+              <a:effectLst/>
+              <a:latin typeface="Century Gothic" panose="020B0502020202020204" pitchFamily="34" charset="0"/>
+            </a:endParaRPr>
+          </a:p>
+          <a:p>
+            <a:pPr marL="0" indent="0">
+              <a:buFont typeface="Arial" panose="020B0604020202020204" pitchFamily="34" charset="0"/>
+              <a:buNone/>
+            </a:pPr>
+            <a:endParaRPr lang="en-US" sz="1000" b="1" dirty="0">
+              <a:solidFill>
+                <a:srgbClr val="3D3D4E"/>
+              </a:solidFill>
+              <a:latin typeface="Century Gothic" panose="020B0502020202020204" pitchFamily="34" charset="0"/>
+            </a:endParaRPr>
+          </a:p>
+          <a:p>
+            <a:pPr marL="0" indent="0">
+              <a:buFont typeface="Arial" panose="020B0604020202020204" pitchFamily="34" charset="0"/>
+              <a:buNone/>
+            </a:pPr>
+            <a:endParaRPr lang="en-US" sz="1000" i="0" dirty="0">
+              <a:solidFill>
+                <a:srgbClr val="3D3D4E"/>
+              </a:solidFill>
+              <a:effectLst/>
+              <a:latin typeface="Century Gothic" panose="020B0502020202020204" pitchFamily="34" charset="0"/>
+            </a:endParaRPr>
+          </a:p>
+          <a:p>
+            <a:pPr marL="0" indent="0">
+              <a:buFont typeface="Arial" panose="020B0604020202020204" pitchFamily="34" charset="0"/>
+              <a:buNone/>
+            </a:pPr>
+            <a:endParaRPr lang="en-US" sz="1000" i="0" dirty="0">
+              <a:effectLst/>
+              <a:latin typeface="Century Gothic" panose="020B0502020202020204" pitchFamily="34" charset="0"/>
+            </a:endParaRPr>
+          </a:p>
+        </p:txBody>
+      </p:sp>
+      <p:sp>
+        <p:nvSpPr>
+          <p:cNvPr id="2" name="Rectangle 1">
+            <a:extLst>
+              <a:ext uri="{FF2B5EF4-FFF2-40B4-BE49-F238E27FC236}">
+                <a16:creationId xmlns:a16="http://schemas.microsoft.com/office/drawing/2014/main" id="{92FC7832-74DA-4590-8BF7-CB38914B9190}"/>
+              </a:ext>
+            </a:extLst>
+          </p:cNvPr>
+          <p:cNvSpPr/>
+          <p:nvPr/>
+        </p:nvSpPr>
+        <p:spPr>
+          <a:xfrm>
+            <a:off x="101600" y="749826"/>
+            <a:ext cx="11977511" cy="5662263"/>
+          </a:xfrm>
+          <a:prstGeom prst="rect">
+            <a:avLst/>
+          </a:prstGeom>
+          <a:noFill/>
+          <a:ln w="9525" cap="flat" cmpd="sng" algn="ctr">
+            <a:solidFill>
+              <a:schemeClr val="accent3"/>
+            </a:solidFill>
+            <a:prstDash val="solid"/>
+            <a:round/>
+            <a:headEnd type="none" w="med" len="med"/>
+            <a:tailEnd type="none" w="med" len="med"/>
+          </a:ln>
+        </p:spPr>
+        <p:style>
+          <a:lnRef idx="0">
+            <a:scrgbClr r="0" g="0" b="0"/>
+          </a:lnRef>
+          <a:fillRef idx="0">
+            <a:scrgbClr r="0" g="0" b="0"/>
+          </a:fillRef>
+          <a:effectRef idx="0">
+            <a:scrgbClr r="0" g="0" b="0"/>
+          </a:effectRef>
+          <a:fontRef idx="minor">
+            <a:schemeClr val="accent3"/>
+          </a:fontRef>
+        </p:style>
+        <p:txBody>
+          <a:bodyPr rtlCol="0" anchor="ctr"/>
+          <a:lstStyle/>
+          <a:p>
+            <a:pPr algn="ctr"/>
+            <a:endParaRPr lang="en-IN"/>
+          </a:p>
+        </p:txBody>
+      </p:sp>
+      <p:sp>
+        <p:nvSpPr>
+          <p:cNvPr id="14" name="Rectangle 13">
+            <a:extLst>
+              <a:ext uri="{FF2B5EF4-FFF2-40B4-BE49-F238E27FC236}">
+                <a16:creationId xmlns:a16="http://schemas.microsoft.com/office/drawing/2014/main" id="{BFF4AF5A-1614-42BB-9A6E-09E3F18DA9BB}"/>
+              </a:ext>
+            </a:extLst>
+          </p:cNvPr>
+          <p:cNvSpPr/>
+          <p:nvPr/>
+        </p:nvSpPr>
+        <p:spPr>
+          <a:xfrm>
+            <a:off x="167539" y="871671"/>
+            <a:ext cx="5983111" cy="5349667"/>
+          </a:xfrm>
+          <a:prstGeom prst="rect">
+            <a:avLst/>
+          </a:prstGeom>
+          <a:noFill/>
+          <a:ln w="9525" cap="flat" cmpd="sng" algn="ctr">
+            <a:solidFill>
+              <a:schemeClr val="accent2"/>
+            </a:solidFill>
+            <a:prstDash val="solid"/>
+            <a:round/>
+            <a:headEnd type="none" w="med" len="med"/>
+            <a:tailEnd type="none" w="med" len="med"/>
+          </a:ln>
+        </p:spPr>
+        <p:style>
+          <a:lnRef idx="0">
+            <a:scrgbClr r="0" g="0" b="0"/>
+          </a:lnRef>
+          <a:fillRef idx="0">
+            <a:scrgbClr r="0" g="0" b="0"/>
+          </a:fillRef>
+          <a:effectRef idx="0">
+            <a:scrgbClr r="0" g="0" b="0"/>
+          </a:effectRef>
+          <a:fontRef idx="minor">
+            <a:schemeClr val="accent2"/>
+          </a:fontRef>
+        </p:style>
+        <p:txBody>
+          <a:bodyPr rtlCol="0" anchor="ctr"/>
+          <a:lstStyle/>
+          <a:p>
+            <a:pPr algn="ctr"/>
+            <a:endParaRPr lang="en-IN" dirty="0"/>
+          </a:p>
+        </p:txBody>
+      </p:sp>
+      <p:sp>
+        <p:nvSpPr>
+          <p:cNvPr id="3" name="TextBox 2">
+            <a:extLst>
+              <a:ext uri="{FF2B5EF4-FFF2-40B4-BE49-F238E27FC236}">
+                <a16:creationId xmlns:a16="http://schemas.microsoft.com/office/drawing/2014/main" id="{FDCD6AB8-1667-4C84-B01B-5732F6100B41}"/>
+              </a:ext>
+            </a:extLst>
+          </p:cNvPr>
+          <p:cNvSpPr txBox="1"/>
+          <p:nvPr/>
+        </p:nvSpPr>
+        <p:spPr>
+          <a:xfrm>
+            <a:off x="6452075" y="965675"/>
+            <a:ext cx="5230026" cy="646331"/>
+          </a:xfrm>
+          <a:prstGeom prst="rect">
+            <a:avLst/>
+          </a:prstGeom>
+          <a:noFill/>
+        </p:spPr>
+        <p:txBody>
+          <a:bodyPr wrap="square" rtlCol="0">
+            <a:spAutoFit/>
+          </a:bodyPr>
+          <a:lstStyle/>
+          <a:p>
+            <a:r>
+              <a:rPr lang="en-IN" dirty="0"/>
+              <a:t>Compare the two Approach</a:t>
+            </a:r>
+          </a:p>
+          <a:p>
+            <a:endParaRPr lang="en-IN" dirty="0"/>
+          </a:p>
+        </p:txBody>
+      </p:sp>
+      <p:pic>
+        <p:nvPicPr>
+          <p:cNvPr id="7" name="Picture 6">
+            <a:extLst>
+              <a:ext uri="{FF2B5EF4-FFF2-40B4-BE49-F238E27FC236}">
+                <a16:creationId xmlns:a16="http://schemas.microsoft.com/office/drawing/2014/main" id="{B26C98D5-E742-43B0-B681-09611502CE23}"/>
+              </a:ext>
+            </a:extLst>
+          </p:cNvPr>
+          <p:cNvPicPr>
+            <a:picLocks noChangeAspect="1"/>
+          </p:cNvPicPr>
+          <p:nvPr/>
+        </p:nvPicPr>
+        <p:blipFill>
+          <a:blip r:embed="rId2"/>
+          <a:stretch>
+            <a:fillRect/>
+          </a:stretch>
+        </p:blipFill>
+        <p:spPr>
+          <a:xfrm>
+            <a:off x="6271241" y="1379044"/>
+            <a:ext cx="5806274" cy="1878320"/>
+          </a:xfrm>
+          <a:prstGeom prst="rect">
+            <a:avLst/>
+          </a:prstGeom>
+        </p:spPr>
+      </p:pic>
+      <p:pic>
+        <p:nvPicPr>
+          <p:cNvPr id="10" name="Picture 9">
+            <a:extLst>
+              <a:ext uri="{FF2B5EF4-FFF2-40B4-BE49-F238E27FC236}">
+                <a16:creationId xmlns:a16="http://schemas.microsoft.com/office/drawing/2014/main" id="{96C5A4D1-42E7-474B-A83C-B2F37E8FFCF2}"/>
+              </a:ext>
+            </a:extLst>
+          </p:cNvPr>
+          <p:cNvPicPr>
+            <a:picLocks noChangeAspect="1"/>
+          </p:cNvPicPr>
+          <p:nvPr/>
+        </p:nvPicPr>
+        <p:blipFill>
+          <a:blip r:embed="rId3"/>
+          <a:stretch>
+            <a:fillRect/>
+          </a:stretch>
+        </p:blipFill>
+        <p:spPr>
+          <a:xfrm>
+            <a:off x="6390189" y="3320355"/>
+            <a:ext cx="5353797" cy="2305372"/>
+          </a:xfrm>
+          <a:prstGeom prst="rect">
+            <a:avLst/>
+          </a:prstGeom>
+        </p:spPr>
+      </p:pic>
+      <p:cxnSp>
+        <p:nvCxnSpPr>
+          <p:cNvPr id="16" name="Straight Arrow Connector 15">
+            <a:extLst>
+              <a:ext uri="{FF2B5EF4-FFF2-40B4-BE49-F238E27FC236}">
+                <a16:creationId xmlns:a16="http://schemas.microsoft.com/office/drawing/2014/main" id="{A33EF676-166C-4D9F-BF61-CED8F56560B3}"/>
+              </a:ext>
+            </a:extLst>
+          </p:cNvPr>
+          <p:cNvCxnSpPr>
+            <a:cxnSpLocks/>
+          </p:cNvCxnSpPr>
+          <p:nvPr/>
+        </p:nvCxnSpPr>
+        <p:spPr>
+          <a:xfrm flipV="1">
+            <a:off x="2204815" y="2392822"/>
+            <a:ext cx="4247260" cy="504202"/>
+          </a:xfrm>
+          <a:prstGeom prst="straightConnector1">
+            <a:avLst/>
+          </a:prstGeom>
+          <a:ln>
+            <a:tailEnd type="triangle"/>
+          </a:ln>
+        </p:spPr>
+        <p:style>
+          <a:lnRef idx="1">
+            <a:schemeClr val="accent1"/>
+          </a:lnRef>
+          <a:fillRef idx="0">
+            <a:schemeClr val="accent1"/>
+          </a:fillRef>
+          <a:effectRef idx="0">
+            <a:schemeClr val="accent1"/>
+          </a:effectRef>
+          <a:fontRef idx="minor">
+            <a:schemeClr val="tx1"/>
+          </a:fontRef>
+        </p:style>
+      </p:cxnSp>
+      <p:cxnSp>
+        <p:nvCxnSpPr>
+          <p:cNvPr id="18" name="Straight Arrow Connector 17">
+            <a:extLst>
+              <a:ext uri="{FF2B5EF4-FFF2-40B4-BE49-F238E27FC236}">
+                <a16:creationId xmlns:a16="http://schemas.microsoft.com/office/drawing/2014/main" id="{3E72094C-CC41-458F-83E4-A68E5790FE7B}"/>
+              </a:ext>
+            </a:extLst>
+          </p:cNvPr>
+          <p:cNvCxnSpPr/>
+          <p:nvPr/>
+        </p:nvCxnSpPr>
+        <p:spPr>
+          <a:xfrm>
+            <a:off x="2204815" y="2897024"/>
+            <a:ext cx="4247260" cy="1076770"/>
+          </a:xfrm>
+          <a:prstGeom prst="straightConnector1">
+            <a:avLst/>
+          </a:prstGeom>
+          <a:ln>
+            <a:tailEnd type="triangle"/>
+          </a:ln>
+        </p:spPr>
+        <p:style>
+          <a:lnRef idx="1">
+            <a:schemeClr val="accent1"/>
+          </a:lnRef>
+          <a:fillRef idx="0">
+            <a:schemeClr val="accent1"/>
+          </a:fillRef>
+          <a:effectRef idx="0">
+            <a:schemeClr val="accent1"/>
+          </a:effectRef>
+          <a:fontRef idx="minor">
+            <a:schemeClr val="tx1"/>
+          </a:fontRef>
+        </p:style>
+      </p:cxnSp>
+      <p:sp>
+        <p:nvSpPr>
+          <p:cNvPr id="20" name="Rectangle 19">
+            <a:extLst>
+              <a:ext uri="{FF2B5EF4-FFF2-40B4-BE49-F238E27FC236}">
+                <a16:creationId xmlns:a16="http://schemas.microsoft.com/office/drawing/2014/main" id="{21468C14-D739-4882-A475-799C024F19D4}"/>
+              </a:ext>
+            </a:extLst>
+          </p:cNvPr>
+          <p:cNvSpPr/>
+          <p:nvPr/>
+        </p:nvSpPr>
+        <p:spPr>
+          <a:xfrm>
+            <a:off x="6390189" y="871671"/>
+            <a:ext cx="5634272" cy="5236503"/>
+          </a:xfrm>
+          <a:prstGeom prst="rect">
+            <a:avLst/>
+          </a:prstGeom>
+          <a:solidFill>
+            <a:schemeClr val="accent3">
+              <a:alpha val="50000"/>
+            </a:schemeClr>
+          </a:solidFill>
+          <a:ln>
+            <a:noFill/>
+          </a:ln>
+        </p:spPr>
+        <p:style>
+          <a:lnRef idx="0">
+            <a:scrgbClr r="0" g="0" b="0"/>
+          </a:lnRef>
+          <a:fillRef idx="0">
+            <a:scrgbClr r="0" g="0" b="0"/>
+          </a:fillRef>
+          <a:effectRef idx="0">
+            <a:scrgbClr r="0" g="0" b="0"/>
+          </a:effectRef>
+          <a:fontRef idx="minor">
+            <a:schemeClr val="lt1"/>
+          </a:fontRef>
+        </p:style>
+        <p:txBody>
+          <a:bodyPr rtlCol="0" anchor="ctr"/>
+          <a:lstStyle/>
+          <a:p>
+            <a:pPr algn="ctr"/>
+            <a:endParaRPr lang="en-IN" dirty="0"/>
+          </a:p>
+        </p:txBody>
+      </p:sp>
+    </p:spTree>
+    <p:extLst>
+      <p:ext uri="{BB962C8B-B14F-4D97-AF65-F5344CB8AC3E}">
+        <p14:creationId xmlns:p14="http://schemas.microsoft.com/office/powerpoint/2010/main" val="1006148201"/>
+      </p:ext>
+    </p:extLst>
+  </p:cSld>
+  <p:clrMapOvr>
+    <a:masterClrMapping/>
+  </p:clrMapOvr>
+</p:sld>
+</file>
+
+<file path=ppt/slides/slide3.xml><?xml version="1.0" encoding="utf-8"?>
+<p:sld xmlns:a="http://schemas.openxmlformats.org/drawingml/2006/main" xmlns:r="http://schemas.openxmlformats.org/officeDocument/2006/relationships" xmlns:p="http://schemas.openxmlformats.org/presentationml/2006/main">
+  <p:cSld>
+    <p:spTree>
+      <p:nvGrpSpPr>
+        <p:cNvPr id="1" name=""/>
+        <p:cNvGrpSpPr/>
+        <p:nvPr/>
+      </p:nvGrpSpPr>
+      <p:grpSpPr>
+        <a:xfrm>
+          <a:off x="0" y="0"/>
+          <a:ext cx="0" cy="0"/>
+          <a:chOff x="0" y="0"/>
+          <a:chExt cx="0" cy="0"/>
+        </a:xfrm>
+      </p:grpSpPr>
+      <p:sp>
+        <p:nvSpPr>
+          <p:cNvPr id="6" name="Rectangle 5">
+            <a:extLst>
+              <a:ext uri="{FF2B5EF4-FFF2-40B4-BE49-F238E27FC236}">
+                <a16:creationId xmlns:a16="http://schemas.microsoft.com/office/drawing/2014/main" id="{23D9A284-E705-4058-BC97-E411758071E2}"/>
+              </a:ext>
+            </a:extLst>
+          </p:cNvPr>
+          <p:cNvSpPr/>
+          <p:nvPr/>
+        </p:nvSpPr>
+        <p:spPr>
+          <a:xfrm>
+            <a:off x="0" y="0"/>
+            <a:ext cx="12192000" cy="623843"/>
+          </a:xfrm>
+          <a:prstGeom prst="rect">
+            <a:avLst/>
+          </a:prstGeom>
+        </p:spPr>
+        <p:style>
+          <a:lnRef idx="2">
+            <a:schemeClr val="accent1">
+              <a:shade val="50000"/>
+            </a:schemeClr>
+          </a:lnRef>
+          <a:fillRef idx="1">
+            <a:schemeClr val="accent1"/>
+          </a:fillRef>
+          <a:effectRef idx="0">
+            <a:schemeClr val="accent1"/>
+          </a:effectRef>
+          <a:fontRef idx="minor">
+            <a:schemeClr val="lt1"/>
+          </a:fontRef>
+        </p:style>
+        <p:txBody>
+          <a:bodyPr rtlCol="0" anchor="ctr"/>
+          <a:lstStyle/>
+          <a:p>
+            <a:pPr algn="ctr"/>
+            <a:endParaRPr lang="en-IN" b="1" i="0" dirty="0">
+              <a:effectLst/>
+              <a:latin typeface="Nunito Sans" pitchFamily="2" charset="0"/>
+            </a:endParaRPr>
+          </a:p>
+          <a:p>
+            <a:pPr algn="ctr"/>
+            <a:r>
+              <a:rPr lang="en-US" b="1" dirty="0">
+                <a:latin typeface="Nunito Sans" pitchFamily="2" charset="0"/>
+              </a:rPr>
+              <a:t>Dynamic Programming - Methods</a:t>
+            </a:r>
+            <a:endParaRPr lang="en-IN" b="1" dirty="0">
+              <a:latin typeface="Nunito Sans" pitchFamily="2" charset="0"/>
+            </a:endParaRPr>
+          </a:p>
+          <a:p>
+            <a:pPr algn="ctr"/>
+            <a:endParaRPr lang="en-IN" dirty="0"/>
+          </a:p>
+        </p:txBody>
+      </p:sp>
+      <p:sp>
+        <p:nvSpPr>
+          <p:cNvPr id="9" name="Content Placeholder 7">
+            <a:extLst>
+              <a:ext uri="{FF2B5EF4-FFF2-40B4-BE49-F238E27FC236}">
+                <a16:creationId xmlns:a16="http://schemas.microsoft.com/office/drawing/2014/main" id="{A5D67D54-6D66-4C14-8EAC-A9B924086C06}"/>
+              </a:ext>
+            </a:extLst>
+          </p:cNvPr>
+          <p:cNvSpPr txBox="1">
+            <a:spLocks/>
+          </p:cNvSpPr>
+          <p:nvPr/>
+        </p:nvSpPr>
+        <p:spPr>
+          <a:xfrm>
+            <a:off x="222191" y="865841"/>
+            <a:ext cx="5873809" cy="5339650"/>
+          </a:xfrm>
+          <a:prstGeom prst="rect">
+            <a:avLst/>
+          </a:prstGeom>
+        </p:spPr>
+        <p:txBody>
+          <a:bodyPr vert="horz" lIns="91440" tIns="45720" rIns="91440" bIns="45720" rtlCol="0">
+            <a:normAutofit/>
+          </a:bodyPr>
+          <a:lstStyle>
+            <a:lvl1pPr marL="228600" indent="-228600" algn="l" defTabSz="914400" rtl="0" eaLnBrk="1" latinLnBrk="0" hangingPunct="1">
+              <a:lnSpc>
+                <a:spcPct val="90000"/>
+              </a:lnSpc>
+              <a:spcBef>
+                <a:spcPts val="1000"/>
+              </a:spcBef>
+              <a:buFont typeface="Arial" panose="020B0604020202020204" pitchFamily="34" charset="0"/>
+              <a:buChar char="•"/>
+              <a:defRPr sz="2800" kern="1200">
+                <a:solidFill>
+                  <a:schemeClr val="tx1"/>
+                </a:solidFill>
+                <a:latin typeface="+mn-lt"/>
+                <a:ea typeface="+mn-ea"/>
+                <a:cs typeface="+mn-cs"/>
+              </a:defRPr>
+            </a:lvl1pPr>
+            <a:lvl2pPr marL="685800" indent="-228600" algn="l" defTabSz="914400" rtl="0" eaLnBrk="1" latinLnBrk="0" hangingPunct="1">
+              <a:lnSpc>
+                <a:spcPct val="90000"/>
+              </a:lnSpc>
+              <a:spcBef>
+                <a:spcPts val="500"/>
+              </a:spcBef>
+              <a:buFont typeface="Arial" panose="020B0604020202020204" pitchFamily="34" charset="0"/>
+              <a:buChar char="•"/>
+              <a:defRPr sz="2400" kern="1200">
+                <a:solidFill>
+                  <a:schemeClr val="tx1"/>
+                </a:solidFill>
+                <a:latin typeface="+mn-lt"/>
+                <a:ea typeface="+mn-ea"/>
+                <a:cs typeface="+mn-cs"/>
+              </a:defRPr>
+            </a:lvl2pPr>
+            <a:lvl3pPr marL="1143000" indent="-228600" algn="l" defTabSz="914400" rtl="0" eaLnBrk="1" latinLnBrk="0" hangingPunct="1">
+              <a:lnSpc>
+                <a:spcPct val="90000"/>
+              </a:lnSpc>
+              <a:spcBef>
+                <a:spcPts val="500"/>
+              </a:spcBef>
+              <a:buFont typeface="Arial" panose="020B0604020202020204" pitchFamily="34" charset="0"/>
+              <a:buChar char="•"/>
+              <a:defRPr sz="2000" kern="1200">
+                <a:solidFill>
+                  <a:schemeClr val="tx1"/>
+                </a:solidFill>
+                <a:latin typeface="+mn-lt"/>
+                <a:ea typeface="+mn-ea"/>
+                <a:cs typeface="+mn-cs"/>
+              </a:defRPr>
+            </a:lvl3pPr>
+            <a:lvl4pPr marL="1600200" indent="-228600" algn="l" defTabSz="914400" rtl="0" eaLnBrk="1" latinLnBrk="0" hangingPunct="1">
+              <a:lnSpc>
+                <a:spcPct val="90000"/>
+              </a:lnSpc>
+              <a:spcBef>
+                <a:spcPts val="500"/>
+              </a:spcBef>
+              <a:buFont typeface="Arial" panose="020B0604020202020204" pitchFamily="34" charset="0"/>
+              <a:buChar char="•"/>
+              <a:defRPr sz="1800" kern="1200">
+                <a:solidFill>
+                  <a:schemeClr val="tx1"/>
+                </a:solidFill>
+                <a:latin typeface="+mn-lt"/>
+                <a:ea typeface="+mn-ea"/>
+                <a:cs typeface="+mn-cs"/>
+              </a:defRPr>
+            </a:lvl4pPr>
+            <a:lvl5pPr marL="2057400" indent="-228600" algn="l" defTabSz="914400" rtl="0" eaLnBrk="1" latinLnBrk="0" hangingPunct="1">
+              <a:lnSpc>
+                <a:spcPct val="90000"/>
+              </a:lnSpc>
+              <a:spcBef>
+                <a:spcPts val="500"/>
+              </a:spcBef>
+              <a:buFont typeface="Arial" panose="020B0604020202020204" pitchFamily="34" charset="0"/>
+              <a:buChar char="•"/>
+              <a:defRPr sz="1800" kern="1200">
+                <a:solidFill>
+                  <a:schemeClr val="tx1"/>
+                </a:solidFill>
+                <a:latin typeface="+mn-lt"/>
+                <a:ea typeface="+mn-ea"/>
+                <a:cs typeface="+mn-cs"/>
+              </a:defRPr>
+            </a:lvl5pPr>
+            <a:lvl6pPr marL="2514600" indent="-228600" algn="l" defTabSz="914400" rtl="0" eaLnBrk="1" latinLnBrk="0" hangingPunct="1">
+              <a:lnSpc>
+                <a:spcPct val="90000"/>
+              </a:lnSpc>
+              <a:spcBef>
+                <a:spcPts val="500"/>
+              </a:spcBef>
+              <a:buFont typeface="Arial" panose="020B0604020202020204" pitchFamily="34" charset="0"/>
+              <a:buChar char="•"/>
+              <a:defRPr sz="1800" kern="1200">
+                <a:solidFill>
+                  <a:schemeClr val="tx1"/>
+                </a:solidFill>
+                <a:latin typeface="+mn-lt"/>
+                <a:ea typeface="+mn-ea"/>
+                <a:cs typeface="+mn-cs"/>
+              </a:defRPr>
+            </a:lvl6pPr>
+            <a:lvl7pPr marL="2971800" indent="-228600" algn="l" defTabSz="914400" rtl="0" eaLnBrk="1" latinLnBrk="0" hangingPunct="1">
+              <a:lnSpc>
+                <a:spcPct val="90000"/>
+              </a:lnSpc>
+              <a:spcBef>
+                <a:spcPts val="500"/>
+              </a:spcBef>
+              <a:buFont typeface="Arial" panose="020B0604020202020204" pitchFamily="34" charset="0"/>
+              <a:buChar char="•"/>
+              <a:defRPr sz="1800" kern="1200">
+                <a:solidFill>
+                  <a:schemeClr val="tx1"/>
+                </a:solidFill>
+                <a:latin typeface="+mn-lt"/>
+                <a:ea typeface="+mn-ea"/>
+                <a:cs typeface="+mn-cs"/>
+              </a:defRPr>
+            </a:lvl7pPr>
+            <a:lvl8pPr marL="3429000" indent="-228600" algn="l" defTabSz="914400" rtl="0" eaLnBrk="1" latinLnBrk="0" hangingPunct="1">
+              <a:lnSpc>
+                <a:spcPct val="90000"/>
+              </a:lnSpc>
+              <a:spcBef>
+                <a:spcPts val="500"/>
+              </a:spcBef>
+              <a:buFont typeface="Arial" panose="020B0604020202020204" pitchFamily="34" charset="0"/>
+              <a:buChar char="•"/>
+              <a:defRPr sz="1800" kern="1200">
+                <a:solidFill>
+                  <a:schemeClr val="tx1"/>
+                </a:solidFill>
+                <a:latin typeface="+mn-lt"/>
+                <a:ea typeface="+mn-ea"/>
+                <a:cs typeface="+mn-cs"/>
+              </a:defRPr>
+            </a:lvl8pPr>
+            <a:lvl9pPr marL="3886200" indent="-228600" algn="l" defTabSz="914400" rtl="0" eaLnBrk="1" latinLnBrk="0" hangingPunct="1">
+              <a:lnSpc>
+                <a:spcPct val="90000"/>
+              </a:lnSpc>
+              <a:spcBef>
+                <a:spcPts val="500"/>
+              </a:spcBef>
+              <a:buFont typeface="Arial" panose="020B0604020202020204" pitchFamily="34" charset="0"/>
+              <a:buChar char="•"/>
+              <a:defRPr sz="1800" kern="1200">
+                <a:solidFill>
+                  <a:schemeClr val="tx1"/>
+                </a:solidFill>
+                <a:latin typeface="+mn-lt"/>
+                <a:ea typeface="+mn-ea"/>
+                <a:cs typeface="+mn-cs"/>
+              </a:defRPr>
+            </a:lvl9pPr>
+          </a:lstStyle>
+          <a:p>
+            <a:pPr marL="0" indent="0">
+              <a:buFont typeface="Arial" panose="020B0604020202020204" pitchFamily="34" charset="0"/>
+              <a:buNone/>
+            </a:pPr>
+            <a:r>
+              <a:rPr lang="en-US" sz="1000" dirty="0">
+                <a:solidFill>
+                  <a:srgbClr val="3D3D4E"/>
+                </a:solidFill>
+                <a:latin typeface="Century Gothic" panose="020B0502020202020204" pitchFamily="34" charset="0"/>
+              </a:rPr>
+              <a:t>DP offers two methods to solve a problem.</a:t>
+            </a:r>
+          </a:p>
+          <a:p>
+            <a:pPr marL="0" indent="0">
+              <a:buFont typeface="Arial" panose="020B0604020202020204" pitchFamily="34" charset="0"/>
+              <a:buNone/>
+            </a:pPr>
+            <a:r>
+              <a:rPr lang="en-US" sz="1000" b="1" i="0" dirty="0">
+                <a:solidFill>
+                  <a:srgbClr val="3D3D4E"/>
+                </a:solidFill>
+                <a:effectLst/>
+                <a:latin typeface="Century Gothic" panose="020B0502020202020204" pitchFamily="34" charset="0"/>
+              </a:rPr>
+              <a:t>Top</a:t>
+            </a:r>
+            <a:r>
+              <a:rPr lang="en-US" sz="1000" b="1" dirty="0">
+                <a:solidFill>
+                  <a:srgbClr val="3D3D4E"/>
+                </a:solidFill>
+                <a:latin typeface="Century Gothic" panose="020B0502020202020204" pitchFamily="34" charset="0"/>
+              </a:rPr>
+              <a:t>-down with Memorization – Approach 01</a:t>
+            </a:r>
+          </a:p>
+          <a:p>
+            <a:pPr marL="0" indent="0">
+              <a:buFont typeface="Arial" panose="020B0604020202020204" pitchFamily="34" charset="0"/>
+              <a:buNone/>
+            </a:pPr>
+            <a:r>
+              <a:rPr lang="en-US" sz="1000" b="0" i="0" dirty="0">
+                <a:solidFill>
+                  <a:srgbClr val="3D3D4E"/>
+                </a:solidFill>
+                <a:effectLst/>
+                <a:latin typeface="Century Gothic" panose="020B0502020202020204" pitchFamily="34" charset="0"/>
+              </a:rPr>
+              <a:t>In this approach, we will try to solve the bigger problem by recursively finding the solution to smaller sub-problems. And by the way this is the most realistic and practical approach to solve any complex problem.</a:t>
+            </a:r>
+          </a:p>
+          <a:p>
+            <a:pPr marL="0" indent="0">
+              <a:buFont typeface="Arial" panose="020B0604020202020204" pitchFamily="34" charset="0"/>
+              <a:buNone/>
+            </a:pPr>
+            <a:r>
+              <a:rPr lang="en-US" sz="1000" dirty="0">
+                <a:solidFill>
+                  <a:srgbClr val="3D3D4E"/>
+                </a:solidFill>
+                <a:latin typeface="Century Gothic" panose="020B0502020202020204" pitchFamily="34" charset="0"/>
+              </a:rPr>
+              <a:t>	whenever we solve sub problems, we will cache them for future re-use. While reusing the cached solution, our benefit is in avoiding the re-solution to the problem which is already solved.  </a:t>
+            </a:r>
+            <a:r>
+              <a:rPr lang="en-US" sz="1000" b="1" dirty="0">
+                <a:solidFill>
+                  <a:srgbClr val="3D3D4E"/>
+                </a:solidFill>
+                <a:highlight>
+                  <a:srgbClr val="FFFF00"/>
+                </a:highlight>
+                <a:latin typeface="Century Gothic" panose="020B0502020202020204" pitchFamily="34" charset="0"/>
+              </a:rPr>
+              <a:t>This approach is called Memorization.</a:t>
+            </a:r>
+          </a:p>
+          <a:p>
+            <a:pPr marL="0" indent="0">
+              <a:buFont typeface="Arial" panose="020B0604020202020204" pitchFamily="34" charset="0"/>
+              <a:buNone/>
+            </a:pPr>
+            <a:endParaRPr lang="en-US" sz="1000" dirty="0">
+              <a:solidFill>
+                <a:srgbClr val="3D3D4E"/>
+              </a:solidFill>
+              <a:latin typeface="Century Gothic" panose="020B0502020202020204" pitchFamily="34" charset="0"/>
+            </a:endParaRPr>
+          </a:p>
+          <a:p>
+            <a:pPr marL="0" indent="0">
+              <a:buFont typeface="Arial" panose="020B0604020202020204" pitchFamily="34" charset="0"/>
+              <a:buNone/>
+            </a:pPr>
+            <a:r>
+              <a:rPr lang="en-US" sz="1000" dirty="0">
+                <a:solidFill>
+                  <a:srgbClr val="3D3D4E"/>
+                </a:solidFill>
+                <a:latin typeface="Century Gothic" panose="020B0502020202020204" pitchFamily="34" charset="0"/>
+              </a:rPr>
+              <a:t>One Example of Fibonacci  - </a:t>
+            </a:r>
+          </a:p>
+          <a:p>
+            <a:pPr marL="0" indent="0">
+              <a:buFont typeface="Arial" panose="020B0604020202020204" pitchFamily="34" charset="0"/>
+              <a:buNone/>
+            </a:pPr>
+            <a:endParaRPr lang="en-US" sz="1000" dirty="0">
+              <a:solidFill>
+                <a:srgbClr val="3D3D4E"/>
+              </a:solidFill>
+              <a:latin typeface="Century Gothic" panose="020B0502020202020204" pitchFamily="34" charset="0"/>
+            </a:endParaRPr>
+          </a:p>
+          <a:p>
+            <a:pPr marL="0" indent="0">
+              <a:buFont typeface="Arial" panose="020B0604020202020204" pitchFamily="34" charset="0"/>
+              <a:buNone/>
+            </a:pPr>
+            <a:endParaRPr lang="en-US" sz="1000" b="0" i="0" dirty="0">
+              <a:solidFill>
+                <a:srgbClr val="3D3D4E"/>
+              </a:solidFill>
+              <a:effectLst/>
+              <a:latin typeface="Century Gothic" panose="020B0502020202020204" pitchFamily="34" charset="0"/>
+            </a:endParaRPr>
+          </a:p>
+          <a:p>
+            <a:pPr marL="0" indent="0">
+              <a:buFont typeface="Arial" panose="020B0604020202020204" pitchFamily="34" charset="0"/>
+              <a:buNone/>
+            </a:pPr>
+            <a:endParaRPr lang="en-US" sz="1000" b="1" i="0" dirty="0">
+              <a:solidFill>
+                <a:srgbClr val="3D3D4E"/>
+              </a:solidFill>
+              <a:effectLst/>
+              <a:latin typeface="Century Gothic" panose="020B0502020202020204" pitchFamily="34" charset="0"/>
+            </a:endParaRPr>
+          </a:p>
+          <a:p>
+            <a:pPr marL="0" indent="0">
+              <a:buFont typeface="Arial" panose="020B0604020202020204" pitchFamily="34" charset="0"/>
+              <a:buNone/>
+            </a:pPr>
+            <a:endParaRPr lang="en-US" sz="1000" b="1" dirty="0">
+              <a:solidFill>
+                <a:srgbClr val="3D3D4E"/>
+              </a:solidFill>
+              <a:latin typeface="Century Gothic" panose="020B0502020202020204" pitchFamily="34" charset="0"/>
+            </a:endParaRPr>
+          </a:p>
+          <a:p>
+            <a:pPr marL="0" indent="0">
+              <a:buFont typeface="Arial" panose="020B0604020202020204" pitchFamily="34" charset="0"/>
+              <a:buNone/>
+            </a:pPr>
+            <a:endParaRPr lang="en-US" sz="1000" i="0" dirty="0">
+              <a:solidFill>
+                <a:srgbClr val="3D3D4E"/>
+              </a:solidFill>
+              <a:effectLst/>
+              <a:latin typeface="Century Gothic" panose="020B0502020202020204" pitchFamily="34" charset="0"/>
+            </a:endParaRPr>
+          </a:p>
+          <a:p>
+            <a:pPr marL="0" indent="0">
+              <a:buFont typeface="Arial" panose="020B0604020202020204" pitchFamily="34" charset="0"/>
+              <a:buNone/>
+            </a:pPr>
+            <a:endParaRPr lang="en-US" sz="1000" i="0" dirty="0">
+              <a:effectLst/>
+              <a:latin typeface="Century Gothic" panose="020B0502020202020204" pitchFamily="34" charset="0"/>
+            </a:endParaRPr>
+          </a:p>
+        </p:txBody>
+      </p:sp>
+      <p:sp>
+        <p:nvSpPr>
+          <p:cNvPr id="2" name="Rectangle 1">
+            <a:extLst>
+              <a:ext uri="{FF2B5EF4-FFF2-40B4-BE49-F238E27FC236}">
+                <a16:creationId xmlns:a16="http://schemas.microsoft.com/office/drawing/2014/main" id="{92FC7832-74DA-4590-8BF7-CB38914B9190}"/>
+              </a:ext>
+            </a:extLst>
+          </p:cNvPr>
+          <p:cNvSpPr/>
+          <p:nvPr/>
+        </p:nvSpPr>
+        <p:spPr>
+          <a:xfrm>
+            <a:off x="101600" y="749826"/>
+            <a:ext cx="11977511" cy="5662263"/>
+          </a:xfrm>
+          <a:prstGeom prst="rect">
+            <a:avLst/>
+          </a:prstGeom>
+          <a:noFill/>
+          <a:ln w="9525" cap="flat" cmpd="sng" algn="ctr">
+            <a:solidFill>
+              <a:schemeClr val="accent3"/>
+            </a:solidFill>
+            <a:prstDash val="solid"/>
+            <a:round/>
+            <a:headEnd type="none" w="med" len="med"/>
+            <a:tailEnd type="none" w="med" len="med"/>
+          </a:ln>
+        </p:spPr>
+        <p:style>
+          <a:lnRef idx="0">
+            <a:scrgbClr r="0" g="0" b="0"/>
+          </a:lnRef>
+          <a:fillRef idx="0">
+            <a:scrgbClr r="0" g="0" b="0"/>
+          </a:fillRef>
+          <a:effectRef idx="0">
+            <a:scrgbClr r="0" g="0" b="0"/>
+          </a:effectRef>
+          <a:fontRef idx="minor">
+            <a:schemeClr val="accent3"/>
+          </a:fontRef>
+        </p:style>
+        <p:txBody>
+          <a:bodyPr rtlCol="0" anchor="ctr"/>
+          <a:lstStyle/>
+          <a:p>
+            <a:pPr algn="ctr"/>
+            <a:endParaRPr lang="en-IN"/>
+          </a:p>
+        </p:txBody>
+      </p:sp>
+      <p:sp>
+        <p:nvSpPr>
+          <p:cNvPr id="14" name="Rectangle 13">
+            <a:extLst>
+              <a:ext uri="{FF2B5EF4-FFF2-40B4-BE49-F238E27FC236}">
+                <a16:creationId xmlns:a16="http://schemas.microsoft.com/office/drawing/2014/main" id="{BFF4AF5A-1614-42BB-9A6E-09E3F18DA9BB}"/>
+              </a:ext>
+            </a:extLst>
+          </p:cNvPr>
+          <p:cNvSpPr/>
+          <p:nvPr/>
+        </p:nvSpPr>
+        <p:spPr>
+          <a:xfrm>
+            <a:off x="167539" y="871671"/>
+            <a:ext cx="5983111" cy="5349667"/>
+          </a:xfrm>
+          <a:prstGeom prst="rect">
+            <a:avLst/>
+          </a:prstGeom>
+          <a:noFill/>
+          <a:ln w="9525" cap="flat" cmpd="sng" algn="ctr">
+            <a:solidFill>
+              <a:schemeClr val="accent2"/>
+            </a:solidFill>
+            <a:prstDash val="solid"/>
+            <a:round/>
+            <a:headEnd type="none" w="med" len="med"/>
+            <a:tailEnd type="none" w="med" len="med"/>
+          </a:ln>
+        </p:spPr>
+        <p:style>
+          <a:lnRef idx="0">
+            <a:scrgbClr r="0" g="0" b="0"/>
+          </a:lnRef>
+          <a:fillRef idx="0">
+            <a:scrgbClr r="0" g="0" b="0"/>
+          </a:fillRef>
+          <a:effectRef idx="0">
+            <a:scrgbClr r="0" g="0" b="0"/>
+          </a:effectRef>
+          <a:fontRef idx="minor">
+            <a:schemeClr val="accent2"/>
+          </a:fontRef>
+        </p:style>
+        <p:txBody>
+          <a:bodyPr rtlCol="0" anchor="ctr"/>
+          <a:lstStyle/>
+          <a:p>
+            <a:pPr algn="ctr"/>
+            <a:endParaRPr lang="en-IN" dirty="0"/>
+          </a:p>
+        </p:txBody>
+      </p:sp>
+      <p:sp>
+        <p:nvSpPr>
+          <p:cNvPr id="3" name="TextBox 2">
+            <a:extLst>
+              <a:ext uri="{FF2B5EF4-FFF2-40B4-BE49-F238E27FC236}">
+                <a16:creationId xmlns:a16="http://schemas.microsoft.com/office/drawing/2014/main" id="{FDCD6AB8-1667-4C84-B01B-5732F6100B41}"/>
+              </a:ext>
+            </a:extLst>
+          </p:cNvPr>
+          <p:cNvSpPr txBox="1"/>
+          <p:nvPr/>
+        </p:nvSpPr>
+        <p:spPr>
+          <a:xfrm>
+            <a:off x="6452075" y="965675"/>
+            <a:ext cx="5230026" cy="646331"/>
+          </a:xfrm>
+          <a:prstGeom prst="rect">
+            <a:avLst/>
+          </a:prstGeom>
+          <a:noFill/>
+        </p:spPr>
+        <p:txBody>
+          <a:bodyPr wrap="square" rtlCol="0">
+            <a:spAutoFit/>
+          </a:bodyPr>
+          <a:lstStyle/>
+          <a:p>
+            <a:r>
+              <a:rPr lang="en-IN" dirty="0"/>
+              <a:t>Compare the two Approach</a:t>
+            </a:r>
+          </a:p>
+          <a:p>
+            <a:endParaRPr lang="en-IN" dirty="0"/>
+          </a:p>
+        </p:txBody>
+      </p:sp>
+      <p:pic>
+        <p:nvPicPr>
+          <p:cNvPr id="7" name="Picture 6">
+            <a:extLst>
+              <a:ext uri="{FF2B5EF4-FFF2-40B4-BE49-F238E27FC236}">
+                <a16:creationId xmlns:a16="http://schemas.microsoft.com/office/drawing/2014/main" id="{B26C98D5-E742-43B0-B681-09611502CE23}"/>
+              </a:ext>
+            </a:extLst>
+          </p:cNvPr>
+          <p:cNvPicPr>
+            <a:picLocks noChangeAspect="1"/>
+          </p:cNvPicPr>
+          <p:nvPr/>
+        </p:nvPicPr>
+        <p:blipFill>
+          <a:blip r:embed="rId2"/>
+          <a:stretch>
+            <a:fillRect/>
+          </a:stretch>
+        </p:blipFill>
+        <p:spPr>
+          <a:xfrm>
+            <a:off x="6271241" y="1379044"/>
+            <a:ext cx="5806274" cy="1878320"/>
+          </a:xfrm>
+          <a:prstGeom prst="rect">
+            <a:avLst/>
+          </a:prstGeom>
+        </p:spPr>
+      </p:pic>
+      <p:pic>
+        <p:nvPicPr>
+          <p:cNvPr id="10" name="Picture 9">
+            <a:extLst>
+              <a:ext uri="{FF2B5EF4-FFF2-40B4-BE49-F238E27FC236}">
+                <a16:creationId xmlns:a16="http://schemas.microsoft.com/office/drawing/2014/main" id="{96C5A4D1-42E7-474B-A83C-B2F37E8FFCF2}"/>
+              </a:ext>
+            </a:extLst>
+          </p:cNvPr>
+          <p:cNvPicPr>
+            <a:picLocks noChangeAspect="1"/>
+          </p:cNvPicPr>
+          <p:nvPr/>
+        </p:nvPicPr>
+        <p:blipFill>
+          <a:blip r:embed="rId3"/>
+          <a:stretch>
+            <a:fillRect/>
+          </a:stretch>
+        </p:blipFill>
+        <p:spPr>
+          <a:xfrm>
+            <a:off x="6390189" y="3320355"/>
+            <a:ext cx="5353797" cy="2305372"/>
+          </a:xfrm>
+          <a:prstGeom prst="rect">
+            <a:avLst/>
+          </a:prstGeom>
+        </p:spPr>
+      </p:pic>
+      <p:cxnSp>
+        <p:nvCxnSpPr>
+          <p:cNvPr id="16" name="Straight Arrow Connector 15">
+            <a:extLst>
+              <a:ext uri="{FF2B5EF4-FFF2-40B4-BE49-F238E27FC236}">
+                <a16:creationId xmlns:a16="http://schemas.microsoft.com/office/drawing/2014/main" id="{A33EF676-166C-4D9F-BF61-CED8F56560B3}"/>
+              </a:ext>
+            </a:extLst>
+          </p:cNvPr>
+          <p:cNvCxnSpPr>
+            <a:cxnSpLocks/>
+          </p:cNvCxnSpPr>
+          <p:nvPr/>
+        </p:nvCxnSpPr>
+        <p:spPr>
+          <a:xfrm flipV="1">
+            <a:off x="2204815" y="2392822"/>
+            <a:ext cx="4247260" cy="504202"/>
+          </a:xfrm>
+          <a:prstGeom prst="straightConnector1">
+            <a:avLst/>
+          </a:prstGeom>
+          <a:ln>
+            <a:tailEnd type="triangle"/>
+          </a:ln>
+        </p:spPr>
+        <p:style>
+          <a:lnRef idx="1">
+            <a:schemeClr val="accent1"/>
+          </a:lnRef>
+          <a:fillRef idx="0">
+            <a:schemeClr val="accent1"/>
+          </a:fillRef>
+          <a:effectRef idx="0">
+            <a:schemeClr val="accent1"/>
+          </a:effectRef>
+          <a:fontRef idx="minor">
+            <a:schemeClr val="tx1"/>
+          </a:fontRef>
+        </p:style>
+      </p:cxnSp>
+      <p:cxnSp>
+        <p:nvCxnSpPr>
+          <p:cNvPr id="18" name="Straight Arrow Connector 17">
+            <a:extLst>
+              <a:ext uri="{FF2B5EF4-FFF2-40B4-BE49-F238E27FC236}">
+                <a16:creationId xmlns:a16="http://schemas.microsoft.com/office/drawing/2014/main" id="{3E72094C-CC41-458F-83E4-A68E5790FE7B}"/>
+              </a:ext>
+            </a:extLst>
+          </p:cNvPr>
+          <p:cNvCxnSpPr/>
+          <p:nvPr/>
+        </p:nvCxnSpPr>
+        <p:spPr>
+          <a:xfrm>
+            <a:off x="2204815" y="2897024"/>
+            <a:ext cx="4247260" cy="1076770"/>
+          </a:xfrm>
+          <a:prstGeom prst="straightConnector1">
+            <a:avLst/>
+          </a:prstGeom>
+          <a:ln>
+            <a:tailEnd type="triangle"/>
+          </a:ln>
+        </p:spPr>
+        <p:style>
+          <a:lnRef idx="1">
+            <a:schemeClr val="accent1"/>
+          </a:lnRef>
+          <a:fillRef idx="0">
+            <a:schemeClr val="accent1"/>
+          </a:fillRef>
+          <a:effectRef idx="0">
+            <a:schemeClr val="accent1"/>
+          </a:effectRef>
+          <a:fontRef idx="minor">
+            <a:schemeClr val="tx1"/>
+          </a:fontRef>
+        </p:style>
+      </p:cxnSp>
+      <p:sp>
+        <p:nvSpPr>
+          <p:cNvPr id="20" name="Rectangle 19">
+            <a:extLst>
+              <a:ext uri="{FF2B5EF4-FFF2-40B4-BE49-F238E27FC236}">
+                <a16:creationId xmlns:a16="http://schemas.microsoft.com/office/drawing/2014/main" id="{21468C14-D739-4882-A475-799C024F19D4}"/>
+              </a:ext>
+            </a:extLst>
+          </p:cNvPr>
+          <p:cNvSpPr/>
+          <p:nvPr/>
+        </p:nvSpPr>
+        <p:spPr>
+          <a:xfrm>
+            <a:off x="6390189" y="871671"/>
+            <a:ext cx="5634272" cy="5236503"/>
+          </a:xfrm>
+          <a:prstGeom prst="rect">
+            <a:avLst/>
+          </a:prstGeom>
+          <a:solidFill>
+            <a:schemeClr val="accent3">
+              <a:alpha val="50000"/>
+            </a:schemeClr>
+          </a:solidFill>
+          <a:ln>
+            <a:noFill/>
+          </a:ln>
+        </p:spPr>
+        <p:style>
+          <a:lnRef idx="0">
+            <a:scrgbClr r="0" g="0" b="0"/>
+          </a:lnRef>
+          <a:fillRef idx="0">
+            <a:scrgbClr r="0" g="0" b="0"/>
+          </a:fillRef>
+          <a:effectRef idx="0">
+            <a:scrgbClr r="0" g="0" b="0"/>
+          </a:effectRef>
+          <a:fontRef idx="minor">
+            <a:schemeClr val="lt1"/>
+          </a:fontRef>
+        </p:style>
+        <p:txBody>
+          <a:bodyPr rtlCol="0" anchor="ctr"/>
+          <a:lstStyle/>
+          <a:p>
+            <a:pPr algn="ctr"/>
+            <a:endParaRPr lang="en-IN" dirty="0"/>
+          </a:p>
+        </p:txBody>
+      </p:sp>
+    </p:spTree>
+    <p:extLst>
+      <p:ext uri="{BB962C8B-B14F-4D97-AF65-F5344CB8AC3E}">
+        <p14:creationId xmlns:p14="http://schemas.microsoft.com/office/powerpoint/2010/main" val="2464749816"/>
       </p:ext>
     </p:extLst>
   </p:cSld>

</xml_diff>

<commit_message>
Added DP with memorization for Knapsack problem.
</commit_message>
<xml_diff>
--- a/Dynamic_Programming/Dynamic Programming.pptx
+++ b/Dynamic_Programming/Dynamic Programming.pptx
@@ -8,6 +8,7 @@
     <p:sldId id="257" r:id="rId2"/>
     <p:sldId id="258" r:id="rId3"/>
     <p:sldId id="259" r:id="rId4"/>
+    <p:sldId id="260" r:id="rId5"/>
   </p:sldIdLst>
   <p:sldSz cx="12192000" cy="6858000"/>
   <p:notesSz cx="6858000" cy="9144000"/>
@@ -114,6 +115,7 @@
             <p14:sldId id="257"/>
             <p14:sldId id="258"/>
             <p14:sldId id="259"/>
+            <p14:sldId id="260"/>
           </p14:sldIdLst>
         </p14:section>
       </p14:sectionLst>
@@ -5863,6 +5865,614 @@
 </p:sld>
 </file>
 
+<file path=ppt/slides/slide4.xml><?xml version="1.0" encoding="utf-8"?>
+<p:sld xmlns:a="http://schemas.openxmlformats.org/drawingml/2006/main" xmlns:r="http://schemas.openxmlformats.org/officeDocument/2006/relationships" xmlns:p="http://schemas.openxmlformats.org/presentationml/2006/main">
+  <p:cSld>
+    <p:spTree>
+      <p:nvGrpSpPr>
+        <p:cNvPr id="1" name=""/>
+        <p:cNvGrpSpPr/>
+        <p:nvPr/>
+      </p:nvGrpSpPr>
+      <p:grpSpPr>
+        <a:xfrm>
+          <a:off x="0" y="0"/>
+          <a:ext cx="0" cy="0"/>
+          <a:chOff x="0" y="0"/>
+          <a:chExt cx="0" cy="0"/>
+        </a:xfrm>
+      </p:grpSpPr>
+      <p:sp>
+        <p:nvSpPr>
+          <p:cNvPr id="6" name="Rectangle 5">
+            <a:extLst>
+              <a:ext uri="{FF2B5EF4-FFF2-40B4-BE49-F238E27FC236}">
+                <a16:creationId xmlns:a16="http://schemas.microsoft.com/office/drawing/2014/main" id="{23D9A284-E705-4058-BC97-E411758071E2}"/>
+              </a:ext>
+            </a:extLst>
+          </p:cNvPr>
+          <p:cNvSpPr/>
+          <p:nvPr/>
+        </p:nvSpPr>
+        <p:spPr>
+          <a:xfrm>
+            <a:off x="0" y="0"/>
+            <a:ext cx="12192000" cy="623843"/>
+          </a:xfrm>
+          <a:prstGeom prst="rect">
+            <a:avLst/>
+          </a:prstGeom>
+        </p:spPr>
+        <p:style>
+          <a:lnRef idx="2">
+            <a:schemeClr val="accent1">
+              <a:shade val="50000"/>
+            </a:schemeClr>
+          </a:lnRef>
+          <a:fillRef idx="1">
+            <a:schemeClr val="accent1"/>
+          </a:fillRef>
+          <a:effectRef idx="0">
+            <a:schemeClr val="accent1"/>
+          </a:effectRef>
+          <a:fontRef idx="minor">
+            <a:schemeClr val="lt1"/>
+          </a:fontRef>
+        </p:style>
+        <p:txBody>
+          <a:bodyPr rtlCol="0" anchor="ctr"/>
+          <a:lstStyle/>
+          <a:p>
+            <a:pPr algn="ctr"/>
+            <a:endParaRPr lang="en-IN" b="1" i="0" dirty="0">
+              <a:effectLst/>
+              <a:latin typeface="Nunito Sans" pitchFamily="2" charset="0"/>
+            </a:endParaRPr>
+          </a:p>
+          <a:p>
+            <a:pPr algn="ctr"/>
+            <a:r>
+              <a:rPr lang="en-US" b="1" dirty="0">
+                <a:latin typeface="Nunito Sans" pitchFamily="2" charset="0"/>
+              </a:rPr>
+              <a:t>Dynamic Programming – 0/1 Knapsack </a:t>
+            </a:r>
+            <a:endParaRPr lang="en-IN" b="1" dirty="0">
+              <a:latin typeface="Nunito Sans" pitchFamily="2" charset="0"/>
+            </a:endParaRPr>
+          </a:p>
+          <a:p>
+            <a:pPr algn="ctr"/>
+            <a:endParaRPr lang="en-IN" dirty="0"/>
+          </a:p>
+        </p:txBody>
+      </p:sp>
+      <p:sp>
+        <p:nvSpPr>
+          <p:cNvPr id="9" name="Content Placeholder 7">
+            <a:extLst>
+              <a:ext uri="{FF2B5EF4-FFF2-40B4-BE49-F238E27FC236}">
+                <a16:creationId xmlns:a16="http://schemas.microsoft.com/office/drawing/2014/main" id="{A5D67D54-6D66-4C14-8EAC-A9B924086C06}"/>
+              </a:ext>
+            </a:extLst>
+          </p:cNvPr>
+          <p:cNvSpPr txBox="1">
+            <a:spLocks/>
+          </p:cNvSpPr>
+          <p:nvPr/>
+        </p:nvSpPr>
+        <p:spPr>
+          <a:xfrm>
+            <a:off x="222191" y="865841"/>
+            <a:ext cx="5873809" cy="5339650"/>
+          </a:xfrm>
+          <a:prstGeom prst="rect">
+            <a:avLst/>
+          </a:prstGeom>
+        </p:spPr>
+        <p:txBody>
+          <a:bodyPr vert="horz" lIns="91440" tIns="45720" rIns="91440" bIns="45720" rtlCol="0">
+            <a:normAutofit/>
+          </a:bodyPr>
+          <a:lstStyle>
+            <a:lvl1pPr marL="228600" indent="-228600" algn="l" defTabSz="914400" rtl="0" eaLnBrk="1" latinLnBrk="0" hangingPunct="1">
+              <a:lnSpc>
+                <a:spcPct val="90000"/>
+              </a:lnSpc>
+              <a:spcBef>
+                <a:spcPts val="1000"/>
+              </a:spcBef>
+              <a:buFont typeface="Arial" panose="020B0604020202020204" pitchFamily="34" charset="0"/>
+              <a:buChar char="•"/>
+              <a:defRPr sz="2800" kern="1200">
+                <a:solidFill>
+                  <a:schemeClr val="tx1"/>
+                </a:solidFill>
+                <a:latin typeface="+mn-lt"/>
+                <a:ea typeface="+mn-ea"/>
+                <a:cs typeface="+mn-cs"/>
+              </a:defRPr>
+            </a:lvl1pPr>
+            <a:lvl2pPr marL="685800" indent="-228600" algn="l" defTabSz="914400" rtl="0" eaLnBrk="1" latinLnBrk="0" hangingPunct="1">
+              <a:lnSpc>
+                <a:spcPct val="90000"/>
+              </a:lnSpc>
+              <a:spcBef>
+                <a:spcPts val="500"/>
+              </a:spcBef>
+              <a:buFont typeface="Arial" panose="020B0604020202020204" pitchFamily="34" charset="0"/>
+              <a:buChar char="•"/>
+              <a:defRPr sz="2400" kern="1200">
+                <a:solidFill>
+                  <a:schemeClr val="tx1"/>
+                </a:solidFill>
+                <a:latin typeface="+mn-lt"/>
+                <a:ea typeface="+mn-ea"/>
+                <a:cs typeface="+mn-cs"/>
+              </a:defRPr>
+            </a:lvl2pPr>
+            <a:lvl3pPr marL="1143000" indent="-228600" algn="l" defTabSz="914400" rtl="0" eaLnBrk="1" latinLnBrk="0" hangingPunct="1">
+              <a:lnSpc>
+                <a:spcPct val="90000"/>
+              </a:lnSpc>
+              <a:spcBef>
+                <a:spcPts val="500"/>
+              </a:spcBef>
+              <a:buFont typeface="Arial" panose="020B0604020202020204" pitchFamily="34" charset="0"/>
+              <a:buChar char="•"/>
+              <a:defRPr sz="2000" kern="1200">
+                <a:solidFill>
+                  <a:schemeClr val="tx1"/>
+                </a:solidFill>
+                <a:latin typeface="+mn-lt"/>
+                <a:ea typeface="+mn-ea"/>
+                <a:cs typeface="+mn-cs"/>
+              </a:defRPr>
+            </a:lvl3pPr>
+            <a:lvl4pPr marL="1600200" indent="-228600" algn="l" defTabSz="914400" rtl="0" eaLnBrk="1" latinLnBrk="0" hangingPunct="1">
+              <a:lnSpc>
+                <a:spcPct val="90000"/>
+              </a:lnSpc>
+              <a:spcBef>
+                <a:spcPts val="500"/>
+              </a:spcBef>
+              <a:buFont typeface="Arial" panose="020B0604020202020204" pitchFamily="34" charset="0"/>
+              <a:buChar char="•"/>
+              <a:defRPr sz="1800" kern="1200">
+                <a:solidFill>
+                  <a:schemeClr val="tx1"/>
+                </a:solidFill>
+                <a:latin typeface="+mn-lt"/>
+                <a:ea typeface="+mn-ea"/>
+                <a:cs typeface="+mn-cs"/>
+              </a:defRPr>
+            </a:lvl4pPr>
+            <a:lvl5pPr marL="2057400" indent="-228600" algn="l" defTabSz="914400" rtl="0" eaLnBrk="1" latinLnBrk="0" hangingPunct="1">
+              <a:lnSpc>
+                <a:spcPct val="90000"/>
+              </a:lnSpc>
+              <a:spcBef>
+                <a:spcPts val="500"/>
+              </a:spcBef>
+              <a:buFont typeface="Arial" panose="020B0604020202020204" pitchFamily="34" charset="0"/>
+              <a:buChar char="•"/>
+              <a:defRPr sz="1800" kern="1200">
+                <a:solidFill>
+                  <a:schemeClr val="tx1"/>
+                </a:solidFill>
+                <a:latin typeface="+mn-lt"/>
+                <a:ea typeface="+mn-ea"/>
+                <a:cs typeface="+mn-cs"/>
+              </a:defRPr>
+            </a:lvl5pPr>
+            <a:lvl6pPr marL="2514600" indent="-228600" algn="l" defTabSz="914400" rtl="0" eaLnBrk="1" latinLnBrk="0" hangingPunct="1">
+              <a:lnSpc>
+                <a:spcPct val="90000"/>
+              </a:lnSpc>
+              <a:spcBef>
+                <a:spcPts val="500"/>
+              </a:spcBef>
+              <a:buFont typeface="Arial" panose="020B0604020202020204" pitchFamily="34" charset="0"/>
+              <a:buChar char="•"/>
+              <a:defRPr sz="1800" kern="1200">
+                <a:solidFill>
+                  <a:schemeClr val="tx1"/>
+                </a:solidFill>
+                <a:latin typeface="+mn-lt"/>
+                <a:ea typeface="+mn-ea"/>
+                <a:cs typeface="+mn-cs"/>
+              </a:defRPr>
+            </a:lvl6pPr>
+            <a:lvl7pPr marL="2971800" indent="-228600" algn="l" defTabSz="914400" rtl="0" eaLnBrk="1" latinLnBrk="0" hangingPunct="1">
+              <a:lnSpc>
+                <a:spcPct val="90000"/>
+              </a:lnSpc>
+              <a:spcBef>
+                <a:spcPts val="500"/>
+              </a:spcBef>
+              <a:buFont typeface="Arial" panose="020B0604020202020204" pitchFamily="34" charset="0"/>
+              <a:buChar char="•"/>
+              <a:defRPr sz="1800" kern="1200">
+                <a:solidFill>
+                  <a:schemeClr val="tx1"/>
+                </a:solidFill>
+                <a:latin typeface="+mn-lt"/>
+                <a:ea typeface="+mn-ea"/>
+                <a:cs typeface="+mn-cs"/>
+              </a:defRPr>
+            </a:lvl7pPr>
+            <a:lvl8pPr marL="3429000" indent="-228600" algn="l" defTabSz="914400" rtl="0" eaLnBrk="1" latinLnBrk="0" hangingPunct="1">
+              <a:lnSpc>
+                <a:spcPct val="90000"/>
+              </a:lnSpc>
+              <a:spcBef>
+                <a:spcPts val="500"/>
+              </a:spcBef>
+              <a:buFont typeface="Arial" panose="020B0604020202020204" pitchFamily="34" charset="0"/>
+              <a:buChar char="•"/>
+              <a:defRPr sz="1800" kern="1200">
+                <a:solidFill>
+                  <a:schemeClr val="tx1"/>
+                </a:solidFill>
+                <a:latin typeface="+mn-lt"/>
+                <a:ea typeface="+mn-ea"/>
+                <a:cs typeface="+mn-cs"/>
+              </a:defRPr>
+            </a:lvl8pPr>
+            <a:lvl9pPr marL="3886200" indent="-228600" algn="l" defTabSz="914400" rtl="0" eaLnBrk="1" latinLnBrk="0" hangingPunct="1">
+              <a:lnSpc>
+                <a:spcPct val="90000"/>
+              </a:lnSpc>
+              <a:spcBef>
+                <a:spcPts val="500"/>
+              </a:spcBef>
+              <a:buFont typeface="Arial" panose="020B0604020202020204" pitchFamily="34" charset="0"/>
+              <a:buChar char="•"/>
+              <a:defRPr sz="1800" kern="1200">
+                <a:solidFill>
+                  <a:schemeClr val="tx1"/>
+                </a:solidFill>
+                <a:latin typeface="+mn-lt"/>
+                <a:ea typeface="+mn-ea"/>
+                <a:cs typeface="+mn-cs"/>
+              </a:defRPr>
+            </a:lvl9pPr>
+          </a:lstStyle>
+          <a:p>
+            <a:pPr marL="0" indent="0">
+              <a:buFont typeface="Arial" panose="020B0604020202020204" pitchFamily="34" charset="0"/>
+              <a:buNone/>
+            </a:pPr>
+            <a:r>
+              <a:rPr lang="en-US" sz="1000" b="0" i="0" dirty="0">
+                <a:solidFill>
+                  <a:srgbClr val="3D3D4E"/>
+                </a:solidFill>
+                <a:effectLst/>
+                <a:latin typeface="Century Gothic" panose="020B0502020202020204" pitchFamily="34" charset="0"/>
+              </a:rPr>
+              <a:t>0/1 Knapsac</a:t>
+            </a:r>
+            <a:r>
+              <a:rPr lang="en-US" sz="1000" dirty="0">
+                <a:solidFill>
+                  <a:srgbClr val="3D3D4E"/>
+                </a:solidFill>
+                <a:latin typeface="Century Gothic" panose="020B0502020202020204" pitchFamily="34" charset="0"/>
+              </a:rPr>
+              <a:t>k Problem</a:t>
+            </a:r>
+          </a:p>
+          <a:p>
+            <a:pPr marL="0" indent="0">
+              <a:spcBef>
+                <a:spcPts val="0"/>
+              </a:spcBef>
+              <a:buNone/>
+            </a:pPr>
+            <a:endParaRPr lang="en-IN" sz="1000" b="1" i="0" dirty="0">
+              <a:effectLst/>
+              <a:latin typeface="Century Gothic" panose="020B0502020202020204" pitchFamily="34" charset="0"/>
+            </a:endParaRPr>
+          </a:p>
+          <a:p>
+            <a:pPr marL="0" indent="0">
+              <a:spcBef>
+                <a:spcPts val="0"/>
+              </a:spcBef>
+              <a:buNone/>
+            </a:pPr>
+            <a:r>
+              <a:rPr lang="en-IN" sz="1000" b="1" i="0" dirty="0">
+                <a:effectLst/>
+                <a:latin typeface="Century Gothic" panose="020B0502020202020204" pitchFamily="34" charset="0"/>
+              </a:rPr>
+              <a:t>Problem Statement</a:t>
+            </a:r>
+          </a:p>
+          <a:p>
+            <a:pPr marL="0" indent="0">
+              <a:spcBef>
+                <a:spcPts val="0"/>
+              </a:spcBef>
+              <a:buNone/>
+            </a:pPr>
+            <a:endParaRPr lang="en-IN" sz="1000" b="1" i="0" dirty="0">
+              <a:effectLst/>
+              <a:latin typeface="Century Gothic" panose="020B0502020202020204" pitchFamily="34" charset="0"/>
+            </a:endParaRPr>
+          </a:p>
+          <a:p>
+            <a:pPr marL="0" indent="0">
+              <a:spcBef>
+                <a:spcPts val="0"/>
+              </a:spcBef>
+              <a:buNone/>
+            </a:pPr>
+            <a:r>
+              <a:rPr lang="en-US" sz="1000" b="0" i="0" dirty="0">
+                <a:solidFill>
+                  <a:srgbClr val="3D3D4E"/>
+                </a:solidFill>
+                <a:effectLst/>
+                <a:latin typeface="Century Gothic" panose="020B0502020202020204" pitchFamily="34" charset="0"/>
+              </a:rPr>
+              <a:t>Given two integer arrays to represent weights and profits of ‘N’ items, we need to find a subset of these items which will give us maximum profit such that their cumulative weight is not more than a given number ‘C’.</a:t>
+            </a:r>
+          </a:p>
+          <a:p>
+            <a:pPr marL="0" indent="0">
+              <a:spcBef>
+                <a:spcPts val="600"/>
+              </a:spcBef>
+              <a:buFont typeface="Arial" panose="020B0604020202020204" pitchFamily="34" charset="0"/>
+              <a:buNone/>
+            </a:pPr>
+            <a:r>
+              <a:rPr lang="en-US" sz="1000" b="0" i="0" dirty="0">
+                <a:solidFill>
+                  <a:srgbClr val="3D3D4E"/>
+                </a:solidFill>
+                <a:effectLst/>
+                <a:latin typeface="Century Gothic" panose="020B0502020202020204" pitchFamily="34" charset="0"/>
+              </a:rPr>
+              <a:t>Write a function that returns the maximum profit.</a:t>
+            </a:r>
+          </a:p>
+          <a:p>
+            <a:pPr marL="0" indent="0">
+              <a:spcBef>
+                <a:spcPts val="600"/>
+              </a:spcBef>
+              <a:buFont typeface="Arial" panose="020B0604020202020204" pitchFamily="34" charset="0"/>
+              <a:buNone/>
+            </a:pPr>
+            <a:r>
+              <a:rPr lang="en-US" sz="1000" b="0" i="0" dirty="0">
+                <a:solidFill>
+                  <a:srgbClr val="3D3D4E"/>
+                </a:solidFill>
+                <a:effectLst/>
+                <a:latin typeface="Century Gothic" panose="020B0502020202020204" pitchFamily="34" charset="0"/>
+              </a:rPr>
+              <a:t>Each item can only be selected once, which means either we put an item in the knapsack or skip it.</a:t>
+            </a:r>
+          </a:p>
+          <a:p>
+            <a:pPr marL="0" indent="0">
+              <a:spcBef>
+                <a:spcPts val="600"/>
+              </a:spcBef>
+              <a:buFont typeface="Arial" panose="020B0604020202020204" pitchFamily="34" charset="0"/>
+              <a:buNone/>
+            </a:pPr>
+            <a:endParaRPr lang="en-US" sz="1000">
+              <a:solidFill>
+                <a:srgbClr val="3D3D4E"/>
+              </a:solidFill>
+              <a:latin typeface="Century Gothic" panose="020B0502020202020204" pitchFamily="34" charset="0"/>
+            </a:endParaRPr>
+          </a:p>
+          <a:p>
+            <a:pPr marL="0" indent="0">
+              <a:spcBef>
+                <a:spcPts val="600"/>
+              </a:spcBef>
+              <a:buFont typeface="Arial" panose="020B0604020202020204" pitchFamily="34" charset="0"/>
+              <a:buNone/>
+            </a:pPr>
+            <a:endParaRPr lang="en-US" sz="1000" b="1" i="0" dirty="0">
+              <a:solidFill>
+                <a:srgbClr val="3D3D4E"/>
+              </a:solidFill>
+              <a:effectLst/>
+              <a:latin typeface="Century Gothic" panose="020B0502020202020204" pitchFamily="34" charset="0"/>
+            </a:endParaRPr>
+          </a:p>
+          <a:p>
+            <a:pPr marL="0" indent="0">
+              <a:buFont typeface="Arial" panose="020B0604020202020204" pitchFamily="34" charset="0"/>
+              <a:buNone/>
+            </a:pPr>
+            <a:endParaRPr lang="en-US" sz="1000" b="1" i="0" dirty="0">
+              <a:solidFill>
+                <a:srgbClr val="3D3D4E"/>
+              </a:solidFill>
+              <a:effectLst/>
+              <a:latin typeface="Century Gothic" panose="020B0502020202020204" pitchFamily="34" charset="0"/>
+            </a:endParaRPr>
+          </a:p>
+          <a:p>
+            <a:pPr marL="0" indent="0">
+              <a:buFont typeface="Arial" panose="020B0604020202020204" pitchFamily="34" charset="0"/>
+              <a:buNone/>
+            </a:pPr>
+            <a:endParaRPr lang="en-US" sz="1000" b="1" i="0" dirty="0">
+              <a:solidFill>
+                <a:srgbClr val="3D3D4E"/>
+              </a:solidFill>
+              <a:effectLst/>
+              <a:latin typeface="Century Gothic" panose="020B0502020202020204" pitchFamily="34" charset="0"/>
+            </a:endParaRPr>
+          </a:p>
+          <a:p>
+            <a:pPr marL="0" indent="0">
+              <a:buFont typeface="Arial" panose="020B0604020202020204" pitchFamily="34" charset="0"/>
+              <a:buNone/>
+            </a:pPr>
+            <a:endParaRPr lang="en-US" sz="1000" b="1" dirty="0">
+              <a:solidFill>
+                <a:srgbClr val="3D3D4E"/>
+              </a:solidFill>
+              <a:latin typeface="Century Gothic" panose="020B0502020202020204" pitchFamily="34" charset="0"/>
+            </a:endParaRPr>
+          </a:p>
+          <a:p>
+            <a:pPr marL="0" indent="0">
+              <a:buFont typeface="Arial" panose="020B0604020202020204" pitchFamily="34" charset="0"/>
+              <a:buNone/>
+            </a:pPr>
+            <a:endParaRPr lang="en-US" sz="1000" i="0" dirty="0">
+              <a:solidFill>
+                <a:srgbClr val="3D3D4E"/>
+              </a:solidFill>
+              <a:effectLst/>
+              <a:latin typeface="Century Gothic" panose="020B0502020202020204" pitchFamily="34" charset="0"/>
+            </a:endParaRPr>
+          </a:p>
+          <a:p>
+            <a:pPr marL="0" indent="0">
+              <a:buFont typeface="Arial" panose="020B0604020202020204" pitchFamily="34" charset="0"/>
+              <a:buNone/>
+            </a:pPr>
+            <a:endParaRPr lang="en-US" sz="1000" i="0" dirty="0">
+              <a:effectLst/>
+              <a:latin typeface="Century Gothic" panose="020B0502020202020204" pitchFamily="34" charset="0"/>
+            </a:endParaRPr>
+          </a:p>
+        </p:txBody>
+      </p:sp>
+      <p:sp>
+        <p:nvSpPr>
+          <p:cNvPr id="2" name="Rectangle 1">
+            <a:extLst>
+              <a:ext uri="{FF2B5EF4-FFF2-40B4-BE49-F238E27FC236}">
+                <a16:creationId xmlns:a16="http://schemas.microsoft.com/office/drawing/2014/main" id="{92FC7832-74DA-4590-8BF7-CB38914B9190}"/>
+              </a:ext>
+            </a:extLst>
+          </p:cNvPr>
+          <p:cNvSpPr/>
+          <p:nvPr/>
+        </p:nvSpPr>
+        <p:spPr>
+          <a:xfrm>
+            <a:off x="101600" y="749826"/>
+            <a:ext cx="11977511" cy="5662263"/>
+          </a:xfrm>
+          <a:prstGeom prst="rect">
+            <a:avLst/>
+          </a:prstGeom>
+          <a:noFill/>
+          <a:ln w="9525" cap="flat" cmpd="sng" algn="ctr">
+            <a:solidFill>
+              <a:schemeClr val="accent3"/>
+            </a:solidFill>
+            <a:prstDash val="solid"/>
+            <a:round/>
+            <a:headEnd type="none" w="med" len="med"/>
+            <a:tailEnd type="none" w="med" len="med"/>
+          </a:ln>
+        </p:spPr>
+        <p:style>
+          <a:lnRef idx="0">
+            <a:scrgbClr r="0" g="0" b="0"/>
+          </a:lnRef>
+          <a:fillRef idx="0">
+            <a:scrgbClr r="0" g="0" b="0"/>
+          </a:fillRef>
+          <a:effectRef idx="0">
+            <a:scrgbClr r="0" g="0" b="0"/>
+          </a:effectRef>
+          <a:fontRef idx="minor">
+            <a:schemeClr val="accent3"/>
+          </a:fontRef>
+        </p:style>
+        <p:txBody>
+          <a:bodyPr rtlCol="0" anchor="ctr"/>
+          <a:lstStyle/>
+          <a:p>
+            <a:pPr algn="ctr"/>
+            <a:endParaRPr lang="en-IN"/>
+          </a:p>
+        </p:txBody>
+      </p:sp>
+      <p:sp>
+        <p:nvSpPr>
+          <p:cNvPr id="14" name="Rectangle 13">
+            <a:extLst>
+              <a:ext uri="{FF2B5EF4-FFF2-40B4-BE49-F238E27FC236}">
+                <a16:creationId xmlns:a16="http://schemas.microsoft.com/office/drawing/2014/main" id="{BFF4AF5A-1614-42BB-9A6E-09E3F18DA9BB}"/>
+              </a:ext>
+            </a:extLst>
+          </p:cNvPr>
+          <p:cNvSpPr/>
+          <p:nvPr/>
+        </p:nvSpPr>
+        <p:spPr>
+          <a:xfrm>
+            <a:off x="167539" y="871671"/>
+            <a:ext cx="5983111" cy="5349667"/>
+          </a:xfrm>
+          <a:prstGeom prst="rect">
+            <a:avLst/>
+          </a:prstGeom>
+          <a:noFill/>
+          <a:ln w="9525" cap="flat" cmpd="sng" algn="ctr">
+            <a:solidFill>
+              <a:schemeClr val="accent2"/>
+            </a:solidFill>
+            <a:prstDash val="solid"/>
+            <a:round/>
+            <a:headEnd type="none" w="med" len="med"/>
+            <a:tailEnd type="none" w="med" len="med"/>
+          </a:ln>
+        </p:spPr>
+        <p:style>
+          <a:lnRef idx="0">
+            <a:scrgbClr r="0" g="0" b="0"/>
+          </a:lnRef>
+          <a:fillRef idx="0">
+            <a:scrgbClr r="0" g="0" b="0"/>
+          </a:fillRef>
+          <a:effectRef idx="0">
+            <a:scrgbClr r="0" g="0" b="0"/>
+          </a:effectRef>
+          <a:fontRef idx="minor">
+            <a:schemeClr val="accent2"/>
+          </a:fontRef>
+        </p:style>
+        <p:txBody>
+          <a:bodyPr rtlCol="0" anchor="ctr"/>
+          <a:lstStyle/>
+          <a:p>
+            <a:pPr algn="ctr"/>
+            <a:endParaRPr lang="en-IN" dirty="0"/>
+          </a:p>
+        </p:txBody>
+      </p:sp>
+    </p:spTree>
+    <p:extLst>
+      <p:ext uri="{BB962C8B-B14F-4D97-AF65-F5344CB8AC3E}">
+        <p14:creationId xmlns:p14="http://schemas.microsoft.com/office/powerpoint/2010/main" val="3833513691"/>
+      </p:ext>
+    </p:extLst>
+  </p:cSld>
+  <p:clrMapOvr>
+    <a:masterClrMapping/>
+  </p:clrMapOvr>
+</p:sld>
+</file>
+
 <file path=ppt/theme/theme1.xml><?xml version="1.0" encoding="utf-8"?>
 <a:theme xmlns:a="http://schemas.openxmlformats.org/drawingml/2006/main" name="Office Theme">
   <a:themeElements>

</xml_diff>

<commit_message>
pushing to repositories of intermediate files
</commit_message>
<xml_diff>
--- a/Dynamic_Programming/Dynamic Programming.pptx
+++ b/Dynamic_Programming/Dynamic Programming.pptx
@@ -5970,6 +5970,20 @@
             <a:avLst/>
           </a:prstGeom>
         </p:spPr>
+        <p:style>
+          <a:lnRef idx="2">
+            <a:schemeClr val="accent1"/>
+          </a:lnRef>
+          <a:fillRef idx="1">
+            <a:schemeClr val="lt1"/>
+          </a:fillRef>
+          <a:effectRef idx="0">
+            <a:schemeClr val="accent1"/>
+          </a:effectRef>
+          <a:fontRef idx="minor">
+            <a:schemeClr val="dk1"/>
+          </a:fontRef>
+        </p:style>
         <p:txBody>
           <a:bodyPr vert="horz" lIns="91440" tIns="45720" rIns="91440" bIns="45720" rtlCol="0">
             <a:normAutofit/>
@@ -6266,12 +6280,93 @@
               <a:buFont typeface="Arial" panose="020B0604020202020204" pitchFamily="34" charset="0"/>
               <a:buNone/>
             </a:pPr>
-            <a:endParaRPr lang="en-US" sz="1000">
+            <a:endParaRPr lang="en-US" sz="1000" dirty="0">
               <a:solidFill>
                 <a:srgbClr val="3D3D4E"/>
               </a:solidFill>
               <a:latin typeface="Century Gothic" panose="020B0502020202020204" pitchFamily="34" charset="0"/>
             </a:endParaRPr>
+          </a:p>
+          <a:p>
+            <a:pPr marL="0" indent="0">
+              <a:spcBef>
+                <a:spcPts val="600"/>
+              </a:spcBef>
+              <a:buFont typeface="Arial" panose="020B0604020202020204" pitchFamily="34" charset="0"/>
+              <a:buNone/>
+            </a:pPr>
+            <a:r>
+              <a:rPr lang="en-US" sz="1000" dirty="0">
+                <a:solidFill>
+                  <a:srgbClr val="3D3D4E"/>
+                </a:solidFill>
+                <a:latin typeface="Century Gothic" panose="020B0502020202020204" pitchFamily="34" charset="0"/>
+              </a:rPr>
+              <a:t>Approach 01 : Memorization</a:t>
+            </a:r>
+          </a:p>
+          <a:p>
+            <a:pPr marL="0" indent="0">
+              <a:spcBef>
+                <a:spcPts val="600"/>
+              </a:spcBef>
+              <a:buFont typeface="Arial" panose="020B0604020202020204" pitchFamily="34" charset="0"/>
+              <a:buNone/>
+            </a:pPr>
+            <a:endParaRPr lang="en-US" sz="1000" dirty="0">
+              <a:solidFill>
+                <a:srgbClr val="3D3D4E"/>
+              </a:solidFill>
+              <a:latin typeface="Century Gothic" panose="020B0502020202020204" pitchFamily="34" charset="0"/>
+            </a:endParaRPr>
+          </a:p>
+          <a:p>
+            <a:pPr marL="0" indent="0">
+              <a:spcBef>
+                <a:spcPts val="600"/>
+              </a:spcBef>
+              <a:buFont typeface="Arial" panose="020B0604020202020204" pitchFamily="34" charset="0"/>
+              <a:buNone/>
+            </a:pPr>
+            <a:endParaRPr lang="en-US" sz="1000" dirty="0">
+              <a:solidFill>
+                <a:srgbClr val="3D3D4E"/>
+              </a:solidFill>
+              <a:latin typeface="Century Gothic" panose="020B0502020202020204" pitchFamily="34" charset="0"/>
+            </a:endParaRPr>
+          </a:p>
+          <a:p>
+            <a:pPr marL="0" indent="0">
+              <a:spcBef>
+                <a:spcPts val="600"/>
+              </a:spcBef>
+              <a:buFont typeface="Arial" panose="020B0604020202020204" pitchFamily="34" charset="0"/>
+              <a:buNone/>
+            </a:pPr>
+            <a:endParaRPr lang="en-US" sz="1000" dirty="0">
+              <a:solidFill>
+                <a:srgbClr val="3D3D4E"/>
+              </a:solidFill>
+              <a:latin typeface="Century Gothic" panose="020B0502020202020204" pitchFamily="34" charset="0"/>
+            </a:endParaRPr>
+          </a:p>
+          <a:p>
+            <a:pPr marL="0" indent="0">
+              <a:spcBef>
+                <a:spcPts val="600"/>
+              </a:spcBef>
+              <a:buFont typeface="Arial" panose="020B0604020202020204" pitchFamily="34" charset="0"/>
+              <a:buNone/>
+            </a:pPr>
+            <a:r>
+              <a:rPr lang="en-US" sz="1000" dirty="0">
+                <a:solidFill>
+                  <a:srgbClr val="3D3D4E"/>
+                </a:solidFill>
+                <a:latin typeface="Century Gothic" panose="020B0502020202020204" pitchFamily="34" charset="0"/>
+              </a:rPr>
+              <a:t>Approach 02 : Tabulation</a:t>
+            </a:r>
           </a:p>
           <a:p>
             <a:pPr marL="0" indent="0">
@@ -6449,6 +6544,196 @@
           </a:effectRef>
           <a:fontRef idx="minor">
             <a:schemeClr val="accent2"/>
+          </a:fontRef>
+        </p:style>
+        <p:txBody>
+          <a:bodyPr rtlCol="0" anchor="ctr"/>
+          <a:lstStyle/>
+          <a:p>
+            <a:pPr algn="ctr"/>
+            <a:endParaRPr lang="en-IN" dirty="0"/>
+          </a:p>
+        </p:txBody>
+      </p:sp>
+      <p:pic>
+        <p:nvPicPr>
+          <p:cNvPr id="5" name="Picture 4">
+            <a:extLst>
+              <a:ext uri="{FF2B5EF4-FFF2-40B4-BE49-F238E27FC236}">
+                <a16:creationId xmlns:a16="http://schemas.microsoft.com/office/drawing/2014/main" id="{9D0A43BD-E1E8-460A-AFE1-E5AA0C6034EC}"/>
+              </a:ext>
+            </a:extLst>
+          </p:cNvPr>
+          <p:cNvPicPr>
+            <a:picLocks noChangeAspect="1"/>
+          </p:cNvPicPr>
+          <p:nvPr/>
+        </p:nvPicPr>
+        <p:blipFill>
+          <a:blip r:embed="rId2"/>
+          <a:stretch>
+            <a:fillRect/>
+          </a:stretch>
+        </p:blipFill>
+        <p:spPr>
+          <a:xfrm>
+            <a:off x="6578173" y="1166501"/>
+            <a:ext cx="5230614" cy="2011354"/>
+          </a:xfrm>
+          <a:prstGeom prst="rect">
+            <a:avLst/>
+          </a:prstGeom>
+        </p:spPr>
+      </p:pic>
+      <p:pic>
+        <p:nvPicPr>
+          <p:cNvPr id="11" name="Picture 10">
+            <a:extLst>
+              <a:ext uri="{FF2B5EF4-FFF2-40B4-BE49-F238E27FC236}">
+                <a16:creationId xmlns:a16="http://schemas.microsoft.com/office/drawing/2014/main" id="{C3F33A43-8DA6-4716-BA07-050D46BD7696}"/>
+              </a:ext>
+            </a:extLst>
+          </p:cNvPr>
+          <p:cNvPicPr>
+            <a:picLocks noChangeAspect="1"/>
+          </p:cNvPicPr>
+          <p:nvPr/>
+        </p:nvPicPr>
+        <p:blipFill>
+          <a:blip r:embed="rId3"/>
+          <a:stretch>
+            <a:fillRect/>
+          </a:stretch>
+        </p:blipFill>
+        <p:spPr>
+          <a:xfrm>
+            <a:off x="6879365" y="3580957"/>
+            <a:ext cx="4496372" cy="2110542"/>
+          </a:xfrm>
+          <a:prstGeom prst="rect">
+            <a:avLst/>
+          </a:prstGeom>
+        </p:spPr>
+      </p:pic>
+      <p:cxnSp>
+        <p:nvCxnSpPr>
+          <p:cNvPr id="13" name="Straight Arrow Connector 12">
+            <a:extLst>
+              <a:ext uri="{FF2B5EF4-FFF2-40B4-BE49-F238E27FC236}">
+                <a16:creationId xmlns:a16="http://schemas.microsoft.com/office/drawing/2014/main" id="{C2CF4321-F8B9-4AA0-A438-B71C87F50D54}"/>
+              </a:ext>
+            </a:extLst>
+          </p:cNvPr>
+          <p:cNvCxnSpPr/>
+          <p:nvPr/>
+        </p:nvCxnSpPr>
+        <p:spPr>
+          <a:xfrm>
+            <a:off x="2085174" y="2854295"/>
+            <a:ext cx="5118931" cy="0"/>
+          </a:xfrm>
+          <a:prstGeom prst="straightConnector1">
+            <a:avLst/>
+          </a:prstGeom>
+          <a:ln>
+            <a:tailEnd type="triangle"/>
+          </a:ln>
+        </p:spPr>
+        <p:style>
+          <a:lnRef idx="1">
+            <a:schemeClr val="accent1"/>
+          </a:lnRef>
+          <a:fillRef idx="0">
+            <a:schemeClr val="accent1"/>
+          </a:fillRef>
+          <a:effectRef idx="0">
+            <a:schemeClr val="accent1"/>
+          </a:effectRef>
+          <a:fontRef idx="minor">
+            <a:schemeClr val="tx1"/>
+          </a:fontRef>
+        </p:style>
+      </p:cxnSp>
+      <p:cxnSp>
+        <p:nvCxnSpPr>
+          <p:cNvPr id="17" name="Straight Arrow Connector 16">
+            <a:extLst>
+              <a:ext uri="{FF2B5EF4-FFF2-40B4-BE49-F238E27FC236}">
+                <a16:creationId xmlns:a16="http://schemas.microsoft.com/office/drawing/2014/main" id="{2C32B2C0-E913-44BA-88D1-98DC413BD5EA}"/>
+              </a:ext>
+            </a:extLst>
+          </p:cNvPr>
+          <p:cNvCxnSpPr/>
+          <p:nvPr/>
+        </p:nvCxnSpPr>
+        <p:spPr>
+          <a:xfrm>
+            <a:off x="1999716" y="3580957"/>
+            <a:ext cx="4982198" cy="743215"/>
+          </a:xfrm>
+          <a:prstGeom prst="straightConnector1">
+            <a:avLst/>
+          </a:prstGeom>
+          <a:ln>
+            <a:tailEnd type="triangle"/>
+          </a:ln>
+        </p:spPr>
+        <p:style>
+          <a:lnRef idx="1">
+            <a:schemeClr val="accent1"/>
+          </a:lnRef>
+          <a:fillRef idx="0">
+            <a:schemeClr val="accent1"/>
+          </a:fillRef>
+          <a:effectRef idx="0">
+            <a:schemeClr val="accent1"/>
+          </a:effectRef>
+          <a:fontRef idx="minor">
+            <a:schemeClr val="tx1"/>
+          </a:fontRef>
+        </p:style>
+      </p:cxnSp>
+      <p:sp>
+        <p:nvSpPr>
+          <p:cNvPr id="19" name="Rectangle: Rounded Corners 18">
+            <a:extLst>
+              <a:ext uri="{FF2B5EF4-FFF2-40B4-BE49-F238E27FC236}">
+                <a16:creationId xmlns:a16="http://schemas.microsoft.com/office/drawing/2014/main" id="{6C3FA0B8-EC74-4B46-A867-BCC5D7E50F85}"/>
+              </a:ext>
+            </a:extLst>
+          </p:cNvPr>
+          <p:cNvSpPr/>
+          <p:nvPr/>
+        </p:nvSpPr>
+        <p:spPr>
+          <a:xfrm>
+            <a:off x="6347351" y="1281869"/>
+            <a:ext cx="5522757" cy="4666004"/>
+          </a:xfrm>
+          <a:prstGeom prst="roundRect">
+            <a:avLst/>
+          </a:prstGeom>
+          <a:solidFill>
+            <a:schemeClr val="accent1">
+              <a:alpha val="50000"/>
+            </a:schemeClr>
+          </a:solidFill>
+          <a:ln>
+            <a:noFill/>
+          </a:ln>
+        </p:spPr>
+        <p:style>
+          <a:lnRef idx="0">
+            <a:scrgbClr r="0" g="0" b="0"/>
+          </a:lnRef>
+          <a:fillRef idx="0">
+            <a:scrgbClr r="0" g="0" b="0"/>
+          </a:fillRef>
+          <a:effectRef idx="0">
+            <a:scrgbClr r="0" g="0" b="0"/>
+          </a:effectRef>
+          <a:fontRef idx="minor">
+            <a:schemeClr val="lt1"/>
           </a:fontRef>
         </p:style>
         <p:txBody>

</xml_diff>

<commit_message>
Added one problem for DP learning
</commit_message>
<xml_diff>
--- a/Dynamic_Programming/Dynamic Programming.pptx
+++ b/Dynamic_Programming/Dynamic Programming.pptx
@@ -9,6 +9,8 @@
     <p:sldId id="258" r:id="rId3"/>
     <p:sldId id="259" r:id="rId4"/>
     <p:sldId id="260" r:id="rId5"/>
+    <p:sldId id="261" r:id="rId6"/>
+    <p:sldId id="262" r:id="rId7"/>
   </p:sldIdLst>
   <p:sldSz cx="12192000" cy="6858000"/>
   <p:notesSz cx="6858000" cy="9144000"/>
@@ -116,6 +118,8 @@
             <p14:sldId id="258"/>
             <p14:sldId id="259"/>
             <p14:sldId id="260"/>
+            <p14:sldId id="261"/>
+            <p14:sldId id="262"/>
           </p14:sldIdLst>
         </p14:section>
       </p14:sectionLst>
@@ -276,7 +280,7 @@
           <a:p>
             <a:fld id="{BDC0887E-30F6-48B0-B326-7E062E530290}" type="datetimeFigureOut">
               <a:rPr lang="en-IN" smtClean="0"/>
-              <a:t>06-02-2022</a:t>
+              <a:t>11-02-2022</a:t>
             </a:fld>
             <a:endParaRPr lang="en-IN"/>
           </a:p>
@@ -476,7 +480,7 @@
           <a:p>
             <a:fld id="{BDC0887E-30F6-48B0-B326-7E062E530290}" type="datetimeFigureOut">
               <a:rPr lang="en-IN" smtClean="0"/>
-              <a:t>06-02-2022</a:t>
+              <a:t>11-02-2022</a:t>
             </a:fld>
             <a:endParaRPr lang="en-IN"/>
           </a:p>
@@ -686,7 +690,7 @@
           <a:p>
             <a:fld id="{BDC0887E-30F6-48B0-B326-7E062E530290}" type="datetimeFigureOut">
               <a:rPr lang="en-IN" smtClean="0"/>
-              <a:t>06-02-2022</a:t>
+              <a:t>11-02-2022</a:t>
             </a:fld>
             <a:endParaRPr lang="en-IN"/>
           </a:p>
@@ -886,7 +890,7 @@
           <a:p>
             <a:fld id="{BDC0887E-30F6-48B0-B326-7E062E530290}" type="datetimeFigureOut">
               <a:rPr lang="en-IN" smtClean="0"/>
-              <a:t>06-02-2022</a:t>
+              <a:t>11-02-2022</a:t>
             </a:fld>
             <a:endParaRPr lang="en-IN"/>
           </a:p>
@@ -1162,7 +1166,7 @@
           <a:p>
             <a:fld id="{BDC0887E-30F6-48B0-B326-7E062E530290}" type="datetimeFigureOut">
               <a:rPr lang="en-IN" smtClean="0"/>
-              <a:t>06-02-2022</a:t>
+              <a:t>11-02-2022</a:t>
             </a:fld>
             <a:endParaRPr lang="en-IN"/>
           </a:p>
@@ -1430,7 +1434,7 @@
           <a:p>
             <a:fld id="{BDC0887E-30F6-48B0-B326-7E062E530290}" type="datetimeFigureOut">
               <a:rPr lang="en-IN" smtClean="0"/>
-              <a:t>06-02-2022</a:t>
+              <a:t>11-02-2022</a:t>
             </a:fld>
             <a:endParaRPr lang="en-IN"/>
           </a:p>
@@ -1845,7 +1849,7 @@
           <a:p>
             <a:fld id="{BDC0887E-30F6-48B0-B326-7E062E530290}" type="datetimeFigureOut">
               <a:rPr lang="en-IN" smtClean="0"/>
-              <a:t>06-02-2022</a:t>
+              <a:t>11-02-2022</a:t>
             </a:fld>
             <a:endParaRPr lang="en-IN"/>
           </a:p>
@@ -1987,7 +1991,7 @@
           <a:p>
             <a:fld id="{BDC0887E-30F6-48B0-B326-7E062E530290}" type="datetimeFigureOut">
               <a:rPr lang="en-IN" smtClean="0"/>
-              <a:t>06-02-2022</a:t>
+              <a:t>11-02-2022</a:t>
             </a:fld>
             <a:endParaRPr lang="en-IN"/>
           </a:p>
@@ -2100,7 +2104,7 @@
           <a:p>
             <a:fld id="{BDC0887E-30F6-48B0-B326-7E062E530290}" type="datetimeFigureOut">
               <a:rPr lang="en-IN" smtClean="0"/>
-              <a:t>06-02-2022</a:t>
+              <a:t>11-02-2022</a:t>
             </a:fld>
             <a:endParaRPr lang="en-IN"/>
           </a:p>
@@ -2413,7 +2417,7 @@
           <a:p>
             <a:fld id="{BDC0887E-30F6-48B0-B326-7E062E530290}" type="datetimeFigureOut">
               <a:rPr lang="en-IN" smtClean="0"/>
-              <a:t>06-02-2022</a:t>
+              <a:t>11-02-2022</a:t>
             </a:fld>
             <a:endParaRPr lang="en-IN"/>
           </a:p>
@@ -2702,7 +2706,7 @@
           <a:p>
             <a:fld id="{BDC0887E-30F6-48B0-B326-7E062E530290}" type="datetimeFigureOut">
               <a:rPr lang="en-IN" smtClean="0"/>
-              <a:t>06-02-2022</a:t>
+              <a:t>11-02-2022</a:t>
             </a:fld>
             <a:endParaRPr lang="en-IN"/>
           </a:p>
@@ -2945,7 +2949,7 @@
           <a:p>
             <a:fld id="{BDC0887E-30F6-48B0-B326-7E062E530290}" type="datetimeFigureOut">
               <a:rPr lang="en-IN" smtClean="0"/>
-              <a:t>06-02-2022</a:t>
+              <a:t>11-02-2022</a:t>
             </a:fld>
             <a:endParaRPr lang="en-IN"/>
           </a:p>
@@ -6758,6 +6762,958 @@
 </p:sld>
 </file>
 
+<file path=ppt/slides/slide5.xml><?xml version="1.0" encoding="utf-8"?>
+<p:sld xmlns:a="http://schemas.openxmlformats.org/drawingml/2006/main" xmlns:r="http://schemas.openxmlformats.org/officeDocument/2006/relationships" xmlns:p="http://schemas.openxmlformats.org/presentationml/2006/main">
+  <p:cSld>
+    <p:spTree>
+      <p:nvGrpSpPr>
+        <p:cNvPr id="1" name=""/>
+        <p:cNvGrpSpPr/>
+        <p:nvPr/>
+      </p:nvGrpSpPr>
+      <p:grpSpPr>
+        <a:xfrm>
+          <a:off x="0" y="0"/>
+          <a:ext cx="0" cy="0"/>
+          <a:chOff x="0" y="0"/>
+          <a:chExt cx="0" cy="0"/>
+        </a:xfrm>
+      </p:grpSpPr>
+      <p:sp>
+        <p:nvSpPr>
+          <p:cNvPr id="6" name="Rectangle 5">
+            <a:extLst>
+              <a:ext uri="{FF2B5EF4-FFF2-40B4-BE49-F238E27FC236}">
+                <a16:creationId xmlns:a16="http://schemas.microsoft.com/office/drawing/2014/main" id="{23D9A284-E705-4058-BC97-E411758071E2}"/>
+              </a:ext>
+            </a:extLst>
+          </p:cNvPr>
+          <p:cNvSpPr/>
+          <p:nvPr/>
+        </p:nvSpPr>
+        <p:spPr>
+          <a:xfrm>
+            <a:off x="0" y="0"/>
+            <a:ext cx="12192000" cy="623843"/>
+          </a:xfrm>
+          <a:prstGeom prst="rect">
+            <a:avLst/>
+          </a:prstGeom>
+        </p:spPr>
+        <p:style>
+          <a:lnRef idx="2">
+            <a:schemeClr val="accent1">
+              <a:shade val="50000"/>
+            </a:schemeClr>
+          </a:lnRef>
+          <a:fillRef idx="1">
+            <a:schemeClr val="accent1"/>
+          </a:fillRef>
+          <a:effectRef idx="0">
+            <a:schemeClr val="accent1"/>
+          </a:effectRef>
+          <a:fontRef idx="minor">
+            <a:schemeClr val="lt1"/>
+          </a:fontRef>
+        </p:style>
+        <p:txBody>
+          <a:bodyPr rtlCol="0" anchor="ctr"/>
+          <a:lstStyle/>
+          <a:p>
+            <a:pPr algn="ctr"/>
+            <a:endParaRPr lang="en-IN" b="1" i="0" dirty="0">
+              <a:effectLst/>
+              <a:latin typeface="Nunito Sans" pitchFamily="2" charset="0"/>
+            </a:endParaRPr>
+          </a:p>
+          <a:p>
+            <a:pPr algn="ctr"/>
+            <a:r>
+              <a:rPr lang="en-US" b="1" dirty="0">
+                <a:latin typeface="Nunito Sans" pitchFamily="2" charset="0"/>
+              </a:rPr>
+              <a:t>Dynamic Programming – Min Step Count</a:t>
+            </a:r>
+            <a:endParaRPr lang="en-IN" b="1" dirty="0">
+              <a:latin typeface="Nunito Sans" pitchFamily="2" charset="0"/>
+            </a:endParaRPr>
+          </a:p>
+          <a:p>
+            <a:pPr algn="ctr"/>
+            <a:endParaRPr lang="en-IN" dirty="0"/>
+          </a:p>
+        </p:txBody>
+      </p:sp>
+      <p:sp>
+        <p:nvSpPr>
+          <p:cNvPr id="4" name="TextBox 3">
+            <a:extLst>
+              <a:ext uri="{FF2B5EF4-FFF2-40B4-BE49-F238E27FC236}">
+                <a16:creationId xmlns:a16="http://schemas.microsoft.com/office/drawing/2014/main" id="{8C4A9A07-01AB-45E4-8166-1253A1210F5A}"/>
+              </a:ext>
+            </a:extLst>
+          </p:cNvPr>
+          <p:cNvSpPr txBox="1"/>
+          <p:nvPr/>
+        </p:nvSpPr>
+        <p:spPr>
+          <a:xfrm>
+            <a:off x="256374" y="837487"/>
+            <a:ext cx="6033331" cy="4185761"/>
+          </a:xfrm>
+          <a:prstGeom prst="rect">
+            <a:avLst/>
+          </a:prstGeom>
+          <a:noFill/>
+        </p:spPr>
+        <p:txBody>
+          <a:bodyPr wrap="square" rtlCol="0">
+            <a:spAutoFit/>
+          </a:bodyPr>
+          <a:lstStyle/>
+          <a:p>
+            <a:r>
+              <a:rPr lang="en-IN" sz="1000" dirty="0">
+                <a:latin typeface="+mj-lt"/>
+              </a:rPr>
+              <a:t>Problem Heading : </a:t>
+            </a:r>
+            <a:r>
+              <a:rPr lang="en-US" sz="1000" i="0" dirty="0">
+                <a:solidFill>
+                  <a:srgbClr val="000000"/>
+                </a:solidFill>
+                <a:effectLst/>
+                <a:latin typeface="+mj-lt"/>
+              </a:rPr>
+              <a:t>Minimum Steps to One Problem</a:t>
+            </a:r>
+          </a:p>
+          <a:p>
+            <a:pPr algn="l"/>
+            <a:r>
+              <a:rPr lang="en-US" sz="1000" i="0" dirty="0">
+                <a:effectLst/>
+                <a:latin typeface="+mj-lt"/>
+              </a:rPr>
+              <a:t>Problem statement</a:t>
+            </a:r>
+          </a:p>
+          <a:p>
+            <a:pPr algn="l"/>
+            <a:r>
+              <a:rPr lang="en-US" sz="1000" i="1" dirty="0">
+                <a:solidFill>
+                  <a:srgbClr val="3D3D4E"/>
+                </a:solidFill>
+                <a:effectLst/>
+                <a:latin typeface="+mj-lt"/>
+              </a:rPr>
+              <a:t>On a positive integer, you can perform any one of the following 3 steps:</a:t>
+            </a:r>
+            <a:endParaRPr lang="en-US" sz="1000" i="0" dirty="0">
+              <a:solidFill>
+                <a:srgbClr val="3D3D4E"/>
+              </a:solidFill>
+              <a:effectLst/>
+              <a:latin typeface="+mj-lt"/>
+            </a:endParaRPr>
+          </a:p>
+          <a:p>
+            <a:pPr algn="l"/>
+            <a:r>
+              <a:rPr lang="en-US" sz="1000" i="1" dirty="0">
+                <a:solidFill>
+                  <a:srgbClr val="3D3D4E"/>
+                </a:solidFill>
+                <a:effectLst/>
+                <a:latin typeface="+mj-lt"/>
+              </a:rPr>
+              <a:t>1. Subtract 1 from it.</a:t>
+            </a:r>
+            <a:endParaRPr lang="en-US" sz="1000" i="0" dirty="0">
+              <a:solidFill>
+                <a:srgbClr val="3D3D4E"/>
+              </a:solidFill>
+              <a:effectLst/>
+              <a:latin typeface="+mj-lt"/>
+            </a:endParaRPr>
+          </a:p>
+          <a:p>
+            <a:pPr algn="l"/>
+            <a:r>
+              <a:rPr lang="en-US" sz="1000" i="1" dirty="0">
+                <a:solidFill>
+                  <a:srgbClr val="3D3D4E"/>
+                </a:solidFill>
+                <a:effectLst/>
+                <a:latin typeface="+mj-lt"/>
+              </a:rPr>
+              <a:t>2. If it is divisible by 2, divide by 2.</a:t>
+            </a:r>
+            <a:endParaRPr lang="en-US" sz="1000" i="0" dirty="0">
+              <a:solidFill>
+                <a:srgbClr val="3D3D4E"/>
+              </a:solidFill>
+              <a:effectLst/>
+              <a:latin typeface="+mj-lt"/>
+            </a:endParaRPr>
+          </a:p>
+          <a:p>
+            <a:pPr algn="l"/>
+            <a:r>
+              <a:rPr lang="en-US" sz="1000" i="1" dirty="0">
+                <a:solidFill>
+                  <a:srgbClr val="3D3D4E"/>
+                </a:solidFill>
+                <a:effectLst/>
+                <a:latin typeface="+mj-lt"/>
+              </a:rPr>
+              <a:t>3. If it is divisible by 3, divide by 3.</a:t>
+            </a:r>
+            <a:endParaRPr lang="en-US" sz="1000" i="0" dirty="0">
+              <a:solidFill>
+                <a:srgbClr val="3D3D4E"/>
+              </a:solidFill>
+              <a:effectLst/>
+              <a:latin typeface="+mj-lt"/>
+            </a:endParaRPr>
+          </a:p>
+          <a:p>
+            <a:pPr algn="l"/>
+            <a:r>
+              <a:rPr lang="en-US" sz="1000" i="1" dirty="0">
+                <a:solidFill>
+                  <a:srgbClr val="3D3D4E"/>
+                </a:solidFill>
+                <a:effectLst/>
+                <a:latin typeface="+mj-lt"/>
+              </a:rPr>
+              <a:t>Given a positive integer n, find the minimum number of steps that takes n to 1.</a:t>
+            </a:r>
+          </a:p>
+          <a:p>
+            <a:pPr algn="l"/>
+            <a:endParaRPr lang="en-US" sz="1000" i="1" dirty="0">
+              <a:solidFill>
+                <a:srgbClr val="3D3D4E"/>
+              </a:solidFill>
+              <a:latin typeface="+mj-lt"/>
+            </a:endParaRPr>
+          </a:p>
+          <a:p>
+            <a:pPr algn="l"/>
+            <a:endParaRPr lang="en-US" sz="1000" i="1" dirty="0">
+              <a:solidFill>
+                <a:srgbClr val="3D3D4E"/>
+              </a:solidFill>
+              <a:effectLst/>
+              <a:latin typeface="+mj-lt"/>
+            </a:endParaRPr>
+          </a:p>
+          <a:p>
+            <a:pPr algn="l"/>
+            <a:r>
+              <a:rPr lang="en-US" sz="1000" b="1" i="1" dirty="0">
+                <a:solidFill>
+                  <a:srgbClr val="FF0000"/>
+                </a:solidFill>
+                <a:latin typeface="+mj-lt"/>
+              </a:rPr>
+              <a:t>Approach 01: </a:t>
+            </a:r>
+          </a:p>
+          <a:p>
+            <a:pPr algn="l"/>
+            <a:r>
+              <a:rPr lang="en-US" sz="1000" b="1" i="1" dirty="0">
+                <a:solidFill>
+                  <a:srgbClr val="FF0000"/>
+                </a:solidFill>
+                <a:latin typeface="+mj-lt"/>
+              </a:rPr>
+              <a:t>Brute Force</a:t>
+            </a:r>
+            <a:r>
+              <a:rPr lang="en-US" sz="1000" i="1" dirty="0">
+                <a:solidFill>
+                  <a:srgbClr val="3D3D4E"/>
+                </a:solidFill>
+                <a:latin typeface="+mj-lt"/>
+              </a:rPr>
+              <a:t>, and the approach is like explore the all-possible paths and calculate the step required in path, out of all step count value , find the minimum number of count and return this minimum value as an output of this problem.</a:t>
+            </a:r>
+          </a:p>
+          <a:p>
+            <a:pPr algn="l"/>
+            <a:endParaRPr lang="en-US" sz="1000" i="1" dirty="0">
+              <a:solidFill>
+                <a:srgbClr val="3D3D4E"/>
+              </a:solidFill>
+              <a:latin typeface="+mj-lt"/>
+            </a:endParaRPr>
+          </a:p>
+          <a:p>
+            <a:pPr algn="l"/>
+            <a:r>
+              <a:rPr lang="en-US" sz="1000" i="1" dirty="0">
+                <a:solidFill>
+                  <a:srgbClr val="3D3D4E"/>
+                </a:solidFill>
+                <a:latin typeface="+mj-lt"/>
+              </a:rPr>
+              <a:t>Time Complexity : O(3^m)</a:t>
+            </a:r>
+          </a:p>
+          <a:p>
+            <a:pPr algn="l"/>
+            <a:r>
+              <a:rPr lang="en-US" sz="1000" i="1" dirty="0">
+                <a:solidFill>
+                  <a:srgbClr val="3D3D4E"/>
+                </a:solidFill>
+                <a:latin typeface="+mj-lt"/>
+              </a:rPr>
+              <a:t>Space Complexity : Recursion stack required addition due to recursion</a:t>
+            </a:r>
+          </a:p>
+          <a:p>
+            <a:pPr algn="l"/>
+            <a:endParaRPr lang="en-US" sz="1000" i="1" dirty="0">
+              <a:solidFill>
+                <a:srgbClr val="3D3D4E"/>
+              </a:solidFill>
+              <a:latin typeface="+mj-lt"/>
+            </a:endParaRPr>
+          </a:p>
+          <a:p>
+            <a:pPr algn="l"/>
+            <a:endParaRPr lang="en-US" sz="1000" i="1" dirty="0">
+              <a:solidFill>
+                <a:srgbClr val="3D3D4E"/>
+              </a:solidFill>
+              <a:effectLst/>
+              <a:latin typeface="+mj-lt"/>
+            </a:endParaRPr>
+          </a:p>
+          <a:p>
+            <a:pPr algn="l"/>
+            <a:endParaRPr lang="en-US" sz="1000" i="1" dirty="0">
+              <a:solidFill>
+                <a:srgbClr val="3D3D4E"/>
+              </a:solidFill>
+              <a:latin typeface="+mj-lt"/>
+            </a:endParaRPr>
+          </a:p>
+          <a:p>
+            <a:pPr algn="l"/>
+            <a:endParaRPr lang="en-US" sz="1000" i="1" dirty="0">
+              <a:solidFill>
+                <a:srgbClr val="3D3D4E"/>
+              </a:solidFill>
+              <a:effectLst/>
+              <a:latin typeface="+mj-lt"/>
+            </a:endParaRPr>
+          </a:p>
+          <a:p>
+            <a:pPr algn="l"/>
+            <a:endParaRPr lang="en-US" sz="1000" i="1" dirty="0">
+              <a:solidFill>
+                <a:srgbClr val="3D3D4E"/>
+              </a:solidFill>
+              <a:latin typeface="+mj-lt"/>
+            </a:endParaRPr>
+          </a:p>
+          <a:p>
+            <a:pPr algn="l"/>
+            <a:endParaRPr lang="en-US" sz="1000" i="0" dirty="0">
+              <a:solidFill>
+                <a:srgbClr val="3D3D4E"/>
+              </a:solidFill>
+              <a:effectLst/>
+              <a:latin typeface="+mj-lt"/>
+            </a:endParaRPr>
+          </a:p>
+          <a:p>
+            <a:endParaRPr lang="en-IN" dirty="0"/>
+          </a:p>
+          <a:p>
+            <a:endParaRPr lang="en-IN" dirty="0"/>
+          </a:p>
+        </p:txBody>
+      </p:sp>
+      <p:pic>
+        <p:nvPicPr>
+          <p:cNvPr id="8" name="Picture 7">
+            <a:extLst>
+              <a:ext uri="{FF2B5EF4-FFF2-40B4-BE49-F238E27FC236}">
+                <a16:creationId xmlns:a16="http://schemas.microsoft.com/office/drawing/2014/main" id="{3C916115-4051-4A13-84B3-FE5A551DC266}"/>
+              </a:ext>
+            </a:extLst>
+          </p:cNvPr>
+          <p:cNvPicPr>
+            <a:picLocks noChangeAspect="1"/>
+          </p:cNvPicPr>
+          <p:nvPr/>
+        </p:nvPicPr>
+        <p:blipFill>
+          <a:blip r:embed="rId2"/>
+          <a:stretch>
+            <a:fillRect/>
+          </a:stretch>
+        </p:blipFill>
+        <p:spPr>
+          <a:xfrm>
+            <a:off x="6492514" y="2127903"/>
+            <a:ext cx="5249407" cy="3349951"/>
+          </a:xfrm>
+          <a:prstGeom prst="rect">
+            <a:avLst/>
+          </a:prstGeom>
+        </p:spPr>
+      </p:pic>
+      <p:sp>
+        <p:nvSpPr>
+          <p:cNvPr id="10" name="Rectangle 9">
+            <a:extLst>
+              <a:ext uri="{FF2B5EF4-FFF2-40B4-BE49-F238E27FC236}">
+                <a16:creationId xmlns:a16="http://schemas.microsoft.com/office/drawing/2014/main" id="{2062E01C-44BC-4297-8045-0035ECF21CA7}"/>
+              </a:ext>
+            </a:extLst>
+          </p:cNvPr>
+          <p:cNvSpPr/>
+          <p:nvPr/>
+        </p:nvSpPr>
+        <p:spPr>
+          <a:xfrm>
+            <a:off x="256374" y="2059536"/>
+            <a:ext cx="11596643" cy="3418318"/>
+          </a:xfrm>
+          <a:prstGeom prst="rect">
+            <a:avLst/>
+          </a:prstGeom>
+          <a:noFill/>
+          <a:ln w="9525" cap="flat" cmpd="sng" algn="ctr">
+            <a:solidFill>
+              <a:schemeClr val="accent3"/>
+            </a:solidFill>
+            <a:prstDash val="solid"/>
+            <a:round/>
+            <a:headEnd type="none" w="med" len="med"/>
+            <a:tailEnd type="none" w="med" len="med"/>
+          </a:ln>
+        </p:spPr>
+        <p:style>
+          <a:lnRef idx="0">
+            <a:scrgbClr r="0" g="0" b="0"/>
+          </a:lnRef>
+          <a:fillRef idx="0">
+            <a:scrgbClr r="0" g="0" b="0"/>
+          </a:fillRef>
+          <a:effectRef idx="0">
+            <a:scrgbClr r="0" g="0" b="0"/>
+          </a:effectRef>
+          <a:fontRef idx="minor">
+            <a:schemeClr val="accent3"/>
+          </a:fontRef>
+        </p:style>
+        <p:txBody>
+          <a:bodyPr rtlCol="0" anchor="ctr"/>
+          <a:lstStyle/>
+          <a:p>
+            <a:pPr algn="ctr"/>
+            <a:endParaRPr lang="en-IN" dirty="0"/>
+          </a:p>
+        </p:txBody>
+      </p:sp>
+    </p:spTree>
+    <p:extLst>
+      <p:ext uri="{BB962C8B-B14F-4D97-AF65-F5344CB8AC3E}">
+        <p14:creationId xmlns:p14="http://schemas.microsoft.com/office/powerpoint/2010/main" val="3337682451"/>
+      </p:ext>
+    </p:extLst>
+  </p:cSld>
+  <p:clrMapOvr>
+    <a:masterClrMapping/>
+  </p:clrMapOvr>
+</p:sld>
+</file>
+
+<file path=ppt/slides/slide6.xml><?xml version="1.0" encoding="utf-8"?>
+<p:sld xmlns:a="http://schemas.openxmlformats.org/drawingml/2006/main" xmlns:r="http://schemas.openxmlformats.org/officeDocument/2006/relationships" xmlns:p="http://schemas.openxmlformats.org/presentationml/2006/main">
+  <p:cSld>
+    <p:spTree>
+      <p:nvGrpSpPr>
+        <p:cNvPr id="1" name=""/>
+        <p:cNvGrpSpPr/>
+        <p:nvPr/>
+      </p:nvGrpSpPr>
+      <p:grpSpPr>
+        <a:xfrm>
+          <a:off x="0" y="0"/>
+          <a:ext cx="0" cy="0"/>
+          <a:chOff x="0" y="0"/>
+          <a:chExt cx="0" cy="0"/>
+        </a:xfrm>
+      </p:grpSpPr>
+      <p:sp>
+        <p:nvSpPr>
+          <p:cNvPr id="6" name="Rectangle 5">
+            <a:extLst>
+              <a:ext uri="{FF2B5EF4-FFF2-40B4-BE49-F238E27FC236}">
+                <a16:creationId xmlns:a16="http://schemas.microsoft.com/office/drawing/2014/main" id="{23D9A284-E705-4058-BC97-E411758071E2}"/>
+              </a:ext>
+            </a:extLst>
+          </p:cNvPr>
+          <p:cNvSpPr/>
+          <p:nvPr/>
+        </p:nvSpPr>
+        <p:spPr>
+          <a:xfrm>
+            <a:off x="0" y="0"/>
+            <a:ext cx="12192000" cy="623843"/>
+          </a:xfrm>
+          <a:prstGeom prst="rect">
+            <a:avLst/>
+          </a:prstGeom>
+        </p:spPr>
+        <p:style>
+          <a:lnRef idx="2">
+            <a:schemeClr val="accent1">
+              <a:shade val="50000"/>
+            </a:schemeClr>
+          </a:lnRef>
+          <a:fillRef idx="1">
+            <a:schemeClr val="accent1"/>
+          </a:fillRef>
+          <a:effectRef idx="0">
+            <a:schemeClr val="accent1"/>
+          </a:effectRef>
+          <a:fontRef idx="minor">
+            <a:schemeClr val="lt1"/>
+          </a:fontRef>
+        </p:style>
+        <p:txBody>
+          <a:bodyPr rtlCol="0" anchor="ctr"/>
+          <a:lstStyle/>
+          <a:p>
+            <a:pPr algn="ctr"/>
+            <a:endParaRPr lang="en-IN" b="1" i="0" dirty="0">
+              <a:effectLst/>
+              <a:latin typeface="Nunito Sans" pitchFamily="2" charset="0"/>
+            </a:endParaRPr>
+          </a:p>
+          <a:p>
+            <a:pPr algn="ctr"/>
+            <a:r>
+              <a:rPr lang="en-US" b="1" dirty="0">
+                <a:latin typeface="Nunito Sans" pitchFamily="2" charset="0"/>
+              </a:rPr>
+              <a:t>Dynamic Programming – Min Step Count</a:t>
+            </a:r>
+            <a:endParaRPr lang="en-IN" b="1" dirty="0">
+              <a:latin typeface="Nunito Sans" pitchFamily="2" charset="0"/>
+            </a:endParaRPr>
+          </a:p>
+          <a:p>
+            <a:pPr algn="ctr"/>
+            <a:endParaRPr lang="en-IN" dirty="0"/>
+          </a:p>
+        </p:txBody>
+      </p:sp>
+      <p:sp>
+        <p:nvSpPr>
+          <p:cNvPr id="4" name="TextBox 3">
+            <a:extLst>
+              <a:ext uri="{FF2B5EF4-FFF2-40B4-BE49-F238E27FC236}">
+                <a16:creationId xmlns:a16="http://schemas.microsoft.com/office/drawing/2014/main" id="{8C4A9A07-01AB-45E4-8166-1253A1210F5A}"/>
+              </a:ext>
+            </a:extLst>
+          </p:cNvPr>
+          <p:cNvSpPr txBox="1"/>
+          <p:nvPr/>
+        </p:nvSpPr>
+        <p:spPr>
+          <a:xfrm>
+            <a:off x="256374" y="734938"/>
+            <a:ext cx="6033331" cy="4154984"/>
+          </a:xfrm>
+          <a:prstGeom prst="rect">
+            <a:avLst/>
+          </a:prstGeom>
+          <a:noFill/>
+        </p:spPr>
+        <p:txBody>
+          <a:bodyPr wrap="square" rtlCol="0">
+            <a:spAutoFit/>
+          </a:bodyPr>
+          <a:lstStyle/>
+          <a:p>
+            <a:r>
+              <a:rPr lang="en-IN" sz="1200" dirty="0">
+                <a:latin typeface="+mj-lt"/>
+              </a:rPr>
+              <a:t>Problem Heading : </a:t>
+            </a:r>
+            <a:r>
+              <a:rPr lang="en-US" sz="1200" i="0" dirty="0">
+                <a:solidFill>
+                  <a:srgbClr val="000000"/>
+                </a:solidFill>
+                <a:effectLst/>
+                <a:latin typeface="+mj-lt"/>
+              </a:rPr>
+              <a:t>Minimum Steps to One Problem</a:t>
+            </a:r>
+          </a:p>
+          <a:p>
+            <a:pPr algn="l"/>
+            <a:r>
+              <a:rPr lang="en-US" sz="1200" i="0" dirty="0">
+                <a:effectLst/>
+                <a:latin typeface="+mj-lt"/>
+              </a:rPr>
+              <a:t>Problem statement</a:t>
+            </a:r>
+          </a:p>
+          <a:p>
+            <a:pPr algn="l"/>
+            <a:r>
+              <a:rPr lang="en-US" sz="1200" i="1" dirty="0">
+                <a:solidFill>
+                  <a:srgbClr val="3D3D4E"/>
+                </a:solidFill>
+                <a:effectLst/>
+                <a:latin typeface="+mj-lt"/>
+              </a:rPr>
+              <a:t>On a positive integer, you can perform any one of the following 3 steps:</a:t>
+            </a:r>
+            <a:endParaRPr lang="en-US" sz="1200" i="0" dirty="0">
+              <a:solidFill>
+                <a:srgbClr val="3D3D4E"/>
+              </a:solidFill>
+              <a:effectLst/>
+              <a:latin typeface="+mj-lt"/>
+            </a:endParaRPr>
+          </a:p>
+          <a:p>
+            <a:pPr algn="l"/>
+            <a:r>
+              <a:rPr lang="en-US" sz="1200" i="1" dirty="0">
+                <a:solidFill>
+                  <a:srgbClr val="3D3D4E"/>
+                </a:solidFill>
+                <a:effectLst/>
+                <a:latin typeface="+mj-lt"/>
+              </a:rPr>
+              <a:t>1. Subtract 1 from it.</a:t>
+            </a:r>
+            <a:endParaRPr lang="en-US" sz="1200" i="0" dirty="0">
+              <a:solidFill>
+                <a:srgbClr val="3D3D4E"/>
+              </a:solidFill>
+              <a:effectLst/>
+              <a:latin typeface="+mj-lt"/>
+            </a:endParaRPr>
+          </a:p>
+          <a:p>
+            <a:pPr algn="l"/>
+            <a:r>
+              <a:rPr lang="en-US" sz="1200" i="1" dirty="0">
+                <a:solidFill>
+                  <a:srgbClr val="3D3D4E"/>
+                </a:solidFill>
+                <a:effectLst/>
+                <a:latin typeface="+mj-lt"/>
+              </a:rPr>
+              <a:t>2. If it is divisible by 2, divide by 2.</a:t>
+            </a:r>
+            <a:endParaRPr lang="en-US" sz="1200" i="0" dirty="0">
+              <a:solidFill>
+                <a:srgbClr val="3D3D4E"/>
+              </a:solidFill>
+              <a:effectLst/>
+              <a:latin typeface="+mj-lt"/>
+            </a:endParaRPr>
+          </a:p>
+          <a:p>
+            <a:pPr algn="l"/>
+            <a:r>
+              <a:rPr lang="en-US" sz="1200" i="1" dirty="0">
+                <a:solidFill>
+                  <a:srgbClr val="3D3D4E"/>
+                </a:solidFill>
+                <a:effectLst/>
+                <a:latin typeface="+mj-lt"/>
+              </a:rPr>
+              <a:t>3. If it is divisible by 3, divide by 3.</a:t>
+            </a:r>
+            <a:endParaRPr lang="en-US" sz="1200" i="0" dirty="0">
+              <a:solidFill>
+                <a:srgbClr val="3D3D4E"/>
+              </a:solidFill>
+              <a:effectLst/>
+              <a:latin typeface="+mj-lt"/>
+            </a:endParaRPr>
+          </a:p>
+          <a:p>
+            <a:pPr algn="l"/>
+            <a:r>
+              <a:rPr lang="en-US" sz="1200" i="1" dirty="0">
+                <a:solidFill>
+                  <a:srgbClr val="3D3D4E"/>
+                </a:solidFill>
+                <a:effectLst/>
+                <a:latin typeface="+mj-lt"/>
+              </a:rPr>
+              <a:t>Given a positive integer n, find the minimum number of steps that takes n to 1.</a:t>
+            </a:r>
+          </a:p>
+          <a:p>
+            <a:pPr algn="l"/>
+            <a:endParaRPr lang="en-US" sz="1200" i="1" dirty="0">
+              <a:solidFill>
+                <a:srgbClr val="3D3D4E"/>
+              </a:solidFill>
+              <a:latin typeface="+mj-lt"/>
+            </a:endParaRPr>
+          </a:p>
+          <a:p>
+            <a:pPr algn="l"/>
+            <a:endParaRPr lang="en-US" sz="1200" i="1" dirty="0">
+              <a:solidFill>
+                <a:srgbClr val="3D3D4E"/>
+              </a:solidFill>
+              <a:effectLst/>
+              <a:latin typeface="+mj-lt"/>
+            </a:endParaRPr>
+          </a:p>
+          <a:p>
+            <a:pPr algn="l"/>
+            <a:r>
+              <a:rPr lang="en-US" sz="1200" b="1" dirty="0">
+                <a:latin typeface="+mj-lt"/>
+              </a:rPr>
+              <a:t>Approach 02: </a:t>
+            </a:r>
+          </a:p>
+          <a:p>
+            <a:pPr algn="l"/>
+            <a:r>
+              <a:rPr lang="en-US" sz="1200" b="1" dirty="0">
+                <a:latin typeface="+mj-lt"/>
+              </a:rPr>
+              <a:t>Top-down Memorization</a:t>
+            </a:r>
+            <a:r>
+              <a:rPr lang="en-US" sz="1200" i="1" dirty="0">
+                <a:solidFill>
+                  <a:srgbClr val="3D3D4E"/>
+                </a:solidFill>
+                <a:latin typeface="+mj-lt"/>
+              </a:rPr>
+              <a:t>, what we observe here that </a:t>
+            </a:r>
+          </a:p>
+          <a:p>
+            <a:pPr algn="l"/>
+            <a:endParaRPr lang="en-US" sz="1200" i="1" dirty="0">
+              <a:solidFill>
+                <a:srgbClr val="3D3D4E"/>
+              </a:solidFill>
+              <a:latin typeface="+mj-lt"/>
+            </a:endParaRPr>
+          </a:p>
+          <a:p>
+            <a:pPr algn="l"/>
+            <a:endParaRPr lang="en-US" sz="1200" i="1" dirty="0">
+              <a:solidFill>
+                <a:srgbClr val="3D3D4E"/>
+              </a:solidFill>
+              <a:latin typeface="+mj-lt"/>
+            </a:endParaRPr>
+          </a:p>
+          <a:p>
+            <a:pPr algn="l"/>
+            <a:r>
+              <a:rPr lang="en-US" sz="1200" i="1" dirty="0">
+                <a:solidFill>
+                  <a:srgbClr val="3D3D4E"/>
+                </a:solidFill>
+                <a:latin typeface="+mj-lt"/>
+              </a:rPr>
+              <a:t>Time Complexity : 0(n)</a:t>
+            </a:r>
+          </a:p>
+          <a:p>
+            <a:pPr algn="l"/>
+            <a:r>
+              <a:rPr lang="en-US" sz="1200" i="1" dirty="0">
+                <a:solidFill>
+                  <a:srgbClr val="3D3D4E"/>
+                </a:solidFill>
+                <a:latin typeface="+mj-lt"/>
+              </a:rPr>
+              <a:t>Space Complexity : O(n)</a:t>
+            </a:r>
+          </a:p>
+          <a:p>
+            <a:pPr algn="l"/>
+            <a:endParaRPr lang="en-US" sz="1200" i="1" dirty="0">
+              <a:solidFill>
+                <a:srgbClr val="3D3D4E"/>
+              </a:solidFill>
+              <a:effectLst/>
+              <a:latin typeface="+mj-lt"/>
+            </a:endParaRPr>
+          </a:p>
+          <a:p>
+            <a:pPr algn="l"/>
+            <a:endParaRPr lang="en-US" sz="1200" i="1" dirty="0">
+              <a:solidFill>
+                <a:srgbClr val="3D3D4E"/>
+              </a:solidFill>
+              <a:latin typeface="+mj-lt"/>
+            </a:endParaRPr>
+          </a:p>
+          <a:p>
+            <a:pPr algn="l"/>
+            <a:endParaRPr lang="en-US" sz="1200" i="1" dirty="0">
+              <a:solidFill>
+                <a:srgbClr val="3D3D4E"/>
+              </a:solidFill>
+              <a:effectLst/>
+              <a:latin typeface="+mj-lt"/>
+            </a:endParaRPr>
+          </a:p>
+          <a:p>
+            <a:pPr algn="l"/>
+            <a:endParaRPr lang="en-US" sz="1200" i="1" dirty="0">
+              <a:solidFill>
+                <a:srgbClr val="3D3D4E"/>
+              </a:solidFill>
+              <a:latin typeface="+mj-lt"/>
+            </a:endParaRPr>
+          </a:p>
+          <a:p>
+            <a:pPr algn="l"/>
+            <a:endParaRPr lang="en-US" sz="1200" i="0" dirty="0">
+              <a:solidFill>
+                <a:srgbClr val="3D3D4E"/>
+              </a:solidFill>
+              <a:effectLst/>
+              <a:latin typeface="+mj-lt"/>
+            </a:endParaRPr>
+          </a:p>
+          <a:p>
+            <a:endParaRPr lang="en-IN" sz="1200" dirty="0">
+              <a:latin typeface="+mj-lt"/>
+            </a:endParaRPr>
+          </a:p>
+          <a:p>
+            <a:endParaRPr lang="en-IN" sz="1200" dirty="0">
+              <a:latin typeface="+mj-lt"/>
+            </a:endParaRPr>
+          </a:p>
+        </p:txBody>
+      </p:sp>
+      <p:sp>
+        <p:nvSpPr>
+          <p:cNvPr id="10" name="Rectangle 9">
+            <a:extLst>
+              <a:ext uri="{FF2B5EF4-FFF2-40B4-BE49-F238E27FC236}">
+                <a16:creationId xmlns:a16="http://schemas.microsoft.com/office/drawing/2014/main" id="{2062E01C-44BC-4297-8045-0035ECF21CA7}"/>
+              </a:ext>
+            </a:extLst>
+          </p:cNvPr>
+          <p:cNvSpPr/>
+          <p:nvPr/>
+        </p:nvSpPr>
+        <p:spPr>
+          <a:xfrm>
+            <a:off x="256374" y="2127902"/>
+            <a:ext cx="11596643" cy="3995160"/>
+          </a:xfrm>
+          <a:prstGeom prst="rect">
+            <a:avLst/>
+          </a:prstGeom>
+          <a:noFill/>
+          <a:ln w="9525" cap="flat" cmpd="sng" algn="ctr">
+            <a:solidFill>
+              <a:schemeClr val="accent3"/>
+            </a:solidFill>
+            <a:prstDash val="solid"/>
+            <a:round/>
+            <a:headEnd type="none" w="med" len="med"/>
+            <a:tailEnd type="none" w="med" len="med"/>
+          </a:ln>
+        </p:spPr>
+        <p:style>
+          <a:lnRef idx="0">
+            <a:scrgbClr r="0" g="0" b="0"/>
+          </a:lnRef>
+          <a:fillRef idx="0">
+            <a:scrgbClr r="0" g="0" b="0"/>
+          </a:fillRef>
+          <a:effectRef idx="0">
+            <a:scrgbClr r="0" g="0" b="0"/>
+          </a:effectRef>
+          <a:fontRef idx="minor">
+            <a:schemeClr val="accent3"/>
+          </a:fontRef>
+        </p:style>
+        <p:txBody>
+          <a:bodyPr rtlCol="0" anchor="ctr"/>
+          <a:lstStyle/>
+          <a:p>
+            <a:pPr algn="ctr"/>
+            <a:endParaRPr lang="en-IN" dirty="0"/>
+          </a:p>
+        </p:txBody>
+      </p:sp>
+      <p:pic>
+        <p:nvPicPr>
+          <p:cNvPr id="5" name="Picture 4">
+            <a:extLst>
+              <a:ext uri="{FF2B5EF4-FFF2-40B4-BE49-F238E27FC236}">
+                <a16:creationId xmlns:a16="http://schemas.microsoft.com/office/drawing/2014/main" id="{AFE0A740-37DB-4228-B3AF-F901F25BCABF}"/>
+              </a:ext>
+            </a:extLst>
+          </p:cNvPr>
+          <p:cNvPicPr>
+            <a:picLocks noChangeAspect="1"/>
+          </p:cNvPicPr>
+          <p:nvPr/>
+        </p:nvPicPr>
+        <p:blipFill>
+          <a:blip r:embed="rId2"/>
+          <a:stretch>
+            <a:fillRect/>
+          </a:stretch>
+        </p:blipFill>
+        <p:spPr>
+          <a:xfrm>
+            <a:off x="5212103" y="2245407"/>
+            <a:ext cx="4547194" cy="3760150"/>
+          </a:xfrm>
+          <a:prstGeom prst="rect">
+            <a:avLst/>
+          </a:prstGeom>
+        </p:spPr>
+      </p:pic>
+    </p:spTree>
+    <p:extLst>
+      <p:ext uri="{BB962C8B-B14F-4D97-AF65-F5344CB8AC3E}">
+        <p14:creationId xmlns:p14="http://schemas.microsoft.com/office/powerpoint/2010/main" val="3958068522"/>
+      </p:ext>
+    </p:extLst>
+  </p:cSld>
+  <p:clrMapOvr>
+    <a:masterClrMapping/>
+  </p:clrMapOvr>
+</p:sld>
+</file>
+
 <file path=ppt/theme/theme1.xml><?xml version="1.0" encoding="utf-8"?>
 <a:theme xmlns:a="http://schemas.openxmlformats.org/drawingml/2006/main" name="Office Theme">
   <a:themeElements>

</xml_diff>

<commit_message>
Completed Coin change problem using all the approaches - Brute Force - Top-down - Bottom-up
</commit_message>
<xml_diff>
--- a/Dynamic_Programming/Dynamic Programming.pptx
+++ b/Dynamic_Programming/Dynamic Programming.pptx
@@ -4978,8 +4978,8 @@
         </p:nvSpPr>
         <p:spPr>
           <a:xfrm>
-            <a:off x="256374" y="2059536"/>
-            <a:ext cx="11596643" cy="3418318"/>
+            <a:off x="256375" y="2059536"/>
+            <a:ext cx="11468456" cy="3418318"/>
           </a:xfrm>
           <a:prstGeom prst="rect">
             <a:avLst/>
@@ -5126,6 +5126,88 @@
               </a:rPr>
               <a:t>Code link : https://github.com/abmishra1234/4AM_Club_Coding/tree/main/11-02-2022_Project</a:t>
             </a:r>
+          </a:p>
+        </p:txBody>
+      </p:sp>
+      <p:pic>
+        <p:nvPicPr>
+          <p:cNvPr id="5" name="Picture 4">
+            <a:extLst>
+              <a:ext uri="{FF2B5EF4-FFF2-40B4-BE49-F238E27FC236}">
+                <a16:creationId xmlns:a16="http://schemas.microsoft.com/office/drawing/2014/main" id="{1B112772-47F2-49B8-B6FF-C6A473B87C00}"/>
+              </a:ext>
+            </a:extLst>
+          </p:cNvPr>
+          <p:cNvPicPr>
+            <a:picLocks noChangeAspect="1"/>
+          </p:cNvPicPr>
+          <p:nvPr/>
+        </p:nvPicPr>
+        <p:blipFill>
+          <a:blip r:embed="rId2"/>
+          <a:stretch>
+            <a:fillRect/>
+          </a:stretch>
+        </p:blipFill>
+        <p:spPr>
+          <a:xfrm>
+            <a:off x="6674266" y="2215069"/>
+            <a:ext cx="4049736" cy="3107252"/>
+          </a:xfrm>
+          <a:prstGeom prst="rect">
+            <a:avLst/>
+          </a:prstGeom>
+        </p:spPr>
+      </p:pic>
+      <p:sp>
+        <p:nvSpPr>
+          <p:cNvPr id="11" name="Rectangle 10">
+            <a:extLst>
+              <a:ext uri="{FF2B5EF4-FFF2-40B4-BE49-F238E27FC236}">
+                <a16:creationId xmlns:a16="http://schemas.microsoft.com/office/drawing/2014/main" id="{AE62ABE1-6466-4044-B175-AA093B6385B0}"/>
+              </a:ext>
+            </a:extLst>
+          </p:cNvPr>
+          <p:cNvSpPr/>
+          <p:nvPr/>
+        </p:nvSpPr>
+        <p:spPr>
+          <a:xfrm>
+            <a:off x="6648628" y="2118134"/>
+            <a:ext cx="4101981" cy="3214442"/>
+          </a:xfrm>
+          <a:prstGeom prst="rect">
+            <a:avLst/>
+          </a:prstGeom>
+          <a:solidFill>
+            <a:schemeClr val="accent5">
+              <a:alpha val="50000"/>
+            </a:schemeClr>
+          </a:solidFill>
+          <a:ln>
+            <a:noFill/>
+          </a:ln>
+        </p:spPr>
+        <p:style>
+          <a:lnRef idx="0">
+            <a:scrgbClr r="0" g="0" b="0"/>
+          </a:lnRef>
+          <a:fillRef idx="0">
+            <a:scrgbClr r="0" g="0" b="0"/>
+          </a:fillRef>
+          <a:effectRef idx="0">
+            <a:scrgbClr r="0" g="0" b="0"/>
+          </a:effectRef>
+          <a:fontRef idx="minor">
+            <a:schemeClr val="lt1"/>
+          </a:fontRef>
+        </p:style>
+        <p:txBody>
+          <a:bodyPr rtlCol="0" anchor="ctr"/>
+          <a:lstStyle/>
+          <a:p>
+            <a:pPr algn="ctr"/>
+            <a:endParaRPr lang="en-IN" dirty="0"/>
           </a:p>
         </p:txBody>
       </p:sp>

</xml_diff>

<commit_message>
collected from public site
</commit_message>
<xml_diff>
--- a/Dynamic_Programming/Dynamic Programming.pptx
+++ b/Dynamic_Programming/Dynamic Programming.pptx
@@ -15,6 +15,9 @@
     <p:sldId id="264" r:id="rId9"/>
     <p:sldId id="267" r:id="rId10"/>
     <p:sldId id="268" r:id="rId11"/>
+    <p:sldId id="269" r:id="rId12"/>
+    <p:sldId id="270" r:id="rId13"/>
+    <p:sldId id="271" r:id="rId14"/>
   </p:sldIdLst>
   <p:sldSz cx="12192000" cy="6858000"/>
   <p:notesSz cx="6858000" cy="9144000"/>
@@ -128,6 +131,9 @@
             <p14:sldId id="264"/>
             <p14:sldId id="267"/>
             <p14:sldId id="268"/>
+            <p14:sldId id="269"/>
+            <p14:sldId id="270"/>
+            <p14:sldId id="271"/>
           </p14:sldIdLst>
         </p14:section>
       </p14:sectionLst>
@@ -5224,6 +5230,2691 @@
 </p:sld>
 </file>
 
+<file path=ppt/slides/slide11.xml><?xml version="1.0" encoding="utf-8"?>
+<p:sld xmlns:a="http://schemas.openxmlformats.org/drawingml/2006/main" xmlns:r="http://schemas.openxmlformats.org/officeDocument/2006/relationships" xmlns:p="http://schemas.openxmlformats.org/presentationml/2006/main">
+  <p:cSld>
+    <p:spTree>
+      <p:nvGrpSpPr>
+        <p:cNvPr id="1" name=""/>
+        <p:cNvGrpSpPr/>
+        <p:nvPr/>
+      </p:nvGrpSpPr>
+      <p:grpSpPr>
+        <a:xfrm>
+          <a:off x="0" y="0"/>
+          <a:ext cx="0" cy="0"/>
+          <a:chOff x="0" y="0"/>
+          <a:chExt cx="0" cy="0"/>
+        </a:xfrm>
+      </p:grpSpPr>
+      <p:sp>
+        <p:nvSpPr>
+          <p:cNvPr id="6" name="Rectangle 5">
+            <a:extLst>
+              <a:ext uri="{FF2B5EF4-FFF2-40B4-BE49-F238E27FC236}">
+                <a16:creationId xmlns:a16="http://schemas.microsoft.com/office/drawing/2014/main" id="{23D9A284-E705-4058-BC97-E411758071E2}"/>
+              </a:ext>
+            </a:extLst>
+          </p:cNvPr>
+          <p:cNvSpPr/>
+          <p:nvPr/>
+        </p:nvSpPr>
+        <p:spPr>
+          <a:xfrm>
+            <a:off x="0" y="0"/>
+            <a:ext cx="12192000" cy="623843"/>
+          </a:xfrm>
+          <a:prstGeom prst="rect">
+            <a:avLst/>
+          </a:prstGeom>
+        </p:spPr>
+        <p:style>
+          <a:lnRef idx="2">
+            <a:schemeClr val="accent1">
+              <a:shade val="50000"/>
+            </a:schemeClr>
+          </a:lnRef>
+          <a:fillRef idx="1">
+            <a:schemeClr val="accent1"/>
+          </a:fillRef>
+          <a:effectRef idx="0">
+            <a:schemeClr val="accent1"/>
+          </a:effectRef>
+          <a:fontRef idx="minor">
+            <a:schemeClr val="lt1"/>
+          </a:fontRef>
+        </p:style>
+        <p:txBody>
+          <a:bodyPr rtlCol="0" anchor="ctr"/>
+          <a:lstStyle/>
+          <a:p>
+            <a:pPr algn="ctr"/>
+            <a:endParaRPr lang="en-IN" b="1" i="0" dirty="0">
+              <a:effectLst/>
+              <a:latin typeface="Nunito Sans" pitchFamily="2" charset="0"/>
+            </a:endParaRPr>
+          </a:p>
+          <a:p>
+            <a:pPr algn="ctr"/>
+            <a:r>
+              <a:rPr lang="en-US" b="1" dirty="0">
+                <a:latin typeface="Nunito Sans" pitchFamily="2" charset="0"/>
+              </a:rPr>
+              <a:t>[Brute force] Wine and maximum price problem</a:t>
+            </a:r>
+            <a:endParaRPr lang="en-IN" b="1" dirty="0">
+              <a:latin typeface="Nunito Sans" pitchFamily="2" charset="0"/>
+            </a:endParaRPr>
+          </a:p>
+          <a:p>
+            <a:pPr algn="ctr"/>
+            <a:endParaRPr lang="en-IN" dirty="0"/>
+          </a:p>
+        </p:txBody>
+      </p:sp>
+      <p:sp>
+        <p:nvSpPr>
+          <p:cNvPr id="4" name="TextBox 3">
+            <a:extLst>
+              <a:ext uri="{FF2B5EF4-FFF2-40B4-BE49-F238E27FC236}">
+                <a16:creationId xmlns:a16="http://schemas.microsoft.com/office/drawing/2014/main" id="{8C4A9A07-01AB-45E4-8166-1253A1210F5A}"/>
+              </a:ext>
+            </a:extLst>
+          </p:cNvPr>
+          <p:cNvSpPr txBox="1"/>
+          <p:nvPr/>
+        </p:nvSpPr>
+        <p:spPr>
+          <a:xfrm>
+            <a:off x="256374" y="837487"/>
+            <a:ext cx="6033331" cy="4493538"/>
+          </a:xfrm>
+          <a:prstGeom prst="rect">
+            <a:avLst/>
+          </a:prstGeom>
+          <a:noFill/>
+        </p:spPr>
+        <p:txBody>
+          <a:bodyPr wrap="square" rtlCol="0">
+            <a:spAutoFit/>
+          </a:bodyPr>
+          <a:lstStyle/>
+          <a:p>
+            <a:pPr algn="l"/>
+            <a:r>
+              <a:rPr lang="en-US" sz="1000" i="0" dirty="0">
+                <a:effectLst/>
+                <a:latin typeface="+mj-lt"/>
+              </a:rPr>
+              <a:t>Problem statement</a:t>
+            </a:r>
+          </a:p>
+          <a:p>
+            <a:pPr algn="l"/>
+            <a:r>
+              <a:rPr lang="en-US" sz="1000" i="0" dirty="0">
+                <a:solidFill>
+                  <a:srgbClr val="3D3D4E"/>
+                </a:solidFill>
+                <a:effectLst/>
+                <a:latin typeface="+mj-lt"/>
+              </a:rPr>
+              <a:t>If we have an infinite supply of each of C = { C_{1}</a:t>
+            </a:r>
+            <a:r>
+              <a:rPr lang="en-US" sz="1000" i="1" dirty="0">
+                <a:solidFill>
+                  <a:srgbClr val="3D3D4E"/>
+                </a:solidFill>
+                <a:effectLst/>
+                <a:latin typeface="+mj-lt"/>
+              </a:rPr>
+              <a:t>C</a:t>
+            </a:r>
+            <a:r>
+              <a:rPr lang="en-US" sz="1000" i="0" dirty="0">
+                <a:solidFill>
+                  <a:srgbClr val="3D3D4E"/>
+                </a:solidFill>
+                <a:effectLst/>
+                <a:latin typeface="+mj-lt"/>
+              </a:rPr>
+              <a:t>​1​​, C_{2}</a:t>
+            </a:r>
+            <a:r>
+              <a:rPr lang="en-US" sz="1000" i="1" dirty="0">
+                <a:solidFill>
+                  <a:srgbClr val="3D3D4E"/>
+                </a:solidFill>
+                <a:effectLst/>
+                <a:latin typeface="+mj-lt"/>
+              </a:rPr>
+              <a:t>C</a:t>
+            </a:r>
+            <a:r>
+              <a:rPr lang="en-US" sz="1000" i="0" dirty="0">
+                <a:solidFill>
+                  <a:srgbClr val="3D3D4E"/>
+                </a:solidFill>
+                <a:effectLst/>
+                <a:latin typeface="+mj-lt"/>
+              </a:rPr>
+              <a:t>​2​​, … , C_{M}</a:t>
+            </a:r>
+            <a:r>
+              <a:rPr lang="en-US" sz="1000" i="1" dirty="0">
+                <a:solidFill>
+                  <a:srgbClr val="3D3D4E"/>
+                </a:solidFill>
+                <a:effectLst/>
+                <a:latin typeface="+mj-lt"/>
+              </a:rPr>
+              <a:t>C</a:t>
+            </a:r>
+            <a:r>
+              <a:rPr lang="en-US" sz="1000" i="0" dirty="0">
+                <a:solidFill>
+                  <a:srgbClr val="3D3D4E"/>
+                </a:solidFill>
+                <a:effectLst/>
+                <a:latin typeface="+mj-lt"/>
+              </a:rPr>
+              <a:t>​</a:t>
+            </a:r>
+            <a:r>
+              <a:rPr lang="en-US" sz="1000" i="1" dirty="0">
+                <a:solidFill>
+                  <a:srgbClr val="3D3D4E"/>
+                </a:solidFill>
+                <a:effectLst/>
+                <a:latin typeface="+mj-lt"/>
+              </a:rPr>
+              <a:t>M</a:t>
+            </a:r>
+            <a:r>
+              <a:rPr lang="en-US" sz="1000" i="0" dirty="0">
+                <a:solidFill>
+                  <a:srgbClr val="3D3D4E"/>
+                </a:solidFill>
+                <a:effectLst/>
+                <a:latin typeface="+mj-lt"/>
+              </a:rPr>
+              <a:t>​​} valued coins and we want to make a change for a given value (N) of cents, what </a:t>
+            </a:r>
+            <a:r>
+              <a:rPr lang="en-US" sz="1000" b="1" i="0" dirty="0">
+                <a:solidFill>
+                  <a:srgbClr val="3D3D4E"/>
+                </a:solidFill>
+                <a:effectLst/>
+                <a:highlight>
+                  <a:srgbClr val="FFFF00"/>
+                </a:highlight>
+                <a:latin typeface="+mj-lt"/>
+              </a:rPr>
+              <a:t>is the minimum number of coins required </a:t>
+            </a:r>
+            <a:r>
+              <a:rPr lang="en-US" sz="1000" i="0" dirty="0">
+                <a:solidFill>
+                  <a:srgbClr val="3D3D4E"/>
+                </a:solidFill>
+                <a:effectLst/>
+                <a:latin typeface="+mj-lt"/>
+              </a:rPr>
+              <a:t>to make the change?</a:t>
+            </a:r>
+          </a:p>
+          <a:p>
+            <a:pPr algn="l"/>
+            <a:endParaRPr lang="en-US" sz="1000" i="1" dirty="0">
+              <a:solidFill>
+                <a:srgbClr val="3D3D4E"/>
+              </a:solidFill>
+              <a:latin typeface="+mj-lt"/>
+            </a:endParaRPr>
+          </a:p>
+          <a:p>
+            <a:pPr algn="l"/>
+            <a:endParaRPr lang="en-US" sz="1000" i="1" dirty="0">
+              <a:solidFill>
+                <a:srgbClr val="3D3D4E"/>
+              </a:solidFill>
+              <a:latin typeface="+mj-lt"/>
+            </a:endParaRPr>
+          </a:p>
+          <a:p>
+            <a:pPr algn="l"/>
+            <a:endParaRPr lang="en-US" sz="1000" i="1" dirty="0">
+              <a:solidFill>
+                <a:srgbClr val="3D3D4E"/>
+              </a:solidFill>
+              <a:latin typeface="+mj-lt"/>
+            </a:endParaRPr>
+          </a:p>
+          <a:p>
+            <a:pPr algn="l"/>
+            <a:endParaRPr lang="en-US" sz="1000" i="1" dirty="0">
+              <a:solidFill>
+                <a:srgbClr val="3D3D4E"/>
+              </a:solidFill>
+              <a:latin typeface="+mj-lt"/>
+            </a:endParaRPr>
+          </a:p>
+          <a:p>
+            <a:pPr algn="l"/>
+            <a:endParaRPr lang="en-US" sz="1000" i="1" dirty="0">
+              <a:solidFill>
+                <a:srgbClr val="3D3D4E"/>
+              </a:solidFill>
+              <a:latin typeface="+mj-lt"/>
+            </a:endParaRPr>
+          </a:p>
+          <a:p>
+            <a:pPr algn="l"/>
+            <a:r>
+              <a:rPr lang="en-US" sz="1000" b="1" i="1" dirty="0">
+                <a:solidFill>
+                  <a:srgbClr val="FF0000"/>
+                </a:solidFill>
+                <a:latin typeface="+mj-lt"/>
+              </a:rPr>
+              <a:t>Approach 01: </a:t>
+            </a:r>
+          </a:p>
+          <a:p>
+            <a:pPr algn="l"/>
+            <a:r>
+              <a:rPr lang="en-US" sz="1000" b="1" i="1" dirty="0">
+                <a:solidFill>
+                  <a:srgbClr val="FF0000"/>
+                </a:solidFill>
+                <a:latin typeface="+mj-lt"/>
+              </a:rPr>
+              <a:t>Brute Force</a:t>
+            </a:r>
+            <a:r>
+              <a:rPr lang="en-US" sz="1000" i="1" dirty="0">
+                <a:solidFill>
+                  <a:srgbClr val="3D3D4E"/>
+                </a:solidFill>
+                <a:latin typeface="+mj-lt"/>
+              </a:rPr>
+              <a:t>, and the approach is like try to produce all different possible combination and than select the minimum number of coin required. </a:t>
+            </a:r>
+          </a:p>
+          <a:p>
+            <a:pPr algn="l"/>
+            <a:endParaRPr lang="en-US" sz="1000" i="1" dirty="0">
+              <a:solidFill>
+                <a:srgbClr val="3D3D4E"/>
+              </a:solidFill>
+              <a:latin typeface="+mj-lt"/>
+            </a:endParaRPr>
+          </a:p>
+          <a:p>
+            <a:pPr algn="l"/>
+            <a:r>
+              <a:rPr lang="en-US" sz="1000" i="1" dirty="0">
+                <a:solidFill>
+                  <a:srgbClr val="3D3D4E"/>
+                </a:solidFill>
+                <a:latin typeface="+mj-lt"/>
+              </a:rPr>
+              <a:t>So, two point to be considered here</a:t>
+            </a:r>
+          </a:p>
+          <a:p>
+            <a:pPr marL="228600" indent="-228600" algn="l">
+              <a:buAutoNum type="arabicPeriod"/>
+            </a:pPr>
+            <a:r>
+              <a:rPr lang="en-US" sz="1000" i="1" dirty="0">
+                <a:solidFill>
+                  <a:srgbClr val="3D3D4E"/>
+                </a:solidFill>
+                <a:latin typeface="+mj-lt"/>
+              </a:rPr>
+              <a:t>Coin list is given in problem</a:t>
+            </a:r>
+          </a:p>
+          <a:p>
+            <a:pPr marL="228600" indent="-228600" algn="l">
+              <a:buAutoNum type="arabicPeriod"/>
+            </a:pPr>
+            <a:r>
+              <a:rPr lang="en-US" sz="1000" i="1" dirty="0">
+                <a:solidFill>
+                  <a:srgbClr val="3D3D4E"/>
+                </a:solidFill>
+                <a:latin typeface="+mj-lt"/>
+              </a:rPr>
+              <a:t>Infinite supply of coin is given</a:t>
+            </a:r>
+          </a:p>
+          <a:p>
+            <a:pPr marL="228600" indent="-228600" algn="l">
+              <a:buAutoNum type="arabicPeriod"/>
+            </a:pPr>
+            <a:endParaRPr lang="en-US" sz="1000" i="1" dirty="0">
+              <a:solidFill>
+                <a:srgbClr val="3D3D4E"/>
+              </a:solidFill>
+              <a:latin typeface="+mj-lt"/>
+            </a:endParaRPr>
+          </a:p>
+          <a:p>
+            <a:pPr algn="l"/>
+            <a:endParaRPr lang="en-US" sz="1000" i="1" dirty="0">
+              <a:solidFill>
+                <a:srgbClr val="3D3D4E"/>
+              </a:solidFill>
+              <a:latin typeface="+mj-lt"/>
+            </a:endParaRPr>
+          </a:p>
+          <a:p>
+            <a:pPr algn="l"/>
+            <a:r>
+              <a:rPr lang="en-US" sz="1000" i="1" dirty="0">
+                <a:solidFill>
+                  <a:srgbClr val="3D3D4E"/>
+                </a:solidFill>
+                <a:latin typeface="+mj-lt"/>
+              </a:rPr>
+              <a:t>Time Complexity : </a:t>
+            </a:r>
+            <a:r>
+              <a:rPr lang="en-US" sz="1000" i="1" dirty="0">
+                <a:solidFill>
+                  <a:srgbClr val="3D3D4E"/>
+                </a:solidFill>
+                <a:highlight>
+                  <a:srgbClr val="FFFF00"/>
+                </a:highlight>
+                <a:latin typeface="+mj-lt"/>
+              </a:rPr>
+              <a:t>(m )^p </a:t>
+            </a:r>
+            <a:r>
+              <a:rPr lang="en-US" sz="1000" i="1" dirty="0">
+                <a:solidFill>
+                  <a:srgbClr val="3D3D4E"/>
+                </a:solidFill>
+                <a:latin typeface="+mj-lt"/>
+              </a:rPr>
+              <a:t>// here m is the type of coins in list and p is the depth of your recursion tree</a:t>
+            </a:r>
+          </a:p>
+          <a:p>
+            <a:pPr algn="l"/>
+            <a:r>
+              <a:rPr lang="en-US" sz="1000" i="1" dirty="0">
+                <a:solidFill>
+                  <a:srgbClr val="3D3D4E"/>
+                </a:solidFill>
+                <a:latin typeface="+mj-lt"/>
+              </a:rPr>
+              <a:t>Space Complexity :  We haven’t used any additional memory </a:t>
+            </a:r>
+            <a:r>
+              <a:rPr lang="en-US" sz="1000" i="1" dirty="0">
+                <a:solidFill>
+                  <a:srgbClr val="3D3D4E"/>
+                </a:solidFill>
+                <a:highlight>
+                  <a:srgbClr val="FFFF00"/>
+                </a:highlight>
+                <a:latin typeface="+mj-lt"/>
+              </a:rPr>
+              <a:t>so O(1) which is const time</a:t>
+            </a:r>
+          </a:p>
+          <a:p>
+            <a:pPr algn="l"/>
+            <a:endParaRPr lang="en-US" sz="1000" i="1" dirty="0">
+              <a:solidFill>
+                <a:srgbClr val="3D3D4E"/>
+              </a:solidFill>
+              <a:latin typeface="+mj-lt"/>
+            </a:endParaRPr>
+          </a:p>
+          <a:p>
+            <a:pPr algn="l"/>
+            <a:endParaRPr lang="en-US" sz="1000" i="1" dirty="0">
+              <a:solidFill>
+                <a:srgbClr val="3D3D4E"/>
+              </a:solidFill>
+              <a:effectLst/>
+              <a:latin typeface="+mj-lt"/>
+            </a:endParaRPr>
+          </a:p>
+          <a:p>
+            <a:pPr algn="l"/>
+            <a:endParaRPr lang="en-US" sz="1000" i="1" dirty="0">
+              <a:solidFill>
+                <a:srgbClr val="3D3D4E"/>
+              </a:solidFill>
+              <a:latin typeface="+mj-lt"/>
+            </a:endParaRPr>
+          </a:p>
+          <a:p>
+            <a:pPr algn="l"/>
+            <a:endParaRPr lang="en-US" sz="1000" i="1" dirty="0">
+              <a:solidFill>
+                <a:srgbClr val="3D3D4E"/>
+              </a:solidFill>
+              <a:effectLst/>
+              <a:latin typeface="+mj-lt"/>
+            </a:endParaRPr>
+          </a:p>
+          <a:p>
+            <a:pPr algn="l"/>
+            <a:endParaRPr lang="en-US" sz="1000" i="1" dirty="0">
+              <a:solidFill>
+                <a:srgbClr val="3D3D4E"/>
+              </a:solidFill>
+              <a:latin typeface="+mj-lt"/>
+            </a:endParaRPr>
+          </a:p>
+          <a:p>
+            <a:pPr algn="l"/>
+            <a:endParaRPr lang="en-US" sz="1000" i="0" dirty="0">
+              <a:solidFill>
+                <a:srgbClr val="3D3D4E"/>
+              </a:solidFill>
+              <a:effectLst/>
+              <a:latin typeface="+mj-lt"/>
+            </a:endParaRPr>
+          </a:p>
+          <a:p>
+            <a:endParaRPr lang="en-IN" dirty="0"/>
+          </a:p>
+          <a:p>
+            <a:endParaRPr lang="en-IN" dirty="0"/>
+          </a:p>
+        </p:txBody>
+      </p:sp>
+      <p:sp>
+        <p:nvSpPr>
+          <p:cNvPr id="10" name="Rectangle 9">
+            <a:extLst>
+              <a:ext uri="{FF2B5EF4-FFF2-40B4-BE49-F238E27FC236}">
+                <a16:creationId xmlns:a16="http://schemas.microsoft.com/office/drawing/2014/main" id="{2062E01C-44BC-4297-8045-0035ECF21CA7}"/>
+              </a:ext>
+            </a:extLst>
+          </p:cNvPr>
+          <p:cNvSpPr/>
+          <p:nvPr/>
+        </p:nvSpPr>
+        <p:spPr>
+          <a:xfrm>
+            <a:off x="256374" y="2059536"/>
+            <a:ext cx="11596643" cy="3418318"/>
+          </a:xfrm>
+          <a:prstGeom prst="rect">
+            <a:avLst/>
+          </a:prstGeom>
+          <a:noFill/>
+          <a:ln w="9525" cap="flat" cmpd="sng" algn="ctr">
+            <a:solidFill>
+              <a:schemeClr val="accent3"/>
+            </a:solidFill>
+            <a:prstDash val="solid"/>
+            <a:round/>
+            <a:headEnd type="none" w="med" len="med"/>
+            <a:tailEnd type="none" w="med" len="med"/>
+          </a:ln>
+        </p:spPr>
+        <p:style>
+          <a:lnRef idx="0">
+            <a:scrgbClr r="0" g="0" b="0"/>
+          </a:lnRef>
+          <a:fillRef idx="0">
+            <a:scrgbClr r="0" g="0" b="0"/>
+          </a:fillRef>
+          <a:effectRef idx="0">
+            <a:scrgbClr r="0" g="0" b="0"/>
+          </a:effectRef>
+          <a:fontRef idx="minor">
+            <a:schemeClr val="accent3"/>
+          </a:fontRef>
+        </p:style>
+        <p:txBody>
+          <a:bodyPr rtlCol="0" anchor="ctr"/>
+          <a:lstStyle/>
+          <a:p>
+            <a:pPr algn="ctr"/>
+            <a:endParaRPr lang="en-IN" dirty="0"/>
+          </a:p>
+        </p:txBody>
+      </p:sp>
+      <p:sp>
+        <p:nvSpPr>
+          <p:cNvPr id="2" name="TextBox 1">
+            <a:extLst>
+              <a:ext uri="{FF2B5EF4-FFF2-40B4-BE49-F238E27FC236}">
+                <a16:creationId xmlns:a16="http://schemas.microsoft.com/office/drawing/2014/main" id="{AD96EE5B-9CF8-4E20-8E1F-0A2FD711DBAC}"/>
+              </a:ext>
+            </a:extLst>
+          </p:cNvPr>
+          <p:cNvSpPr txBox="1"/>
+          <p:nvPr/>
+        </p:nvSpPr>
+        <p:spPr>
+          <a:xfrm>
+            <a:off x="6528988" y="786213"/>
+            <a:ext cx="5264210" cy="1169551"/>
+          </a:xfrm>
+          <a:prstGeom prst="rect">
+            <a:avLst/>
+          </a:prstGeom>
+          <a:noFill/>
+        </p:spPr>
+        <p:txBody>
+          <a:bodyPr wrap="square" rtlCol="0">
+            <a:spAutoFit/>
+          </a:bodyPr>
+          <a:lstStyle/>
+          <a:p>
+            <a:r>
+              <a:rPr lang="en-US" sz="1000" dirty="0"/>
+              <a:t>Example -&gt; Input: </a:t>
+            </a:r>
+          </a:p>
+          <a:p>
+            <a:r>
+              <a:rPr lang="en-US" sz="1000" dirty="0"/>
+              <a:t>coins[] = {25, 10, 5}, N = 30</a:t>
+            </a:r>
+          </a:p>
+          <a:p>
+            <a:r>
+              <a:rPr lang="en-US" sz="1000" dirty="0"/>
+              <a:t>Output: Minimum 2 coins required</a:t>
+            </a:r>
+          </a:p>
+          <a:p>
+            <a:r>
+              <a:rPr lang="en-US" sz="1000" dirty="0"/>
+              <a:t>We can use one coin of 25 cents and one of 5 cents.</a:t>
+            </a:r>
+          </a:p>
+          <a:p>
+            <a:r>
+              <a:rPr lang="en-US" sz="1000" dirty="0"/>
+              <a:t>Input: coins[] = {9, 6, 5, 1}, N = 13</a:t>
+            </a:r>
+          </a:p>
+          <a:p>
+            <a:r>
+              <a:rPr lang="en-US" sz="1000" dirty="0"/>
+              <a:t>Output: Minimum 3 coins required</a:t>
+            </a:r>
+          </a:p>
+          <a:p>
+            <a:r>
+              <a:rPr lang="en-US" sz="1000" dirty="0"/>
+              <a:t>We can use combination of coin of 6 + 6 + 1 cents coins.</a:t>
+            </a:r>
+            <a:endParaRPr lang="en-IN" sz="1000" dirty="0"/>
+          </a:p>
+        </p:txBody>
+      </p:sp>
+      <p:pic>
+        <p:nvPicPr>
+          <p:cNvPr id="5" name="Picture 4">
+            <a:extLst>
+              <a:ext uri="{FF2B5EF4-FFF2-40B4-BE49-F238E27FC236}">
+                <a16:creationId xmlns:a16="http://schemas.microsoft.com/office/drawing/2014/main" id="{563C29BA-1198-4F17-A3B8-67FD9501CFC5}"/>
+              </a:ext>
+            </a:extLst>
+          </p:cNvPr>
+          <p:cNvPicPr>
+            <a:picLocks noChangeAspect="1"/>
+          </p:cNvPicPr>
+          <p:nvPr/>
+        </p:nvPicPr>
+        <p:blipFill>
+          <a:blip r:embed="rId2"/>
+          <a:stretch>
+            <a:fillRect/>
+          </a:stretch>
+        </p:blipFill>
+        <p:spPr>
+          <a:xfrm>
+            <a:off x="6375249" y="2200389"/>
+            <a:ext cx="5112622" cy="3130636"/>
+          </a:xfrm>
+          <a:prstGeom prst="rect">
+            <a:avLst/>
+          </a:prstGeom>
+        </p:spPr>
+      </p:pic>
+      <p:sp>
+        <p:nvSpPr>
+          <p:cNvPr id="7" name="TextBox 6">
+            <a:extLst>
+              <a:ext uri="{FF2B5EF4-FFF2-40B4-BE49-F238E27FC236}">
+                <a16:creationId xmlns:a16="http://schemas.microsoft.com/office/drawing/2014/main" id="{25262EDD-6816-4B47-A360-BBF43F3C2ABB}"/>
+              </a:ext>
+            </a:extLst>
+          </p:cNvPr>
+          <p:cNvSpPr txBox="1"/>
+          <p:nvPr/>
+        </p:nvSpPr>
+        <p:spPr>
+          <a:xfrm>
+            <a:off x="34184" y="6553074"/>
+            <a:ext cx="6255521" cy="261610"/>
+          </a:xfrm>
+          <a:prstGeom prst="rect">
+            <a:avLst/>
+          </a:prstGeom>
+          <a:noFill/>
+        </p:spPr>
+        <p:txBody>
+          <a:bodyPr wrap="square" rtlCol="0">
+            <a:spAutoFit/>
+          </a:bodyPr>
+          <a:lstStyle/>
+          <a:p>
+            <a:r>
+              <a:rPr lang="en-IN" sz="1100" dirty="0">
+                <a:solidFill>
+                  <a:srgbClr val="00B0F0"/>
+                </a:solidFill>
+              </a:rPr>
+              <a:t>Code link : https://github.com/abmishra1234/4AM_Club_Coding/tree/main/11-02-2022_Project</a:t>
+            </a:r>
+          </a:p>
+        </p:txBody>
+      </p:sp>
+      <p:sp>
+        <p:nvSpPr>
+          <p:cNvPr id="9" name="Rectangle 8">
+            <a:extLst>
+              <a:ext uri="{FF2B5EF4-FFF2-40B4-BE49-F238E27FC236}">
+                <a16:creationId xmlns:a16="http://schemas.microsoft.com/office/drawing/2014/main" id="{54482AD2-B815-40AF-BA78-50BE890FC7F9}"/>
+              </a:ext>
+            </a:extLst>
+          </p:cNvPr>
+          <p:cNvSpPr/>
+          <p:nvPr/>
+        </p:nvSpPr>
+        <p:spPr>
+          <a:xfrm>
+            <a:off x="6375249" y="2200389"/>
+            <a:ext cx="5198166" cy="3130636"/>
+          </a:xfrm>
+          <a:prstGeom prst="rect">
+            <a:avLst/>
+          </a:prstGeom>
+          <a:solidFill>
+            <a:schemeClr val="accent3">
+              <a:alpha val="50000"/>
+            </a:schemeClr>
+          </a:solidFill>
+          <a:ln>
+            <a:noFill/>
+          </a:ln>
+        </p:spPr>
+        <p:style>
+          <a:lnRef idx="0">
+            <a:scrgbClr r="0" g="0" b="0"/>
+          </a:lnRef>
+          <a:fillRef idx="0">
+            <a:scrgbClr r="0" g="0" b="0"/>
+          </a:fillRef>
+          <a:effectRef idx="0">
+            <a:scrgbClr r="0" g="0" b="0"/>
+          </a:effectRef>
+          <a:fontRef idx="minor">
+            <a:schemeClr val="lt1"/>
+          </a:fontRef>
+        </p:style>
+        <p:txBody>
+          <a:bodyPr rtlCol="0" anchor="ctr"/>
+          <a:lstStyle/>
+          <a:p>
+            <a:pPr algn="ctr"/>
+            <a:endParaRPr lang="en-IN"/>
+          </a:p>
+        </p:txBody>
+      </p:sp>
+    </p:spTree>
+    <p:extLst>
+      <p:ext uri="{BB962C8B-B14F-4D97-AF65-F5344CB8AC3E}">
+        <p14:creationId xmlns:p14="http://schemas.microsoft.com/office/powerpoint/2010/main" val="3406551488"/>
+      </p:ext>
+    </p:extLst>
+  </p:cSld>
+  <p:clrMapOvr>
+    <a:masterClrMapping/>
+  </p:clrMapOvr>
+</p:sld>
+</file>
+
+<file path=ppt/slides/slide12.xml><?xml version="1.0" encoding="utf-8"?>
+<p:sld xmlns:a="http://schemas.openxmlformats.org/drawingml/2006/main" xmlns:r="http://schemas.openxmlformats.org/officeDocument/2006/relationships" xmlns:p="http://schemas.openxmlformats.org/presentationml/2006/main">
+  <p:cSld>
+    <p:spTree>
+      <p:nvGrpSpPr>
+        <p:cNvPr id="1" name=""/>
+        <p:cNvGrpSpPr/>
+        <p:nvPr/>
+      </p:nvGrpSpPr>
+      <p:grpSpPr>
+        <a:xfrm>
+          <a:off x="0" y="0"/>
+          <a:ext cx="0" cy="0"/>
+          <a:chOff x="0" y="0"/>
+          <a:chExt cx="0" cy="0"/>
+        </a:xfrm>
+      </p:grpSpPr>
+      <p:sp>
+        <p:nvSpPr>
+          <p:cNvPr id="6" name="Rectangle 5">
+            <a:extLst>
+              <a:ext uri="{FF2B5EF4-FFF2-40B4-BE49-F238E27FC236}">
+                <a16:creationId xmlns:a16="http://schemas.microsoft.com/office/drawing/2014/main" id="{23D9A284-E705-4058-BC97-E411758071E2}"/>
+              </a:ext>
+            </a:extLst>
+          </p:cNvPr>
+          <p:cNvSpPr/>
+          <p:nvPr/>
+        </p:nvSpPr>
+        <p:spPr>
+          <a:xfrm>
+            <a:off x="0" y="0"/>
+            <a:ext cx="12192000" cy="623843"/>
+          </a:xfrm>
+          <a:prstGeom prst="rect">
+            <a:avLst/>
+          </a:prstGeom>
+        </p:spPr>
+        <p:style>
+          <a:lnRef idx="2">
+            <a:schemeClr val="accent1">
+              <a:shade val="50000"/>
+            </a:schemeClr>
+          </a:lnRef>
+          <a:fillRef idx="1">
+            <a:schemeClr val="accent1"/>
+          </a:fillRef>
+          <a:effectRef idx="0">
+            <a:schemeClr val="accent1"/>
+          </a:effectRef>
+          <a:fontRef idx="minor">
+            <a:schemeClr val="lt1"/>
+          </a:fontRef>
+        </p:style>
+        <p:txBody>
+          <a:bodyPr rtlCol="0" anchor="ctr"/>
+          <a:lstStyle/>
+          <a:p>
+            <a:pPr algn="ctr"/>
+            <a:endParaRPr lang="en-IN" b="1" i="0" dirty="0">
+              <a:effectLst/>
+              <a:latin typeface="Nunito Sans" pitchFamily="2" charset="0"/>
+            </a:endParaRPr>
+          </a:p>
+          <a:p>
+            <a:pPr algn="ctr"/>
+            <a:r>
+              <a:rPr lang="en-US" b="1" dirty="0">
+                <a:latin typeface="Nunito Sans" pitchFamily="2" charset="0"/>
+              </a:rPr>
+              <a:t>[Memorization] </a:t>
+            </a:r>
+            <a:r>
+              <a:rPr lang="en-IN" b="1" dirty="0">
+                <a:latin typeface="Nunito Sans" pitchFamily="2" charset="0"/>
+              </a:rPr>
+              <a:t>Wine and maximum price problem</a:t>
+            </a:r>
+          </a:p>
+          <a:p>
+            <a:pPr algn="ctr"/>
+            <a:endParaRPr lang="en-IN" dirty="0"/>
+          </a:p>
+        </p:txBody>
+      </p:sp>
+      <p:sp>
+        <p:nvSpPr>
+          <p:cNvPr id="4" name="TextBox 3">
+            <a:extLst>
+              <a:ext uri="{FF2B5EF4-FFF2-40B4-BE49-F238E27FC236}">
+                <a16:creationId xmlns:a16="http://schemas.microsoft.com/office/drawing/2014/main" id="{8C4A9A07-01AB-45E4-8166-1253A1210F5A}"/>
+              </a:ext>
+            </a:extLst>
+          </p:cNvPr>
+          <p:cNvSpPr txBox="1"/>
+          <p:nvPr/>
+        </p:nvSpPr>
+        <p:spPr>
+          <a:xfrm>
+            <a:off x="256374" y="837487"/>
+            <a:ext cx="6033331" cy="6340197"/>
+          </a:xfrm>
+          <a:prstGeom prst="rect">
+            <a:avLst/>
+          </a:prstGeom>
+          <a:noFill/>
+        </p:spPr>
+        <p:txBody>
+          <a:bodyPr wrap="square" rtlCol="0">
+            <a:spAutoFit/>
+          </a:bodyPr>
+          <a:lstStyle/>
+          <a:p>
+            <a:pPr algn="l"/>
+            <a:r>
+              <a:rPr lang="en-US" sz="1000" i="0" dirty="0">
+                <a:effectLst/>
+                <a:latin typeface="+mj-lt"/>
+              </a:rPr>
+              <a:t>Problem statement</a:t>
+            </a:r>
+          </a:p>
+          <a:p>
+            <a:pPr algn="l"/>
+            <a:r>
+              <a:rPr lang="en-US" sz="1000" i="0" dirty="0">
+                <a:solidFill>
+                  <a:srgbClr val="3D3D4E"/>
+                </a:solidFill>
+                <a:effectLst/>
+                <a:latin typeface="+mj-lt"/>
+              </a:rPr>
+              <a:t>If we have an infinite supply of each of C = { C_{1}</a:t>
+            </a:r>
+            <a:r>
+              <a:rPr lang="en-US" sz="1000" i="1" dirty="0">
+                <a:solidFill>
+                  <a:srgbClr val="3D3D4E"/>
+                </a:solidFill>
+                <a:effectLst/>
+                <a:latin typeface="+mj-lt"/>
+              </a:rPr>
+              <a:t>C</a:t>
+            </a:r>
+            <a:r>
+              <a:rPr lang="en-US" sz="1000" i="0" dirty="0">
+                <a:solidFill>
+                  <a:srgbClr val="3D3D4E"/>
+                </a:solidFill>
+                <a:effectLst/>
+                <a:latin typeface="+mj-lt"/>
+              </a:rPr>
+              <a:t>​1​​, C_{2}</a:t>
+            </a:r>
+            <a:r>
+              <a:rPr lang="en-US" sz="1000" i="1" dirty="0">
+                <a:solidFill>
+                  <a:srgbClr val="3D3D4E"/>
+                </a:solidFill>
+                <a:effectLst/>
+                <a:latin typeface="+mj-lt"/>
+              </a:rPr>
+              <a:t>C</a:t>
+            </a:r>
+            <a:r>
+              <a:rPr lang="en-US" sz="1000" i="0" dirty="0">
+                <a:solidFill>
+                  <a:srgbClr val="3D3D4E"/>
+                </a:solidFill>
+                <a:effectLst/>
+                <a:latin typeface="+mj-lt"/>
+              </a:rPr>
+              <a:t>​2​​, … , C_{M}</a:t>
+            </a:r>
+            <a:r>
+              <a:rPr lang="en-US" sz="1000" i="1" dirty="0">
+                <a:solidFill>
+                  <a:srgbClr val="3D3D4E"/>
+                </a:solidFill>
+                <a:effectLst/>
+                <a:latin typeface="+mj-lt"/>
+              </a:rPr>
+              <a:t>C</a:t>
+            </a:r>
+            <a:r>
+              <a:rPr lang="en-US" sz="1000" i="0" dirty="0">
+                <a:solidFill>
+                  <a:srgbClr val="3D3D4E"/>
+                </a:solidFill>
+                <a:effectLst/>
+                <a:latin typeface="+mj-lt"/>
+              </a:rPr>
+              <a:t>​</a:t>
+            </a:r>
+            <a:r>
+              <a:rPr lang="en-US" sz="1000" i="1" dirty="0">
+                <a:solidFill>
+                  <a:srgbClr val="3D3D4E"/>
+                </a:solidFill>
+                <a:effectLst/>
+                <a:latin typeface="+mj-lt"/>
+              </a:rPr>
+              <a:t>M</a:t>
+            </a:r>
+            <a:r>
+              <a:rPr lang="en-US" sz="1000" i="0" dirty="0">
+                <a:solidFill>
+                  <a:srgbClr val="3D3D4E"/>
+                </a:solidFill>
+                <a:effectLst/>
+                <a:latin typeface="+mj-lt"/>
+              </a:rPr>
+              <a:t>​​} valued coins and we want to make a change for a given value (N) of cents, what </a:t>
+            </a:r>
+            <a:r>
+              <a:rPr lang="en-US" sz="1000" b="1" i="0" dirty="0">
+                <a:solidFill>
+                  <a:srgbClr val="3D3D4E"/>
+                </a:solidFill>
+                <a:effectLst/>
+                <a:highlight>
+                  <a:srgbClr val="FFFF00"/>
+                </a:highlight>
+                <a:latin typeface="+mj-lt"/>
+              </a:rPr>
+              <a:t>is the minimum number of coins required </a:t>
+            </a:r>
+            <a:r>
+              <a:rPr lang="en-US" sz="1000" i="0" dirty="0">
+                <a:solidFill>
+                  <a:srgbClr val="3D3D4E"/>
+                </a:solidFill>
+                <a:effectLst/>
+                <a:latin typeface="+mj-lt"/>
+              </a:rPr>
+              <a:t>to make the change?</a:t>
+            </a:r>
+          </a:p>
+          <a:p>
+            <a:pPr algn="l"/>
+            <a:endParaRPr lang="en-US" sz="1000" i="1" dirty="0">
+              <a:solidFill>
+                <a:srgbClr val="3D3D4E"/>
+              </a:solidFill>
+              <a:latin typeface="+mj-lt"/>
+            </a:endParaRPr>
+          </a:p>
+          <a:p>
+            <a:pPr algn="l"/>
+            <a:endParaRPr lang="en-US" sz="1000" i="1" dirty="0">
+              <a:solidFill>
+                <a:srgbClr val="3D3D4E"/>
+              </a:solidFill>
+              <a:latin typeface="+mj-lt"/>
+            </a:endParaRPr>
+          </a:p>
+          <a:p>
+            <a:pPr algn="l"/>
+            <a:endParaRPr lang="en-US" sz="1000" i="1" dirty="0">
+              <a:solidFill>
+                <a:srgbClr val="3D3D4E"/>
+              </a:solidFill>
+              <a:latin typeface="+mj-lt"/>
+            </a:endParaRPr>
+          </a:p>
+          <a:p>
+            <a:pPr algn="l"/>
+            <a:endParaRPr lang="en-US" sz="1000" i="1" dirty="0">
+              <a:solidFill>
+                <a:srgbClr val="3D3D4E"/>
+              </a:solidFill>
+              <a:latin typeface="+mj-lt"/>
+            </a:endParaRPr>
+          </a:p>
+          <a:p>
+            <a:pPr algn="l"/>
+            <a:endParaRPr lang="en-US" sz="1000" i="1" dirty="0">
+              <a:solidFill>
+                <a:srgbClr val="3D3D4E"/>
+              </a:solidFill>
+              <a:latin typeface="+mj-lt"/>
+            </a:endParaRPr>
+          </a:p>
+          <a:p>
+            <a:pPr algn="l"/>
+            <a:r>
+              <a:rPr lang="en-US" sz="1000" b="1" i="1" dirty="0">
+                <a:solidFill>
+                  <a:srgbClr val="FF0000"/>
+                </a:solidFill>
+                <a:latin typeface="+mj-lt"/>
+              </a:rPr>
+              <a:t>Approach 02: </a:t>
+            </a:r>
+          </a:p>
+          <a:p>
+            <a:pPr algn="l"/>
+            <a:r>
+              <a:rPr lang="en-US" sz="1000" b="1" i="1" dirty="0">
+                <a:solidFill>
+                  <a:srgbClr val="FF0000"/>
+                </a:solidFill>
+                <a:latin typeface="+mj-lt"/>
+              </a:rPr>
+              <a:t>Top-down Approach(memorization)</a:t>
+            </a:r>
+            <a:r>
+              <a:rPr lang="en-US" sz="1000" i="1" dirty="0">
+                <a:solidFill>
+                  <a:srgbClr val="3D3D4E"/>
+                </a:solidFill>
+                <a:latin typeface="+mj-lt"/>
+              </a:rPr>
+              <a:t>, </a:t>
+            </a:r>
+          </a:p>
+          <a:p>
+            <a:pPr algn="l"/>
+            <a:r>
+              <a:rPr lang="en-US" sz="1000" i="1" dirty="0">
+                <a:solidFill>
+                  <a:srgbClr val="3D3D4E"/>
+                </a:solidFill>
+                <a:latin typeface="+mj-lt"/>
+              </a:rPr>
+              <a:t>So, here our approach will be to improve the problem we observed in brute-force approach</a:t>
+            </a:r>
+          </a:p>
+          <a:p>
+            <a:pPr algn="l"/>
+            <a:r>
+              <a:rPr lang="en-US" sz="1000" i="1" dirty="0">
+                <a:solidFill>
+                  <a:srgbClr val="3D3D4E"/>
+                </a:solidFill>
+                <a:latin typeface="+mj-lt"/>
+              </a:rPr>
+              <a:t>Yes, so let’s put down your observation on the overlapping substructure or duplicate recursion calls.</a:t>
+            </a:r>
+          </a:p>
+          <a:p>
+            <a:pPr algn="l"/>
+            <a:endParaRPr lang="en-US" sz="1000" i="1" dirty="0">
+              <a:solidFill>
+                <a:srgbClr val="3D3D4E"/>
+              </a:solidFill>
+              <a:latin typeface="+mj-lt"/>
+            </a:endParaRPr>
+          </a:p>
+          <a:p>
+            <a:pPr algn="l"/>
+            <a:r>
+              <a:rPr lang="en-US" sz="1000" i="1" dirty="0">
+                <a:solidFill>
+                  <a:srgbClr val="3D3D4E"/>
+                </a:solidFill>
+                <a:latin typeface="+mj-lt"/>
+              </a:rPr>
+              <a:t>Observation</a:t>
+            </a:r>
+          </a:p>
+          <a:p>
+            <a:pPr algn="l"/>
+            <a:r>
+              <a:rPr lang="en-US" sz="1000" i="1" dirty="0">
+                <a:solidFill>
+                  <a:srgbClr val="3D3D4E"/>
+                </a:solidFill>
+                <a:latin typeface="+mj-lt"/>
+              </a:rPr>
+              <a:t>Let’s understand the overlapping sub structure using example,</a:t>
+            </a:r>
+          </a:p>
+          <a:p>
+            <a:r>
+              <a:rPr lang="en-US" sz="1000" dirty="0"/>
+              <a:t>Input: coins[] = {9, 6, 5, 1}, N = 13</a:t>
+            </a:r>
+          </a:p>
+          <a:p>
+            <a:pPr algn="l"/>
+            <a:r>
+              <a:rPr lang="en-US" sz="1000" i="1" dirty="0" err="1">
+                <a:solidFill>
+                  <a:srgbClr val="3D3D4E"/>
+                </a:solidFill>
+                <a:latin typeface="+mj-lt"/>
+              </a:rPr>
+              <a:t>Fn</a:t>
+            </a:r>
+            <a:r>
+              <a:rPr lang="en-US" sz="1000" i="1" dirty="0">
+                <a:solidFill>
+                  <a:srgbClr val="3D3D4E"/>
+                </a:solidFill>
+                <a:latin typeface="+mj-lt"/>
+              </a:rPr>
+              <a:t>(13) =  several possibilities </a:t>
+            </a:r>
+          </a:p>
+          <a:p>
+            <a:pPr marL="171450" indent="-171450" algn="l">
+              <a:buFontTx/>
+              <a:buChar char="-"/>
+            </a:pPr>
+            <a:r>
+              <a:rPr lang="en-US" sz="1000" i="1" dirty="0">
+                <a:solidFill>
+                  <a:srgbClr val="3D3D4E"/>
+                </a:solidFill>
+                <a:latin typeface="+mj-lt"/>
+              </a:rPr>
+              <a:t>Picked 9 + </a:t>
+            </a:r>
+            <a:r>
+              <a:rPr lang="en-US" sz="1000" i="1" dirty="0" err="1">
+                <a:solidFill>
+                  <a:srgbClr val="3D3D4E"/>
+                </a:solidFill>
+                <a:latin typeface="+mj-lt"/>
+              </a:rPr>
+              <a:t>Fn</a:t>
+            </a:r>
+            <a:r>
+              <a:rPr lang="en-US" sz="1000" i="1" dirty="0">
+                <a:solidFill>
+                  <a:srgbClr val="3D3D4E"/>
+                </a:solidFill>
+                <a:latin typeface="+mj-lt"/>
+              </a:rPr>
+              <a:t>(4)</a:t>
+            </a:r>
+          </a:p>
+          <a:p>
+            <a:pPr marL="171450" indent="-171450" algn="l">
+              <a:buFontTx/>
+              <a:buChar char="-"/>
+            </a:pPr>
+            <a:r>
+              <a:rPr lang="en-US" sz="1000" i="1" dirty="0">
+                <a:solidFill>
+                  <a:srgbClr val="3D3D4E"/>
+                </a:solidFill>
+                <a:latin typeface="+mj-lt"/>
+              </a:rPr>
+              <a:t>Picked 6 , picked 1 thrice + </a:t>
+            </a:r>
+            <a:r>
+              <a:rPr lang="en-US" sz="1000" i="1" dirty="0" err="1">
+                <a:solidFill>
+                  <a:srgbClr val="3D3D4E"/>
+                </a:solidFill>
+                <a:latin typeface="+mj-lt"/>
+              </a:rPr>
+              <a:t>Fn</a:t>
+            </a:r>
+            <a:r>
+              <a:rPr lang="en-US" sz="1000" i="1" dirty="0">
+                <a:solidFill>
+                  <a:srgbClr val="3D3D4E"/>
+                </a:solidFill>
+                <a:latin typeface="+mj-lt"/>
+              </a:rPr>
+              <a:t>(4)</a:t>
+            </a:r>
+          </a:p>
+          <a:p>
+            <a:pPr marL="171450" indent="-171450" algn="l">
+              <a:buFontTx/>
+              <a:buChar char="-"/>
+            </a:pPr>
+            <a:r>
+              <a:rPr lang="en-US" sz="1000" i="1" dirty="0">
+                <a:solidFill>
+                  <a:srgbClr val="3D3D4E"/>
+                </a:solidFill>
+                <a:latin typeface="+mj-lt"/>
+              </a:rPr>
+              <a:t>Picked 5, picked 1 , 4 times + </a:t>
+            </a:r>
+            <a:r>
+              <a:rPr lang="en-US" sz="1000" i="1" dirty="0" err="1">
+                <a:solidFill>
+                  <a:srgbClr val="3D3D4E"/>
+                </a:solidFill>
+                <a:latin typeface="+mj-lt"/>
+              </a:rPr>
+              <a:t>Fn</a:t>
+            </a:r>
+            <a:r>
+              <a:rPr lang="en-US" sz="1000" i="1" dirty="0">
+                <a:solidFill>
+                  <a:srgbClr val="3D3D4E"/>
+                </a:solidFill>
+                <a:latin typeface="+mj-lt"/>
+              </a:rPr>
+              <a:t>(4)</a:t>
+            </a:r>
+          </a:p>
+          <a:p>
+            <a:pPr marL="171450" indent="-171450" algn="l">
+              <a:buFontTx/>
+              <a:buChar char="-"/>
+            </a:pPr>
+            <a:endParaRPr lang="en-US" sz="1000" i="1" dirty="0">
+              <a:solidFill>
+                <a:srgbClr val="3D3D4E"/>
+              </a:solidFill>
+              <a:latin typeface="+mj-lt"/>
+            </a:endParaRPr>
+          </a:p>
+          <a:p>
+            <a:pPr algn="l"/>
+            <a:r>
+              <a:rPr lang="en-US" sz="1000" i="1" dirty="0">
+                <a:solidFill>
+                  <a:srgbClr val="3D3D4E"/>
+                </a:solidFill>
+                <a:latin typeface="+mj-lt"/>
+              </a:rPr>
+              <a:t>So, you will see that many times we end-up at </a:t>
+            </a:r>
+            <a:r>
+              <a:rPr lang="en-US" sz="1000" i="1" dirty="0" err="1">
+                <a:solidFill>
+                  <a:srgbClr val="3D3D4E"/>
+                </a:solidFill>
+                <a:latin typeface="+mj-lt"/>
+              </a:rPr>
+              <a:t>Fn</a:t>
+            </a:r>
+            <a:r>
+              <a:rPr lang="en-US" sz="1000" i="1" dirty="0">
+                <a:solidFill>
+                  <a:srgbClr val="3D3D4E"/>
+                </a:solidFill>
+                <a:latin typeface="+mj-lt"/>
+              </a:rPr>
+              <a:t>(4)  and this is the same we are trying to observe that </a:t>
+            </a:r>
+          </a:p>
+          <a:p>
+            <a:pPr algn="l"/>
+            <a:r>
+              <a:rPr lang="en-US" sz="1000" i="1" dirty="0">
+                <a:solidFill>
+                  <a:srgbClr val="3D3D4E"/>
+                </a:solidFill>
+                <a:latin typeface="+mj-lt"/>
+              </a:rPr>
+              <a:t>does here overlapping sub structure exist or not? And Yes, it exist so it the candidate of memorization. </a:t>
+            </a:r>
+          </a:p>
+          <a:p>
+            <a:pPr algn="l"/>
+            <a:endParaRPr lang="en-US" sz="1000" i="1" dirty="0">
+              <a:solidFill>
+                <a:srgbClr val="3D3D4E"/>
+              </a:solidFill>
+              <a:latin typeface="+mj-lt"/>
+            </a:endParaRPr>
+          </a:p>
+          <a:p>
+            <a:pPr algn="l"/>
+            <a:endParaRPr lang="en-US" sz="1000" i="1" dirty="0">
+              <a:solidFill>
+                <a:srgbClr val="3D3D4E"/>
+              </a:solidFill>
+              <a:latin typeface="+mj-lt"/>
+            </a:endParaRPr>
+          </a:p>
+          <a:p>
+            <a:pPr algn="l"/>
+            <a:endParaRPr lang="en-US" sz="1000" i="1" dirty="0">
+              <a:solidFill>
+                <a:srgbClr val="3D3D4E"/>
+              </a:solidFill>
+              <a:latin typeface="+mj-lt"/>
+            </a:endParaRPr>
+          </a:p>
+          <a:p>
+            <a:pPr algn="l"/>
+            <a:endParaRPr lang="en-US" sz="1000" i="1" dirty="0">
+              <a:solidFill>
+                <a:srgbClr val="3D3D4E"/>
+              </a:solidFill>
+              <a:latin typeface="+mj-lt"/>
+            </a:endParaRPr>
+          </a:p>
+          <a:p>
+            <a:pPr algn="l"/>
+            <a:endParaRPr lang="en-US" sz="1000" i="1" dirty="0">
+              <a:solidFill>
+                <a:srgbClr val="3D3D4E"/>
+              </a:solidFill>
+              <a:latin typeface="+mj-lt"/>
+            </a:endParaRPr>
+          </a:p>
+          <a:p>
+            <a:pPr algn="l"/>
+            <a:endParaRPr lang="en-US" sz="1000" i="1" dirty="0">
+              <a:solidFill>
+                <a:srgbClr val="3D3D4E"/>
+              </a:solidFill>
+              <a:latin typeface="+mj-lt"/>
+            </a:endParaRPr>
+          </a:p>
+          <a:p>
+            <a:pPr algn="l"/>
+            <a:endParaRPr lang="en-US" sz="1000" i="1" dirty="0">
+              <a:solidFill>
+                <a:srgbClr val="3D3D4E"/>
+              </a:solidFill>
+              <a:latin typeface="+mj-lt"/>
+            </a:endParaRPr>
+          </a:p>
+          <a:p>
+            <a:pPr algn="l"/>
+            <a:endParaRPr lang="en-US" sz="1000" i="1" dirty="0">
+              <a:solidFill>
+                <a:srgbClr val="3D3D4E"/>
+              </a:solidFill>
+              <a:latin typeface="+mj-lt"/>
+            </a:endParaRPr>
+          </a:p>
+          <a:p>
+            <a:pPr algn="l"/>
+            <a:endParaRPr lang="en-US" sz="1000" i="1" dirty="0">
+              <a:solidFill>
+                <a:srgbClr val="3D3D4E"/>
+              </a:solidFill>
+              <a:latin typeface="+mj-lt"/>
+            </a:endParaRPr>
+          </a:p>
+          <a:p>
+            <a:pPr algn="l"/>
+            <a:endParaRPr lang="en-US" sz="1000" i="1" dirty="0">
+              <a:solidFill>
+                <a:srgbClr val="3D3D4E"/>
+              </a:solidFill>
+              <a:effectLst/>
+              <a:latin typeface="+mj-lt"/>
+            </a:endParaRPr>
+          </a:p>
+          <a:p>
+            <a:pPr algn="l"/>
+            <a:endParaRPr lang="en-US" sz="1000" i="1" dirty="0">
+              <a:solidFill>
+                <a:srgbClr val="3D3D4E"/>
+              </a:solidFill>
+              <a:latin typeface="+mj-lt"/>
+            </a:endParaRPr>
+          </a:p>
+          <a:p>
+            <a:pPr algn="l"/>
+            <a:endParaRPr lang="en-US" sz="1000" i="1" dirty="0">
+              <a:solidFill>
+                <a:srgbClr val="3D3D4E"/>
+              </a:solidFill>
+              <a:effectLst/>
+              <a:latin typeface="+mj-lt"/>
+            </a:endParaRPr>
+          </a:p>
+          <a:p>
+            <a:pPr algn="l"/>
+            <a:endParaRPr lang="en-US" sz="1000" i="1" dirty="0">
+              <a:solidFill>
+                <a:srgbClr val="3D3D4E"/>
+              </a:solidFill>
+              <a:latin typeface="+mj-lt"/>
+            </a:endParaRPr>
+          </a:p>
+          <a:p>
+            <a:pPr algn="l"/>
+            <a:endParaRPr lang="en-US" sz="1000" i="0" dirty="0">
+              <a:solidFill>
+                <a:srgbClr val="3D3D4E"/>
+              </a:solidFill>
+              <a:effectLst/>
+              <a:latin typeface="+mj-lt"/>
+            </a:endParaRPr>
+          </a:p>
+          <a:p>
+            <a:endParaRPr lang="en-IN" dirty="0"/>
+          </a:p>
+          <a:p>
+            <a:endParaRPr lang="en-IN" dirty="0"/>
+          </a:p>
+        </p:txBody>
+      </p:sp>
+      <p:sp>
+        <p:nvSpPr>
+          <p:cNvPr id="10" name="Rectangle 9">
+            <a:extLst>
+              <a:ext uri="{FF2B5EF4-FFF2-40B4-BE49-F238E27FC236}">
+                <a16:creationId xmlns:a16="http://schemas.microsoft.com/office/drawing/2014/main" id="{2062E01C-44BC-4297-8045-0035ECF21CA7}"/>
+              </a:ext>
+            </a:extLst>
+          </p:cNvPr>
+          <p:cNvSpPr/>
+          <p:nvPr/>
+        </p:nvSpPr>
+        <p:spPr>
+          <a:xfrm>
+            <a:off x="256374" y="2059536"/>
+            <a:ext cx="11596643" cy="3418318"/>
+          </a:xfrm>
+          <a:prstGeom prst="rect">
+            <a:avLst/>
+          </a:prstGeom>
+          <a:noFill/>
+          <a:ln w="9525" cap="flat" cmpd="sng" algn="ctr">
+            <a:solidFill>
+              <a:schemeClr val="accent3"/>
+            </a:solidFill>
+            <a:prstDash val="solid"/>
+            <a:round/>
+            <a:headEnd type="none" w="med" len="med"/>
+            <a:tailEnd type="none" w="med" len="med"/>
+          </a:ln>
+        </p:spPr>
+        <p:style>
+          <a:lnRef idx="0">
+            <a:scrgbClr r="0" g="0" b="0"/>
+          </a:lnRef>
+          <a:fillRef idx="0">
+            <a:scrgbClr r="0" g="0" b="0"/>
+          </a:fillRef>
+          <a:effectRef idx="0">
+            <a:scrgbClr r="0" g="0" b="0"/>
+          </a:effectRef>
+          <a:fontRef idx="minor">
+            <a:schemeClr val="accent3"/>
+          </a:fontRef>
+        </p:style>
+        <p:txBody>
+          <a:bodyPr rtlCol="0" anchor="ctr"/>
+          <a:lstStyle/>
+          <a:p>
+            <a:pPr algn="ctr"/>
+            <a:endParaRPr lang="en-IN" dirty="0"/>
+          </a:p>
+        </p:txBody>
+      </p:sp>
+      <p:sp>
+        <p:nvSpPr>
+          <p:cNvPr id="2" name="TextBox 1">
+            <a:extLst>
+              <a:ext uri="{FF2B5EF4-FFF2-40B4-BE49-F238E27FC236}">
+                <a16:creationId xmlns:a16="http://schemas.microsoft.com/office/drawing/2014/main" id="{AD96EE5B-9CF8-4E20-8E1F-0A2FD711DBAC}"/>
+              </a:ext>
+            </a:extLst>
+          </p:cNvPr>
+          <p:cNvSpPr txBox="1"/>
+          <p:nvPr/>
+        </p:nvSpPr>
+        <p:spPr>
+          <a:xfrm>
+            <a:off x="6528988" y="786213"/>
+            <a:ext cx="5264210" cy="1169551"/>
+          </a:xfrm>
+          <a:prstGeom prst="rect">
+            <a:avLst/>
+          </a:prstGeom>
+          <a:noFill/>
+        </p:spPr>
+        <p:txBody>
+          <a:bodyPr wrap="square" rtlCol="0">
+            <a:spAutoFit/>
+          </a:bodyPr>
+          <a:lstStyle/>
+          <a:p>
+            <a:r>
+              <a:rPr lang="en-US" sz="1000" dirty="0"/>
+              <a:t>Example -&gt; Input: </a:t>
+            </a:r>
+          </a:p>
+          <a:p>
+            <a:r>
+              <a:rPr lang="en-US" sz="1000" dirty="0"/>
+              <a:t>coins[] = {25, 10, 5}, N = 30</a:t>
+            </a:r>
+          </a:p>
+          <a:p>
+            <a:r>
+              <a:rPr lang="en-US" sz="1000" dirty="0"/>
+              <a:t>Output: Minimum 2 coins required</a:t>
+            </a:r>
+          </a:p>
+          <a:p>
+            <a:r>
+              <a:rPr lang="en-US" sz="1000" dirty="0"/>
+              <a:t>We can use one coin of 25 cents and one of 5 cents.</a:t>
+            </a:r>
+          </a:p>
+          <a:p>
+            <a:r>
+              <a:rPr lang="en-US" sz="1000" dirty="0"/>
+              <a:t>Input: coins[] = {9, 6, 5, 1}, N = 13</a:t>
+            </a:r>
+          </a:p>
+          <a:p>
+            <a:r>
+              <a:rPr lang="en-US" sz="1000" dirty="0"/>
+              <a:t>Output: Minimum 3 coins required</a:t>
+            </a:r>
+          </a:p>
+          <a:p>
+            <a:r>
+              <a:rPr lang="en-US" sz="1000" dirty="0"/>
+              <a:t>We can use combination of coin of 6 + 6 + 1 cents coins.</a:t>
+            </a:r>
+            <a:endParaRPr lang="en-IN" sz="1000" dirty="0"/>
+          </a:p>
+        </p:txBody>
+      </p:sp>
+      <p:sp>
+        <p:nvSpPr>
+          <p:cNvPr id="7" name="TextBox 6">
+            <a:extLst>
+              <a:ext uri="{FF2B5EF4-FFF2-40B4-BE49-F238E27FC236}">
+                <a16:creationId xmlns:a16="http://schemas.microsoft.com/office/drawing/2014/main" id="{25262EDD-6816-4B47-A360-BBF43F3C2ABB}"/>
+              </a:ext>
+            </a:extLst>
+          </p:cNvPr>
+          <p:cNvSpPr txBox="1"/>
+          <p:nvPr/>
+        </p:nvSpPr>
+        <p:spPr>
+          <a:xfrm>
+            <a:off x="34184" y="6553074"/>
+            <a:ext cx="6255521" cy="261610"/>
+          </a:xfrm>
+          <a:prstGeom prst="rect">
+            <a:avLst/>
+          </a:prstGeom>
+          <a:noFill/>
+        </p:spPr>
+        <p:txBody>
+          <a:bodyPr wrap="square" rtlCol="0">
+            <a:spAutoFit/>
+          </a:bodyPr>
+          <a:lstStyle/>
+          <a:p>
+            <a:r>
+              <a:rPr lang="en-IN" sz="1100" dirty="0">
+                <a:solidFill>
+                  <a:srgbClr val="00B0F0"/>
+                </a:solidFill>
+              </a:rPr>
+              <a:t>Code link : https://github.com/abmishra1234/4AM_Club_Coding/tree/main/11-02-2022_Project</a:t>
+            </a:r>
+          </a:p>
+        </p:txBody>
+      </p:sp>
+      <p:pic>
+        <p:nvPicPr>
+          <p:cNvPr id="8" name="Picture 7">
+            <a:extLst>
+              <a:ext uri="{FF2B5EF4-FFF2-40B4-BE49-F238E27FC236}">
+                <a16:creationId xmlns:a16="http://schemas.microsoft.com/office/drawing/2014/main" id="{26CEB05E-7B19-4B54-B576-3DC54CB5FA2A}"/>
+              </a:ext>
+            </a:extLst>
+          </p:cNvPr>
+          <p:cNvPicPr>
+            <a:picLocks noChangeAspect="1"/>
+          </p:cNvPicPr>
+          <p:nvPr/>
+        </p:nvPicPr>
+        <p:blipFill>
+          <a:blip r:embed="rId2"/>
+          <a:stretch>
+            <a:fillRect/>
+          </a:stretch>
+        </p:blipFill>
+        <p:spPr>
+          <a:xfrm>
+            <a:off x="6187156" y="2234302"/>
+            <a:ext cx="5307110" cy="3068785"/>
+          </a:xfrm>
+          <a:prstGeom prst="rect">
+            <a:avLst/>
+          </a:prstGeom>
+        </p:spPr>
+      </p:pic>
+      <p:sp>
+        <p:nvSpPr>
+          <p:cNvPr id="9" name="Rectangle 8">
+            <a:extLst>
+              <a:ext uri="{FF2B5EF4-FFF2-40B4-BE49-F238E27FC236}">
+                <a16:creationId xmlns:a16="http://schemas.microsoft.com/office/drawing/2014/main" id="{33F6F801-4B48-4121-8527-B21FABF0224F}"/>
+              </a:ext>
+            </a:extLst>
+          </p:cNvPr>
+          <p:cNvSpPr/>
+          <p:nvPr/>
+        </p:nvSpPr>
+        <p:spPr>
+          <a:xfrm>
+            <a:off x="6204247" y="2169408"/>
+            <a:ext cx="5298392" cy="3154622"/>
+          </a:xfrm>
+          <a:prstGeom prst="rect">
+            <a:avLst/>
+          </a:prstGeom>
+          <a:solidFill>
+            <a:schemeClr val="accent4">
+              <a:alpha val="50000"/>
+            </a:schemeClr>
+          </a:solidFill>
+          <a:ln>
+            <a:noFill/>
+          </a:ln>
+        </p:spPr>
+        <p:style>
+          <a:lnRef idx="0">
+            <a:scrgbClr r="0" g="0" b="0"/>
+          </a:lnRef>
+          <a:fillRef idx="0">
+            <a:scrgbClr r="0" g="0" b="0"/>
+          </a:fillRef>
+          <a:effectRef idx="0">
+            <a:scrgbClr r="0" g="0" b="0"/>
+          </a:effectRef>
+          <a:fontRef idx="minor">
+            <a:schemeClr val="lt1"/>
+          </a:fontRef>
+        </p:style>
+        <p:txBody>
+          <a:bodyPr rtlCol="0" anchor="ctr"/>
+          <a:lstStyle/>
+          <a:p>
+            <a:pPr algn="ctr"/>
+            <a:endParaRPr lang="en-IN"/>
+          </a:p>
+        </p:txBody>
+      </p:sp>
+    </p:spTree>
+    <p:extLst>
+      <p:ext uri="{BB962C8B-B14F-4D97-AF65-F5344CB8AC3E}">
+        <p14:creationId xmlns:p14="http://schemas.microsoft.com/office/powerpoint/2010/main" val="4265147828"/>
+      </p:ext>
+    </p:extLst>
+  </p:cSld>
+  <p:clrMapOvr>
+    <a:masterClrMapping/>
+  </p:clrMapOvr>
+</p:sld>
+</file>
+
+<file path=ppt/slides/slide13.xml><?xml version="1.0" encoding="utf-8"?>
+<p:sld xmlns:a="http://schemas.openxmlformats.org/drawingml/2006/main" xmlns:r="http://schemas.openxmlformats.org/officeDocument/2006/relationships" xmlns:p="http://schemas.openxmlformats.org/presentationml/2006/main">
+  <p:cSld>
+    <p:spTree>
+      <p:nvGrpSpPr>
+        <p:cNvPr id="1" name=""/>
+        <p:cNvGrpSpPr/>
+        <p:nvPr/>
+      </p:nvGrpSpPr>
+      <p:grpSpPr>
+        <a:xfrm>
+          <a:off x="0" y="0"/>
+          <a:ext cx="0" cy="0"/>
+          <a:chOff x="0" y="0"/>
+          <a:chExt cx="0" cy="0"/>
+        </a:xfrm>
+      </p:grpSpPr>
+      <p:sp>
+        <p:nvSpPr>
+          <p:cNvPr id="6" name="Rectangle 5">
+            <a:extLst>
+              <a:ext uri="{FF2B5EF4-FFF2-40B4-BE49-F238E27FC236}">
+                <a16:creationId xmlns:a16="http://schemas.microsoft.com/office/drawing/2014/main" id="{23D9A284-E705-4058-BC97-E411758071E2}"/>
+              </a:ext>
+            </a:extLst>
+          </p:cNvPr>
+          <p:cNvSpPr/>
+          <p:nvPr/>
+        </p:nvSpPr>
+        <p:spPr>
+          <a:xfrm>
+            <a:off x="0" y="0"/>
+            <a:ext cx="12192000" cy="623843"/>
+          </a:xfrm>
+          <a:prstGeom prst="rect">
+            <a:avLst/>
+          </a:prstGeom>
+        </p:spPr>
+        <p:style>
+          <a:lnRef idx="2">
+            <a:schemeClr val="accent1">
+              <a:shade val="50000"/>
+            </a:schemeClr>
+          </a:lnRef>
+          <a:fillRef idx="1">
+            <a:schemeClr val="accent1"/>
+          </a:fillRef>
+          <a:effectRef idx="0">
+            <a:schemeClr val="accent1"/>
+          </a:effectRef>
+          <a:fontRef idx="minor">
+            <a:schemeClr val="lt1"/>
+          </a:fontRef>
+        </p:style>
+        <p:txBody>
+          <a:bodyPr rtlCol="0" anchor="ctr"/>
+          <a:lstStyle/>
+          <a:p>
+            <a:pPr algn="ctr"/>
+            <a:endParaRPr lang="en-IN" b="1" i="0" dirty="0">
+              <a:effectLst/>
+              <a:latin typeface="Nunito Sans" pitchFamily="2" charset="0"/>
+            </a:endParaRPr>
+          </a:p>
+          <a:p>
+            <a:pPr algn="ctr"/>
+            <a:r>
+              <a:rPr lang="en-US" b="1" dirty="0">
+                <a:latin typeface="Nunito Sans" pitchFamily="2" charset="0"/>
+              </a:rPr>
+              <a:t>[Tabulation] Wine and maximum </a:t>
+            </a:r>
+            <a:r>
+              <a:rPr lang="en-US" b="1">
+                <a:latin typeface="Nunito Sans" pitchFamily="2" charset="0"/>
+              </a:rPr>
+              <a:t>price problem</a:t>
+            </a:r>
+            <a:endParaRPr lang="en-IN" b="1" dirty="0">
+              <a:latin typeface="Nunito Sans" pitchFamily="2" charset="0"/>
+            </a:endParaRPr>
+          </a:p>
+          <a:p>
+            <a:pPr algn="ctr"/>
+            <a:endParaRPr lang="en-IN" dirty="0"/>
+          </a:p>
+        </p:txBody>
+      </p:sp>
+      <p:sp>
+        <p:nvSpPr>
+          <p:cNvPr id="4" name="TextBox 3">
+            <a:extLst>
+              <a:ext uri="{FF2B5EF4-FFF2-40B4-BE49-F238E27FC236}">
+                <a16:creationId xmlns:a16="http://schemas.microsoft.com/office/drawing/2014/main" id="{8C4A9A07-01AB-45E4-8166-1253A1210F5A}"/>
+              </a:ext>
+            </a:extLst>
+          </p:cNvPr>
+          <p:cNvSpPr txBox="1"/>
+          <p:nvPr/>
+        </p:nvSpPr>
+        <p:spPr>
+          <a:xfrm>
+            <a:off x="256374" y="837487"/>
+            <a:ext cx="6033331" cy="6647974"/>
+          </a:xfrm>
+          <a:prstGeom prst="rect">
+            <a:avLst/>
+          </a:prstGeom>
+          <a:noFill/>
+        </p:spPr>
+        <p:txBody>
+          <a:bodyPr wrap="square" rtlCol="0">
+            <a:spAutoFit/>
+          </a:bodyPr>
+          <a:lstStyle/>
+          <a:p>
+            <a:pPr algn="l"/>
+            <a:r>
+              <a:rPr lang="en-US" sz="1000" i="0" dirty="0">
+                <a:effectLst/>
+                <a:latin typeface="+mj-lt"/>
+              </a:rPr>
+              <a:t>Problem statement</a:t>
+            </a:r>
+          </a:p>
+          <a:p>
+            <a:pPr algn="l"/>
+            <a:r>
+              <a:rPr lang="en-US" sz="1000" i="0" dirty="0">
+                <a:solidFill>
+                  <a:srgbClr val="3D3D4E"/>
+                </a:solidFill>
+                <a:effectLst/>
+                <a:latin typeface="+mj-lt"/>
+              </a:rPr>
+              <a:t>If we have an infinite supply of each of C = { C_{1}</a:t>
+            </a:r>
+            <a:r>
+              <a:rPr lang="en-US" sz="1000" i="1" dirty="0">
+                <a:solidFill>
+                  <a:srgbClr val="3D3D4E"/>
+                </a:solidFill>
+                <a:effectLst/>
+                <a:latin typeface="+mj-lt"/>
+              </a:rPr>
+              <a:t>C</a:t>
+            </a:r>
+            <a:r>
+              <a:rPr lang="en-US" sz="1000" i="0" dirty="0">
+                <a:solidFill>
+                  <a:srgbClr val="3D3D4E"/>
+                </a:solidFill>
+                <a:effectLst/>
+                <a:latin typeface="+mj-lt"/>
+              </a:rPr>
+              <a:t>​1​​, C_{2}</a:t>
+            </a:r>
+            <a:r>
+              <a:rPr lang="en-US" sz="1000" i="1" dirty="0">
+                <a:solidFill>
+                  <a:srgbClr val="3D3D4E"/>
+                </a:solidFill>
+                <a:effectLst/>
+                <a:latin typeface="+mj-lt"/>
+              </a:rPr>
+              <a:t>C</a:t>
+            </a:r>
+            <a:r>
+              <a:rPr lang="en-US" sz="1000" i="0" dirty="0">
+                <a:solidFill>
+                  <a:srgbClr val="3D3D4E"/>
+                </a:solidFill>
+                <a:effectLst/>
+                <a:latin typeface="+mj-lt"/>
+              </a:rPr>
+              <a:t>​2​​, … , C_{M}</a:t>
+            </a:r>
+            <a:r>
+              <a:rPr lang="en-US" sz="1000" i="1" dirty="0">
+                <a:solidFill>
+                  <a:srgbClr val="3D3D4E"/>
+                </a:solidFill>
+                <a:effectLst/>
+                <a:latin typeface="+mj-lt"/>
+              </a:rPr>
+              <a:t>C</a:t>
+            </a:r>
+            <a:r>
+              <a:rPr lang="en-US" sz="1000" i="0" dirty="0">
+                <a:solidFill>
+                  <a:srgbClr val="3D3D4E"/>
+                </a:solidFill>
+                <a:effectLst/>
+                <a:latin typeface="+mj-lt"/>
+              </a:rPr>
+              <a:t>​</a:t>
+            </a:r>
+            <a:r>
+              <a:rPr lang="en-US" sz="1000" i="1" dirty="0">
+                <a:solidFill>
+                  <a:srgbClr val="3D3D4E"/>
+                </a:solidFill>
+                <a:effectLst/>
+                <a:latin typeface="+mj-lt"/>
+              </a:rPr>
+              <a:t>M</a:t>
+            </a:r>
+            <a:r>
+              <a:rPr lang="en-US" sz="1000" i="0" dirty="0">
+                <a:solidFill>
+                  <a:srgbClr val="3D3D4E"/>
+                </a:solidFill>
+                <a:effectLst/>
+                <a:latin typeface="+mj-lt"/>
+              </a:rPr>
+              <a:t>​​} valued coins and we want to make a change for a given value (N) of cents, what </a:t>
+            </a:r>
+            <a:r>
+              <a:rPr lang="en-US" sz="1000" b="1" i="0" dirty="0">
+                <a:solidFill>
+                  <a:srgbClr val="3D3D4E"/>
+                </a:solidFill>
+                <a:effectLst/>
+                <a:highlight>
+                  <a:srgbClr val="FFFF00"/>
+                </a:highlight>
+                <a:latin typeface="+mj-lt"/>
+              </a:rPr>
+              <a:t>is the minimum number of coins required </a:t>
+            </a:r>
+            <a:r>
+              <a:rPr lang="en-US" sz="1000" i="0" dirty="0">
+                <a:solidFill>
+                  <a:srgbClr val="3D3D4E"/>
+                </a:solidFill>
+                <a:effectLst/>
+                <a:latin typeface="+mj-lt"/>
+              </a:rPr>
+              <a:t>to make the change?</a:t>
+            </a:r>
+          </a:p>
+          <a:p>
+            <a:pPr algn="l"/>
+            <a:endParaRPr lang="en-US" sz="1000" i="1" dirty="0">
+              <a:solidFill>
+                <a:srgbClr val="3D3D4E"/>
+              </a:solidFill>
+              <a:latin typeface="+mj-lt"/>
+            </a:endParaRPr>
+          </a:p>
+          <a:p>
+            <a:pPr algn="l"/>
+            <a:endParaRPr lang="en-US" sz="1000" i="1" dirty="0">
+              <a:solidFill>
+                <a:srgbClr val="3D3D4E"/>
+              </a:solidFill>
+              <a:latin typeface="+mj-lt"/>
+            </a:endParaRPr>
+          </a:p>
+          <a:p>
+            <a:pPr algn="l"/>
+            <a:endParaRPr lang="en-US" sz="1000" i="1" dirty="0">
+              <a:solidFill>
+                <a:srgbClr val="3D3D4E"/>
+              </a:solidFill>
+              <a:latin typeface="+mj-lt"/>
+            </a:endParaRPr>
+          </a:p>
+          <a:p>
+            <a:pPr algn="l"/>
+            <a:endParaRPr lang="en-US" sz="1000" i="1" dirty="0">
+              <a:solidFill>
+                <a:srgbClr val="3D3D4E"/>
+              </a:solidFill>
+              <a:latin typeface="+mj-lt"/>
+            </a:endParaRPr>
+          </a:p>
+          <a:p>
+            <a:pPr algn="l"/>
+            <a:endParaRPr lang="en-US" sz="1000" i="1" dirty="0">
+              <a:solidFill>
+                <a:srgbClr val="3D3D4E"/>
+              </a:solidFill>
+              <a:latin typeface="+mj-lt"/>
+            </a:endParaRPr>
+          </a:p>
+          <a:p>
+            <a:pPr algn="l"/>
+            <a:r>
+              <a:rPr lang="en-US" sz="1000" b="1" i="1" dirty="0">
+                <a:solidFill>
+                  <a:srgbClr val="FF0000"/>
+                </a:solidFill>
+                <a:latin typeface="+mj-lt"/>
+              </a:rPr>
+              <a:t>Approach 03: </a:t>
+            </a:r>
+          </a:p>
+          <a:p>
+            <a:pPr algn="l"/>
+            <a:r>
+              <a:rPr lang="en-US" sz="1000" b="1" i="1" dirty="0">
+                <a:solidFill>
+                  <a:srgbClr val="FF0000"/>
+                </a:solidFill>
+                <a:latin typeface="+mj-lt"/>
+              </a:rPr>
+              <a:t>Bottom-up Approach(Tabulation)</a:t>
+            </a:r>
+            <a:r>
+              <a:rPr lang="en-US" sz="1000" i="1" dirty="0">
+                <a:solidFill>
+                  <a:srgbClr val="3D3D4E"/>
+                </a:solidFill>
+                <a:latin typeface="+mj-lt"/>
+              </a:rPr>
+              <a:t>, </a:t>
+            </a:r>
+          </a:p>
+          <a:p>
+            <a:pPr algn="l"/>
+            <a:endParaRPr lang="en-US" sz="1000" i="1" dirty="0">
+              <a:solidFill>
+                <a:srgbClr val="3D3D4E"/>
+              </a:solidFill>
+              <a:latin typeface="+mj-lt"/>
+            </a:endParaRPr>
+          </a:p>
+          <a:p>
+            <a:pPr algn="l"/>
+            <a:endParaRPr lang="en-US" sz="1000" i="1" dirty="0">
+              <a:solidFill>
+                <a:srgbClr val="3D3D4E"/>
+              </a:solidFill>
+              <a:latin typeface="+mj-lt"/>
+            </a:endParaRPr>
+          </a:p>
+          <a:p>
+            <a:pPr algn="l"/>
+            <a:r>
+              <a:rPr lang="en-US" sz="1000" i="1" dirty="0">
+                <a:solidFill>
+                  <a:srgbClr val="3D3D4E"/>
+                </a:solidFill>
+                <a:latin typeface="+mj-lt"/>
+              </a:rPr>
+              <a:t>So, here our approach will be to improve the problem we observed in brute-force approach</a:t>
+            </a:r>
+          </a:p>
+          <a:p>
+            <a:pPr algn="l"/>
+            <a:r>
+              <a:rPr lang="en-US" sz="1000" i="1" dirty="0">
+                <a:solidFill>
+                  <a:srgbClr val="3D3D4E"/>
+                </a:solidFill>
+                <a:latin typeface="+mj-lt"/>
+              </a:rPr>
+              <a:t>Yes, so let’s put down your observation on the overlapping substructure or duplicate recursion calls.</a:t>
+            </a:r>
+          </a:p>
+          <a:p>
+            <a:pPr algn="l"/>
+            <a:endParaRPr lang="en-US" sz="1000" i="1" dirty="0">
+              <a:solidFill>
+                <a:srgbClr val="3D3D4E"/>
+              </a:solidFill>
+              <a:latin typeface="+mj-lt"/>
+            </a:endParaRPr>
+          </a:p>
+          <a:p>
+            <a:pPr algn="l"/>
+            <a:r>
+              <a:rPr lang="en-US" sz="1000" i="1" dirty="0">
+                <a:solidFill>
+                  <a:srgbClr val="3D3D4E"/>
+                </a:solidFill>
+                <a:latin typeface="+mj-lt"/>
+              </a:rPr>
+              <a:t>Observation</a:t>
+            </a:r>
+          </a:p>
+          <a:p>
+            <a:pPr algn="l"/>
+            <a:r>
+              <a:rPr lang="en-US" sz="1000" i="1" dirty="0">
+                <a:solidFill>
+                  <a:srgbClr val="3D3D4E"/>
+                </a:solidFill>
+                <a:latin typeface="+mj-lt"/>
+              </a:rPr>
+              <a:t>Let’s understand the overlapping sub structure using example,</a:t>
+            </a:r>
+          </a:p>
+          <a:p>
+            <a:r>
+              <a:rPr lang="en-US" sz="1000" dirty="0"/>
+              <a:t>Input: coins[] = {9, 6, 5, 1}, N = 13</a:t>
+            </a:r>
+          </a:p>
+          <a:p>
+            <a:pPr algn="l"/>
+            <a:r>
+              <a:rPr lang="en-US" sz="1000" i="1" dirty="0" err="1">
+                <a:solidFill>
+                  <a:srgbClr val="3D3D4E"/>
+                </a:solidFill>
+                <a:latin typeface="+mj-lt"/>
+              </a:rPr>
+              <a:t>Fn</a:t>
+            </a:r>
+            <a:r>
+              <a:rPr lang="en-US" sz="1000" i="1" dirty="0">
+                <a:solidFill>
+                  <a:srgbClr val="3D3D4E"/>
+                </a:solidFill>
+                <a:latin typeface="+mj-lt"/>
+              </a:rPr>
+              <a:t>(13) =  several possibilities </a:t>
+            </a:r>
+          </a:p>
+          <a:p>
+            <a:pPr marL="171450" indent="-171450" algn="l">
+              <a:buFontTx/>
+              <a:buChar char="-"/>
+            </a:pPr>
+            <a:r>
+              <a:rPr lang="en-US" sz="1000" i="1" dirty="0">
+                <a:solidFill>
+                  <a:srgbClr val="3D3D4E"/>
+                </a:solidFill>
+                <a:latin typeface="+mj-lt"/>
+              </a:rPr>
+              <a:t>Picked 9 + </a:t>
+            </a:r>
+            <a:r>
+              <a:rPr lang="en-US" sz="1000" i="1" dirty="0" err="1">
+                <a:solidFill>
+                  <a:srgbClr val="3D3D4E"/>
+                </a:solidFill>
+                <a:latin typeface="+mj-lt"/>
+              </a:rPr>
+              <a:t>Fn</a:t>
+            </a:r>
+            <a:r>
+              <a:rPr lang="en-US" sz="1000" i="1" dirty="0">
+                <a:solidFill>
+                  <a:srgbClr val="3D3D4E"/>
+                </a:solidFill>
+                <a:latin typeface="+mj-lt"/>
+              </a:rPr>
+              <a:t>(4)</a:t>
+            </a:r>
+          </a:p>
+          <a:p>
+            <a:pPr marL="171450" indent="-171450" algn="l">
+              <a:buFontTx/>
+              <a:buChar char="-"/>
+            </a:pPr>
+            <a:r>
+              <a:rPr lang="en-US" sz="1000" i="1" dirty="0">
+                <a:solidFill>
+                  <a:srgbClr val="3D3D4E"/>
+                </a:solidFill>
+                <a:latin typeface="+mj-lt"/>
+              </a:rPr>
+              <a:t>Picked 6 , picked 1 thrice + </a:t>
+            </a:r>
+            <a:r>
+              <a:rPr lang="en-US" sz="1000" i="1" dirty="0" err="1">
+                <a:solidFill>
+                  <a:srgbClr val="3D3D4E"/>
+                </a:solidFill>
+                <a:latin typeface="+mj-lt"/>
+              </a:rPr>
+              <a:t>Fn</a:t>
+            </a:r>
+            <a:r>
+              <a:rPr lang="en-US" sz="1000" i="1" dirty="0">
+                <a:solidFill>
+                  <a:srgbClr val="3D3D4E"/>
+                </a:solidFill>
+                <a:latin typeface="+mj-lt"/>
+              </a:rPr>
+              <a:t>(4)</a:t>
+            </a:r>
+          </a:p>
+          <a:p>
+            <a:pPr marL="171450" indent="-171450" algn="l">
+              <a:buFontTx/>
+              <a:buChar char="-"/>
+            </a:pPr>
+            <a:r>
+              <a:rPr lang="en-US" sz="1000" i="1" dirty="0">
+                <a:solidFill>
+                  <a:srgbClr val="3D3D4E"/>
+                </a:solidFill>
+                <a:latin typeface="+mj-lt"/>
+              </a:rPr>
+              <a:t>Picked 5, picked 1 , 4 times + </a:t>
+            </a:r>
+            <a:r>
+              <a:rPr lang="en-US" sz="1000" i="1" dirty="0" err="1">
+                <a:solidFill>
+                  <a:srgbClr val="3D3D4E"/>
+                </a:solidFill>
+                <a:latin typeface="+mj-lt"/>
+              </a:rPr>
+              <a:t>Fn</a:t>
+            </a:r>
+            <a:r>
+              <a:rPr lang="en-US" sz="1000" i="1" dirty="0">
+                <a:solidFill>
+                  <a:srgbClr val="3D3D4E"/>
+                </a:solidFill>
+                <a:latin typeface="+mj-lt"/>
+              </a:rPr>
+              <a:t>(4)</a:t>
+            </a:r>
+          </a:p>
+          <a:p>
+            <a:pPr marL="171450" indent="-171450" algn="l">
+              <a:buFontTx/>
+              <a:buChar char="-"/>
+            </a:pPr>
+            <a:endParaRPr lang="en-US" sz="1000" i="1" dirty="0">
+              <a:solidFill>
+                <a:srgbClr val="3D3D4E"/>
+              </a:solidFill>
+              <a:latin typeface="+mj-lt"/>
+            </a:endParaRPr>
+          </a:p>
+          <a:p>
+            <a:pPr algn="l"/>
+            <a:r>
+              <a:rPr lang="en-US" sz="1000" i="1" dirty="0">
+                <a:solidFill>
+                  <a:srgbClr val="3D3D4E"/>
+                </a:solidFill>
+                <a:latin typeface="+mj-lt"/>
+              </a:rPr>
+              <a:t>So, you will see that many times we end-up at </a:t>
+            </a:r>
+            <a:r>
+              <a:rPr lang="en-US" sz="1000" i="1" dirty="0" err="1">
+                <a:solidFill>
+                  <a:srgbClr val="3D3D4E"/>
+                </a:solidFill>
+                <a:latin typeface="+mj-lt"/>
+              </a:rPr>
+              <a:t>Fn</a:t>
+            </a:r>
+            <a:r>
+              <a:rPr lang="en-US" sz="1000" i="1" dirty="0">
+                <a:solidFill>
+                  <a:srgbClr val="3D3D4E"/>
+                </a:solidFill>
+                <a:latin typeface="+mj-lt"/>
+              </a:rPr>
+              <a:t>(4)  and this is the same we are trying to observe that </a:t>
+            </a:r>
+          </a:p>
+          <a:p>
+            <a:pPr algn="l"/>
+            <a:r>
+              <a:rPr lang="en-US" sz="1000" i="1" dirty="0">
+                <a:solidFill>
+                  <a:srgbClr val="3D3D4E"/>
+                </a:solidFill>
+                <a:latin typeface="+mj-lt"/>
+              </a:rPr>
+              <a:t>does here overlapping sub structure exist or not? And Yes, it exist so it the candidate of memorization. </a:t>
+            </a:r>
+          </a:p>
+          <a:p>
+            <a:pPr algn="l"/>
+            <a:endParaRPr lang="en-US" sz="1000" i="1" dirty="0">
+              <a:solidFill>
+                <a:srgbClr val="3D3D4E"/>
+              </a:solidFill>
+              <a:latin typeface="+mj-lt"/>
+            </a:endParaRPr>
+          </a:p>
+          <a:p>
+            <a:pPr algn="l"/>
+            <a:endParaRPr lang="en-US" sz="1000" i="1" dirty="0">
+              <a:solidFill>
+                <a:srgbClr val="3D3D4E"/>
+              </a:solidFill>
+              <a:latin typeface="+mj-lt"/>
+            </a:endParaRPr>
+          </a:p>
+          <a:p>
+            <a:pPr algn="l"/>
+            <a:endParaRPr lang="en-US" sz="1000" i="1" dirty="0">
+              <a:solidFill>
+                <a:srgbClr val="3D3D4E"/>
+              </a:solidFill>
+              <a:latin typeface="+mj-lt"/>
+            </a:endParaRPr>
+          </a:p>
+          <a:p>
+            <a:pPr algn="l"/>
+            <a:endParaRPr lang="en-US" sz="1000" i="1" dirty="0">
+              <a:solidFill>
+                <a:srgbClr val="3D3D4E"/>
+              </a:solidFill>
+              <a:latin typeface="+mj-lt"/>
+            </a:endParaRPr>
+          </a:p>
+          <a:p>
+            <a:pPr algn="l"/>
+            <a:endParaRPr lang="en-US" sz="1000" i="1" dirty="0">
+              <a:solidFill>
+                <a:srgbClr val="3D3D4E"/>
+              </a:solidFill>
+              <a:latin typeface="+mj-lt"/>
+            </a:endParaRPr>
+          </a:p>
+          <a:p>
+            <a:pPr algn="l"/>
+            <a:endParaRPr lang="en-US" sz="1000" i="1" dirty="0">
+              <a:solidFill>
+                <a:srgbClr val="3D3D4E"/>
+              </a:solidFill>
+              <a:latin typeface="+mj-lt"/>
+            </a:endParaRPr>
+          </a:p>
+          <a:p>
+            <a:pPr algn="l"/>
+            <a:endParaRPr lang="en-US" sz="1000" i="1" dirty="0">
+              <a:solidFill>
+                <a:srgbClr val="3D3D4E"/>
+              </a:solidFill>
+              <a:latin typeface="+mj-lt"/>
+            </a:endParaRPr>
+          </a:p>
+          <a:p>
+            <a:pPr algn="l"/>
+            <a:endParaRPr lang="en-US" sz="1000" i="1" dirty="0">
+              <a:solidFill>
+                <a:srgbClr val="3D3D4E"/>
+              </a:solidFill>
+              <a:latin typeface="+mj-lt"/>
+            </a:endParaRPr>
+          </a:p>
+          <a:p>
+            <a:pPr algn="l"/>
+            <a:endParaRPr lang="en-US" sz="1000" i="1" dirty="0">
+              <a:solidFill>
+                <a:srgbClr val="3D3D4E"/>
+              </a:solidFill>
+              <a:latin typeface="+mj-lt"/>
+            </a:endParaRPr>
+          </a:p>
+          <a:p>
+            <a:pPr algn="l"/>
+            <a:endParaRPr lang="en-US" sz="1000" i="1" dirty="0">
+              <a:solidFill>
+                <a:srgbClr val="3D3D4E"/>
+              </a:solidFill>
+              <a:effectLst/>
+              <a:latin typeface="+mj-lt"/>
+            </a:endParaRPr>
+          </a:p>
+          <a:p>
+            <a:pPr algn="l"/>
+            <a:endParaRPr lang="en-US" sz="1000" i="1" dirty="0">
+              <a:solidFill>
+                <a:srgbClr val="3D3D4E"/>
+              </a:solidFill>
+              <a:latin typeface="+mj-lt"/>
+            </a:endParaRPr>
+          </a:p>
+          <a:p>
+            <a:pPr algn="l"/>
+            <a:endParaRPr lang="en-US" sz="1000" i="1" dirty="0">
+              <a:solidFill>
+                <a:srgbClr val="3D3D4E"/>
+              </a:solidFill>
+              <a:effectLst/>
+              <a:latin typeface="+mj-lt"/>
+            </a:endParaRPr>
+          </a:p>
+          <a:p>
+            <a:pPr algn="l"/>
+            <a:endParaRPr lang="en-US" sz="1000" i="1" dirty="0">
+              <a:solidFill>
+                <a:srgbClr val="3D3D4E"/>
+              </a:solidFill>
+              <a:latin typeface="+mj-lt"/>
+            </a:endParaRPr>
+          </a:p>
+          <a:p>
+            <a:pPr algn="l"/>
+            <a:endParaRPr lang="en-US" sz="1000" i="0" dirty="0">
+              <a:solidFill>
+                <a:srgbClr val="3D3D4E"/>
+              </a:solidFill>
+              <a:effectLst/>
+              <a:latin typeface="+mj-lt"/>
+            </a:endParaRPr>
+          </a:p>
+          <a:p>
+            <a:endParaRPr lang="en-IN" dirty="0"/>
+          </a:p>
+          <a:p>
+            <a:endParaRPr lang="en-IN" dirty="0"/>
+          </a:p>
+        </p:txBody>
+      </p:sp>
+      <p:sp>
+        <p:nvSpPr>
+          <p:cNvPr id="10" name="Rectangle 9">
+            <a:extLst>
+              <a:ext uri="{FF2B5EF4-FFF2-40B4-BE49-F238E27FC236}">
+                <a16:creationId xmlns:a16="http://schemas.microsoft.com/office/drawing/2014/main" id="{2062E01C-44BC-4297-8045-0035ECF21CA7}"/>
+              </a:ext>
+            </a:extLst>
+          </p:cNvPr>
+          <p:cNvSpPr/>
+          <p:nvPr/>
+        </p:nvSpPr>
+        <p:spPr>
+          <a:xfrm>
+            <a:off x="256375" y="2059536"/>
+            <a:ext cx="11468456" cy="3418318"/>
+          </a:xfrm>
+          <a:prstGeom prst="rect">
+            <a:avLst/>
+          </a:prstGeom>
+          <a:noFill/>
+          <a:ln w="9525" cap="flat" cmpd="sng" algn="ctr">
+            <a:solidFill>
+              <a:schemeClr val="accent3"/>
+            </a:solidFill>
+            <a:prstDash val="solid"/>
+            <a:round/>
+            <a:headEnd type="none" w="med" len="med"/>
+            <a:tailEnd type="none" w="med" len="med"/>
+          </a:ln>
+        </p:spPr>
+        <p:style>
+          <a:lnRef idx="0">
+            <a:scrgbClr r="0" g="0" b="0"/>
+          </a:lnRef>
+          <a:fillRef idx="0">
+            <a:scrgbClr r="0" g="0" b="0"/>
+          </a:fillRef>
+          <a:effectRef idx="0">
+            <a:scrgbClr r="0" g="0" b="0"/>
+          </a:effectRef>
+          <a:fontRef idx="minor">
+            <a:schemeClr val="accent3"/>
+          </a:fontRef>
+        </p:style>
+        <p:txBody>
+          <a:bodyPr rtlCol="0" anchor="ctr"/>
+          <a:lstStyle/>
+          <a:p>
+            <a:pPr algn="ctr"/>
+            <a:endParaRPr lang="en-IN" dirty="0"/>
+          </a:p>
+        </p:txBody>
+      </p:sp>
+      <p:sp>
+        <p:nvSpPr>
+          <p:cNvPr id="2" name="TextBox 1">
+            <a:extLst>
+              <a:ext uri="{FF2B5EF4-FFF2-40B4-BE49-F238E27FC236}">
+                <a16:creationId xmlns:a16="http://schemas.microsoft.com/office/drawing/2014/main" id="{AD96EE5B-9CF8-4E20-8E1F-0A2FD711DBAC}"/>
+              </a:ext>
+            </a:extLst>
+          </p:cNvPr>
+          <p:cNvSpPr txBox="1"/>
+          <p:nvPr/>
+        </p:nvSpPr>
+        <p:spPr>
+          <a:xfrm>
+            <a:off x="6528988" y="786213"/>
+            <a:ext cx="5264210" cy="1169551"/>
+          </a:xfrm>
+          <a:prstGeom prst="rect">
+            <a:avLst/>
+          </a:prstGeom>
+          <a:noFill/>
+        </p:spPr>
+        <p:txBody>
+          <a:bodyPr wrap="square" rtlCol="0">
+            <a:spAutoFit/>
+          </a:bodyPr>
+          <a:lstStyle/>
+          <a:p>
+            <a:r>
+              <a:rPr lang="en-US" sz="1000" dirty="0"/>
+              <a:t>Example -&gt; Input: </a:t>
+            </a:r>
+          </a:p>
+          <a:p>
+            <a:r>
+              <a:rPr lang="en-US" sz="1000" dirty="0"/>
+              <a:t>coins[] = {25, 10, 5}, N = 30</a:t>
+            </a:r>
+          </a:p>
+          <a:p>
+            <a:r>
+              <a:rPr lang="en-US" sz="1000" dirty="0"/>
+              <a:t>Output: Minimum 2 coins required</a:t>
+            </a:r>
+          </a:p>
+          <a:p>
+            <a:r>
+              <a:rPr lang="en-US" sz="1000" dirty="0"/>
+              <a:t>We can use one coin of 25 cents and one of 5 cents.</a:t>
+            </a:r>
+          </a:p>
+          <a:p>
+            <a:r>
+              <a:rPr lang="en-US" sz="1000" dirty="0"/>
+              <a:t>Input: coins[] = {9, 6, 5, 1}, N = 13</a:t>
+            </a:r>
+          </a:p>
+          <a:p>
+            <a:r>
+              <a:rPr lang="en-US" sz="1000" dirty="0"/>
+              <a:t>Output: Minimum 3 coins required</a:t>
+            </a:r>
+          </a:p>
+          <a:p>
+            <a:r>
+              <a:rPr lang="en-US" sz="1000" dirty="0"/>
+              <a:t>We can use combination of coin of 6 + 6 + 1 cents coins.</a:t>
+            </a:r>
+            <a:endParaRPr lang="en-IN" sz="1000" dirty="0"/>
+          </a:p>
+        </p:txBody>
+      </p:sp>
+      <p:sp>
+        <p:nvSpPr>
+          <p:cNvPr id="7" name="TextBox 6">
+            <a:extLst>
+              <a:ext uri="{FF2B5EF4-FFF2-40B4-BE49-F238E27FC236}">
+                <a16:creationId xmlns:a16="http://schemas.microsoft.com/office/drawing/2014/main" id="{25262EDD-6816-4B47-A360-BBF43F3C2ABB}"/>
+              </a:ext>
+            </a:extLst>
+          </p:cNvPr>
+          <p:cNvSpPr txBox="1"/>
+          <p:nvPr/>
+        </p:nvSpPr>
+        <p:spPr>
+          <a:xfrm>
+            <a:off x="34184" y="6553074"/>
+            <a:ext cx="6255521" cy="261610"/>
+          </a:xfrm>
+          <a:prstGeom prst="rect">
+            <a:avLst/>
+          </a:prstGeom>
+          <a:noFill/>
+        </p:spPr>
+        <p:txBody>
+          <a:bodyPr wrap="square" rtlCol="0">
+            <a:spAutoFit/>
+          </a:bodyPr>
+          <a:lstStyle/>
+          <a:p>
+            <a:r>
+              <a:rPr lang="en-IN" sz="1100" dirty="0">
+                <a:solidFill>
+                  <a:srgbClr val="00B0F0"/>
+                </a:solidFill>
+              </a:rPr>
+              <a:t>Code link : https://github.com/abmishra1234/4AM_Club_Coding/tree/main/11-02-2022_Project</a:t>
+            </a:r>
+          </a:p>
+        </p:txBody>
+      </p:sp>
+      <p:pic>
+        <p:nvPicPr>
+          <p:cNvPr id="5" name="Picture 4">
+            <a:extLst>
+              <a:ext uri="{FF2B5EF4-FFF2-40B4-BE49-F238E27FC236}">
+                <a16:creationId xmlns:a16="http://schemas.microsoft.com/office/drawing/2014/main" id="{1B112772-47F2-49B8-B6FF-C6A473B87C00}"/>
+              </a:ext>
+            </a:extLst>
+          </p:cNvPr>
+          <p:cNvPicPr>
+            <a:picLocks noChangeAspect="1"/>
+          </p:cNvPicPr>
+          <p:nvPr/>
+        </p:nvPicPr>
+        <p:blipFill>
+          <a:blip r:embed="rId2"/>
+          <a:stretch>
+            <a:fillRect/>
+          </a:stretch>
+        </p:blipFill>
+        <p:spPr>
+          <a:xfrm>
+            <a:off x="6674266" y="2215069"/>
+            <a:ext cx="4049736" cy="3107252"/>
+          </a:xfrm>
+          <a:prstGeom prst="rect">
+            <a:avLst/>
+          </a:prstGeom>
+        </p:spPr>
+      </p:pic>
+      <p:sp>
+        <p:nvSpPr>
+          <p:cNvPr id="11" name="Rectangle 10">
+            <a:extLst>
+              <a:ext uri="{FF2B5EF4-FFF2-40B4-BE49-F238E27FC236}">
+                <a16:creationId xmlns:a16="http://schemas.microsoft.com/office/drawing/2014/main" id="{AE62ABE1-6466-4044-B175-AA093B6385B0}"/>
+              </a:ext>
+            </a:extLst>
+          </p:cNvPr>
+          <p:cNvSpPr/>
+          <p:nvPr/>
+        </p:nvSpPr>
+        <p:spPr>
+          <a:xfrm>
+            <a:off x="6648628" y="2118134"/>
+            <a:ext cx="4101981" cy="3214442"/>
+          </a:xfrm>
+          <a:prstGeom prst="rect">
+            <a:avLst/>
+          </a:prstGeom>
+          <a:solidFill>
+            <a:schemeClr val="accent5">
+              <a:alpha val="50000"/>
+            </a:schemeClr>
+          </a:solidFill>
+          <a:ln>
+            <a:noFill/>
+          </a:ln>
+        </p:spPr>
+        <p:style>
+          <a:lnRef idx="0">
+            <a:scrgbClr r="0" g="0" b="0"/>
+          </a:lnRef>
+          <a:fillRef idx="0">
+            <a:scrgbClr r="0" g="0" b="0"/>
+          </a:fillRef>
+          <a:effectRef idx="0">
+            <a:scrgbClr r="0" g="0" b="0"/>
+          </a:effectRef>
+          <a:fontRef idx="minor">
+            <a:schemeClr val="lt1"/>
+          </a:fontRef>
+        </p:style>
+        <p:txBody>
+          <a:bodyPr rtlCol="0" anchor="ctr"/>
+          <a:lstStyle/>
+          <a:p>
+            <a:pPr algn="ctr"/>
+            <a:endParaRPr lang="en-IN" dirty="0"/>
+          </a:p>
+        </p:txBody>
+      </p:sp>
+    </p:spTree>
+    <p:extLst>
+      <p:ext uri="{BB962C8B-B14F-4D97-AF65-F5344CB8AC3E}">
+        <p14:creationId xmlns:p14="http://schemas.microsoft.com/office/powerpoint/2010/main" val="2802030580"/>
+      </p:ext>
+    </p:extLst>
+  </p:cSld>
+  <p:clrMapOvr>
+    <a:masterClrMapping/>
+  </p:clrMapOvr>
+</p:sld>
+</file>
+
 <file path=ppt/slides/slide2.xml><?xml version="1.0" encoding="utf-8"?>
 <p:sld xmlns:a="http://schemas.openxmlformats.org/drawingml/2006/main" xmlns:r="http://schemas.openxmlformats.org/officeDocument/2006/relationships" xmlns:p="http://schemas.openxmlformats.org/presentationml/2006/main">
   <p:cSld>

</xml_diff>

<commit_message>
Intermediate progressing file for reference
</commit_message>
<xml_diff>
--- a/Dynamic_Programming/Dynamic Programming.pptx
+++ b/Dynamic_Programming/Dynamic Programming.pptx
@@ -5327,7 +5327,7 @@
         <p:spPr>
           <a:xfrm>
             <a:off x="256374" y="837487"/>
-            <a:ext cx="6033331" cy="4493538"/>
+            <a:ext cx="6033331" cy="2954655"/>
           </a:xfrm>
           <a:prstGeom prst="rect">
             <a:avLst/>
@@ -5540,143 +5540,8 @@
                 </a:solidFill>
                 <a:latin typeface="+mj-lt"/>
               </a:rPr>
-              <a:t>, and the approach is like try to produce all different possible combination and than select the minimum number of coin required. </a:t>
-            </a:r>
-          </a:p>
-          <a:p>
-            <a:pPr algn="l"/>
-            <a:endParaRPr lang="en-US" sz="1000" i="1" dirty="0">
-              <a:solidFill>
-                <a:srgbClr val="3D3D4E"/>
-              </a:solidFill>
-              <a:latin typeface="+mj-lt"/>
-            </a:endParaRPr>
-          </a:p>
-          <a:p>
-            <a:pPr algn="l"/>
-            <a:r>
-              <a:rPr lang="en-US" sz="1000" i="1" dirty="0">
-                <a:solidFill>
-                  <a:srgbClr val="3D3D4E"/>
-                </a:solidFill>
-                <a:latin typeface="+mj-lt"/>
-              </a:rPr>
-              <a:t>So, two point to be considered here</a:t>
-            </a:r>
-          </a:p>
-          <a:p>
-            <a:pPr marL="228600" indent="-228600" algn="l">
-              <a:buAutoNum type="arabicPeriod"/>
-            </a:pPr>
-            <a:r>
-              <a:rPr lang="en-US" sz="1000" i="1" dirty="0">
-                <a:solidFill>
-                  <a:srgbClr val="3D3D4E"/>
-                </a:solidFill>
-                <a:latin typeface="+mj-lt"/>
-              </a:rPr>
-              <a:t>Coin list is given in problem</a:t>
-            </a:r>
-          </a:p>
-          <a:p>
-            <a:pPr marL="228600" indent="-228600" algn="l">
-              <a:buAutoNum type="arabicPeriod"/>
-            </a:pPr>
-            <a:r>
-              <a:rPr lang="en-US" sz="1000" i="1" dirty="0">
-                <a:solidFill>
-                  <a:srgbClr val="3D3D4E"/>
-                </a:solidFill>
-                <a:latin typeface="+mj-lt"/>
-              </a:rPr>
-              <a:t>Infinite supply of coin is given</a:t>
-            </a:r>
-          </a:p>
-          <a:p>
-            <a:pPr marL="228600" indent="-228600" algn="l">
-              <a:buAutoNum type="arabicPeriod"/>
-            </a:pPr>
-            <a:endParaRPr lang="en-US" sz="1000" i="1" dirty="0">
-              <a:solidFill>
-                <a:srgbClr val="3D3D4E"/>
-              </a:solidFill>
-              <a:latin typeface="+mj-lt"/>
-            </a:endParaRPr>
-          </a:p>
-          <a:p>
-            <a:pPr algn="l"/>
-            <a:endParaRPr lang="en-US" sz="1000" i="1" dirty="0">
-              <a:solidFill>
-                <a:srgbClr val="3D3D4E"/>
-              </a:solidFill>
-              <a:latin typeface="+mj-lt"/>
-            </a:endParaRPr>
-          </a:p>
-          <a:p>
-            <a:pPr algn="l"/>
-            <a:r>
-              <a:rPr lang="en-US" sz="1000" i="1" dirty="0">
-                <a:solidFill>
-                  <a:srgbClr val="3D3D4E"/>
-                </a:solidFill>
-                <a:latin typeface="+mj-lt"/>
-              </a:rPr>
-              <a:t>Time Complexity : </a:t>
-            </a:r>
-            <a:r>
-              <a:rPr lang="en-US" sz="1000" i="1" dirty="0">
-                <a:solidFill>
-                  <a:srgbClr val="3D3D4E"/>
-                </a:solidFill>
-                <a:highlight>
-                  <a:srgbClr val="FFFF00"/>
-                </a:highlight>
-                <a:latin typeface="+mj-lt"/>
-              </a:rPr>
-              <a:t>(m )^p </a:t>
-            </a:r>
-            <a:r>
-              <a:rPr lang="en-US" sz="1000" i="1" dirty="0">
-                <a:solidFill>
-                  <a:srgbClr val="3D3D4E"/>
-                </a:solidFill>
-                <a:latin typeface="+mj-lt"/>
-              </a:rPr>
-              <a:t>// here m is the type of coins in list and p is the depth of your recursion tree</a:t>
-            </a:r>
-          </a:p>
-          <a:p>
-            <a:pPr algn="l"/>
-            <a:r>
-              <a:rPr lang="en-US" sz="1000" i="1" dirty="0">
-                <a:solidFill>
-                  <a:srgbClr val="3D3D4E"/>
-                </a:solidFill>
-                <a:latin typeface="+mj-lt"/>
-              </a:rPr>
-              <a:t>Space Complexity :  We haven’t used any additional memory </a:t>
-            </a:r>
-            <a:r>
-              <a:rPr lang="en-US" sz="1000" i="1" dirty="0">
-                <a:solidFill>
-                  <a:srgbClr val="3D3D4E"/>
-                </a:solidFill>
-                <a:highlight>
-                  <a:srgbClr val="FFFF00"/>
-                </a:highlight>
-                <a:latin typeface="+mj-lt"/>
-              </a:rPr>
-              <a:t>so O(1) which is const time</a:t>
-            </a:r>
-          </a:p>
-          <a:p>
-            <a:pPr algn="l"/>
-            <a:endParaRPr lang="en-US" sz="1000" i="1" dirty="0">
-              <a:solidFill>
-                <a:srgbClr val="3D3D4E"/>
-              </a:solidFill>
-              <a:latin typeface="+mj-lt"/>
-            </a:endParaRPr>
+              <a:t>, </a:t>
+            </a:r>
           </a:p>
           <a:p>
             <a:pPr algn="l"/>
@@ -5860,36 +5725,6 @@
           </a:p>
         </p:txBody>
       </p:sp>
-      <p:pic>
-        <p:nvPicPr>
-          <p:cNvPr id="5" name="Picture 4">
-            <a:extLst>
-              <a:ext uri="{FF2B5EF4-FFF2-40B4-BE49-F238E27FC236}">
-                <a16:creationId xmlns:a16="http://schemas.microsoft.com/office/drawing/2014/main" id="{563C29BA-1198-4F17-A3B8-67FD9501CFC5}"/>
-              </a:ext>
-            </a:extLst>
-          </p:cNvPr>
-          <p:cNvPicPr>
-            <a:picLocks noChangeAspect="1"/>
-          </p:cNvPicPr>
-          <p:nvPr/>
-        </p:nvPicPr>
-        <p:blipFill>
-          <a:blip r:embed="rId2"/>
-          <a:stretch>
-            <a:fillRect/>
-          </a:stretch>
-        </p:blipFill>
-        <p:spPr>
-          <a:xfrm>
-            <a:off x="6375249" y="2200389"/>
-            <a:ext cx="5112622" cy="3130636"/>
-          </a:xfrm>
-          <a:prstGeom prst="rect">
-            <a:avLst/>
-          </a:prstGeom>
-        </p:spPr>
-      </p:pic>
       <p:sp>
         <p:nvSpPr>
           <p:cNvPr id="7" name="TextBox 6">
@@ -5929,58 +5764,36 @@
           </a:p>
         </p:txBody>
       </p:sp>
-      <p:sp>
-        <p:nvSpPr>
-          <p:cNvPr id="9" name="Rectangle 8">
-            <a:extLst>
-              <a:ext uri="{FF2B5EF4-FFF2-40B4-BE49-F238E27FC236}">
-                <a16:creationId xmlns:a16="http://schemas.microsoft.com/office/drawing/2014/main" id="{54482AD2-B815-40AF-BA78-50BE890FC7F9}"/>
-              </a:ext>
-            </a:extLst>
-          </p:cNvPr>
-          <p:cNvSpPr/>
+      <p:pic>
+        <p:nvPicPr>
+          <p:cNvPr id="8" name="Picture 7">
+            <a:extLst>
+              <a:ext uri="{FF2B5EF4-FFF2-40B4-BE49-F238E27FC236}">
+                <a16:creationId xmlns:a16="http://schemas.microsoft.com/office/drawing/2014/main" id="{ACFE9B4A-9C34-4A23-A01D-23B0C1A22EC8}"/>
+              </a:ext>
+            </a:extLst>
+          </p:cNvPr>
+          <p:cNvPicPr>
+            <a:picLocks noChangeAspect="1"/>
+          </p:cNvPicPr>
           <p:nvPr/>
-        </p:nvSpPr>
+        </p:nvPicPr>
+        <p:blipFill>
+          <a:blip r:embed="rId2"/>
+          <a:stretch>
+            <a:fillRect/>
+          </a:stretch>
+        </p:blipFill>
         <p:spPr>
           <a:xfrm>
-            <a:off x="6375249" y="2200389"/>
-            <a:ext cx="5198166" cy="3130636"/>
+            <a:off x="6361522" y="2216667"/>
+            <a:ext cx="4833470" cy="2743583"/>
           </a:xfrm>
           <a:prstGeom prst="rect">
             <a:avLst/>
           </a:prstGeom>
-          <a:solidFill>
-            <a:schemeClr val="accent3">
-              <a:alpha val="50000"/>
-            </a:schemeClr>
-          </a:solidFill>
-          <a:ln>
-            <a:noFill/>
-          </a:ln>
         </p:spPr>
-        <p:style>
-          <a:lnRef idx="0">
-            <a:scrgbClr r="0" g="0" b="0"/>
-          </a:lnRef>
-          <a:fillRef idx="0">
-            <a:scrgbClr r="0" g="0" b="0"/>
-          </a:fillRef>
-          <a:effectRef idx="0">
-            <a:scrgbClr r="0" g="0" b="0"/>
-          </a:effectRef>
-          <a:fontRef idx="minor">
-            <a:schemeClr val="lt1"/>
-          </a:fontRef>
-        </p:style>
-        <p:txBody>
-          <a:bodyPr rtlCol="0" anchor="ctr"/>
-          <a:lstStyle/>
-          <a:p>
-            <a:pPr algn="ctr"/>
-            <a:endParaRPr lang="en-IN"/>
-          </a:p>
-        </p:txBody>
-      </p:sp>
+      </p:pic>
     </p:spTree>
     <p:extLst>
       <p:ext uri="{BB962C8B-B14F-4D97-AF65-F5344CB8AC3E}">
@@ -6094,7 +5907,7 @@
         <p:spPr>
           <a:xfrm>
             <a:off x="256374" y="837487"/>
-            <a:ext cx="6033331" cy="6340197"/>
+            <a:ext cx="6033331" cy="4339650"/>
           </a:xfrm>
           <a:prstGeom prst="rect">
             <a:avLst/>
@@ -6312,243 +6125,6 @@
           </a:p>
           <a:p>
             <a:pPr algn="l"/>
-            <a:r>
-              <a:rPr lang="en-US" sz="1000" i="1" dirty="0">
-                <a:solidFill>
-                  <a:srgbClr val="3D3D4E"/>
-                </a:solidFill>
-                <a:latin typeface="+mj-lt"/>
-              </a:rPr>
-              <a:t>So, here our approach will be to improve the problem we observed in brute-force approach</a:t>
-            </a:r>
-          </a:p>
-          <a:p>
-            <a:pPr algn="l"/>
-            <a:r>
-              <a:rPr lang="en-US" sz="1000" i="1" dirty="0">
-                <a:solidFill>
-                  <a:srgbClr val="3D3D4E"/>
-                </a:solidFill>
-                <a:latin typeface="+mj-lt"/>
-              </a:rPr>
-              <a:t>Yes, so let’s put down your observation on the overlapping substructure or duplicate recursion calls.</a:t>
-            </a:r>
-          </a:p>
-          <a:p>
-            <a:pPr algn="l"/>
-            <a:endParaRPr lang="en-US" sz="1000" i="1" dirty="0">
-              <a:solidFill>
-                <a:srgbClr val="3D3D4E"/>
-              </a:solidFill>
-              <a:latin typeface="+mj-lt"/>
-            </a:endParaRPr>
-          </a:p>
-          <a:p>
-            <a:pPr algn="l"/>
-            <a:r>
-              <a:rPr lang="en-US" sz="1000" i="1" dirty="0">
-                <a:solidFill>
-                  <a:srgbClr val="3D3D4E"/>
-                </a:solidFill>
-                <a:latin typeface="+mj-lt"/>
-              </a:rPr>
-              <a:t>Observation</a:t>
-            </a:r>
-          </a:p>
-          <a:p>
-            <a:pPr algn="l"/>
-            <a:r>
-              <a:rPr lang="en-US" sz="1000" i="1" dirty="0">
-                <a:solidFill>
-                  <a:srgbClr val="3D3D4E"/>
-                </a:solidFill>
-                <a:latin typeface="+mj-lt"/>
-              </a:rPr>
-              <a:t>Let’s understand the overlapping sub structure using example,</a:t>
-            </a:r>
-          </a:p>
-          <a:p>
-            <a:r>
-              <a:rPr lang="en-US" sz="1000" dirty="0"/>
-              <a:t>Input: coins[] = {9, 6, 5, 1}, N = 13</a:t>
-            </a:r>
-          </a:p>
-          <a:p>
-            <a:pPr algn="l"/>
-            <a:r>
-              <a:rPr lang="en-US" sz="1000" i="1" dirty="0" err="1">
-                <a:solidFill>
-                  <a:srgbClr val="3D3D4E"/>
-                </a:solidFill>
-                <a:latin typeface="+mj-lt"/>
-              </a:rPr>
-              <a:t>Fn</a:t>
-            </a:r>
-            <a:r>
-              <a:rPr lang="en-US" sz="1000" i="1" dirty="0">
-                <a:solidFill>
-                  <a:srgbClr val="3D3D4E"/>
-                </a:solidFill>
-                <a:latin typeface="+mj-lt"/>
-              </a:rPr>
-              <a:t>(13) =  several possibilities </a:t>
-            </a:r>
-          </a:p>
-          <a:p>
-            <a:pPr marL="171450" indent="-171450" algn="l">
-              <a:buFontTx/>
-              <a:buChar char="-"/>
-            </a:pPr>
-            <a:r>
-              <a:rPr lang="en-US" sz="1000" i="1" dirty="0">
-                <a:solidFill>
-                  <a:srgbClr val="3D3D4E"/>
-                </a:solidFill>
-                <a:latin typeface="+mj-lt"/>
-              </a:rPr>
-              <a:t>Picked 9 + </a:t>
-            </a:r>
-            <a:r>
-              <a:rPr lang="en-US" sz="1000" i="1" dirty="0" err="1">
-                <a:solidFill>
-                  <a:srgbClr val="3D3D4E"/>
-                </a:solidFill>
-                <a:latin typeface="+mj-lt"/>
-              </a:rPr>
-              <a:t>Fn</a:t>
-            </a:r>
-            <a:r>
-              <a:rPr lang="en-US" sz="1000" i="1" dirty="0">
-                <a:solidFill>
-                  <a:srgbClr val="3D3D4E"/>
-                </a:solidFill>
-                <a:latin typeface="+mj-lt"/>
-              </a:rPr>
-              <a:t>(4)</a:t>
-            </a:r>
-          </a:p>
-          <a:p>
-            <a:pPr marL="171450" indent="-171450" algn="l">
-              <a:buFontTx/>
-              <a:buChar char="-"/>
-            </a:pPr>
-            <a:r>
-              <a:rPr lang="en-US" sz="1000" i="1" dirty="0">
-                <a:solidFill>
-                  <a:srgbClr val="3D3D4E"/>
-                </a:solidFill>
-                <a:latin typeface="+mj-lt"/>
-              </a:rPr>
-              <a:t>Picked 6 , picked 1 thrice + </a:t>
-            </a:r>
-            <a:r>
-              <a:rPr lang="en-US" sz="1000" i="1" dirty="0" err="1">
-                <a:solidFill>
-                  <a:srgbClr val="3D3D4E"/>
-                </a:solidFill>
-                <a:latin typeface="+mj-lt"/>
-              </a:rPr>
-              <a:t>Fn</a:t>
-            </a:r>
-            <a:r>
-              <a:rPr lang="en-US" sz="1000" i="1" dirty="0">
-                <a:solidFill>
-                  <a:srgbClr val="3D3D4E"/>
-                </a:solidFill>
-                <a:latin typeface="+mj-lt"/>
-              </a:rPr>
-              <a:t>(4)</a:t>
-            </a:r>
-          </a:p>
-          <a:p>
-            <a:pPr marL="171450" indent="-171450" algn="l">
-              <a:buFontTx/>
-              <a:buChar char="-"/>
-            </a:pPr>
-            <a:r>
-              <a:rPr lang="en-US" sz="1000" i="1" dirty="0">
-                <a:solidFill>
-                  <a:srgbClr val="3D3D4E"/>
-                </a:solidFill>
-                <a:latin typeface="+mj-lt"/>
-              </a:rPr>
-              <a:t>Picked 5, picked 1 , 4 times + </a:t>
-            </a:r>
-            <a:r>
-              <a:rPr lang="en-US" sz="1000" i="1" dirty="0" err="1">
-                <a:solidFill>
-                  <a:srgbClr val="3D3D4E"/>
-                </a:solidFill>
-                <a:latin typeface="+mj-lt"/>
-              </a:rPr>
-              <a:t>Fn</a:t>
-            </a:r>
-            <a:r>
-              <a:rPr lang="en-US" sz="1000" i="1" dirty="0">
-                <a:solidFill>
-                  <a:srgbClr val="3D3D4E"/>
-                </a:solidFill>
-                <a:latin typeface="+mj-lt"/>
-              </a:rPr>
-              <a:t>(4)</a:t>
-            </a:r>
-          </a:p>
-          <a:p>
-            <a:pPr marL="171450" indent="-171450" algn="l">
-              <a:buFontTx/>
-              <a:buChar char="-"/>
-            </a:pPr>
-            <a:endParaRPr lang="en-US" sz="1000" i="1" dirty="0">
-              <a:solidFill>
-                <a:srgbClr val="3D3D4E"/>
-              </a:solidFill>
-              <a:latin typeface="+mj-lt"/>
-            </a:endParaRPr>
-          </a:p>
-          <a:p>
-            <a:pPr algn="l"/>
-            <a:r>
-              <a:rPr lang="en-US" sz="1000" i="1" dirty="0">
-                <a:solidFill>
-                  <a:srgbClr val="3D3D4E"/>
-                </a:solidFill>
-                <a:latin typeface="+mj-lt"/>
-              </a:rPr>
-              <a:t>So, you will see that many times we end-up at </a:t>
-            </a:r>
-            <a:r>
-              <a:rPr lang="en-US" sz="1000" i="1" dirty="0" err="1">
-                <a:solidFill>
-                  <a:srgbClr val="3D3D4E"/>
-                </a:solidFill>
-                <a:latin typeface="+mj-lt"/>
-              </a:rPr>
-              <a:t>Fn</a:t>
-            </a:r>
-            <a:r>
-              <a:rPr lang="en-US" sz="1000" i="1" dirty="0">
-                <a:solidFill>
-                  <a:srgbClr val="3D3D4E"/>
-                </a:solidFill>
-                <a:latin typeface="+mj-lt"/>
-              </a:rPr>
-              <a:t>(4)  and this is the same we are trying to observe that </a:t>
-            </a:r>
-          </a:p>
-          <a:p>
-            <a:pPr algn="l"/>
-            <a:r>
-              <a:rPr lang="en-US" sz="1000" i="1" dirty="0">
-                <a:solidFill>
-                  <a:srgbClr val="3D3D4E"/>
-                </a:solidFill>
-                <a:latin typeface="+mj-lt"/>
-              </a:rPr>
-              <a:t>does here overlapping sub structure exist or not? And Yes, it exist so it the candidate of memorization. </a:t>
-            </a:r>
-          </a:p>
-          <a:p>
-            <a:pPr algn="l"/>
             <a:endParaRPr lang="en-US" sz="1000" i="1" dirty="0">
               <a:solidFill>
                 <a:srgbClr val="3D3D4E"/>
@@ -6699,7 +6275,7 @@
         <p:spPr>
           <a:xfrm>
             <a:off x="256374" y="2059536"/>
-            <a:ext cx="11596643" cy="3418318"/>
+            <a:ext cx="11596643" cy="3666146"/>
           </a:xfrm>
           <a:prstGeom prst="rect">
             <a:avLst/>
@@ -6851,10 +6427,10 @@
       </p:sp>
       <p:pic>
         <p:nvPicPr>
-          <p:cNvPr id="8" name="Picture 7">
-            <a:extLst>
-              <a:ext uri="{FF2B5EF4-FFF2-40B4-BE49-F238E27FC236}">
-                <a16:creationId xmlns:a16="http://schemas.microsoft.com/office/drawing/2014/main" id="{26CEB05E-7B19-4B54-B576-3DC54CB5FA2A}"/>
+          <p:cNvPr id="5" name="Picture 4">
+            <a:extLst>
+              <a:ext uri="{FF2B5EF4-FFF2-40B4-BE49-F238E27FC236}">
+                <a16:creationId xmlns:a16="http://schemas.microsoft.com/office/drawing/2014/main" id="{E77AC2D6-857D-4E4D-B775-3CB15985A639}"/>
               </a:ext>
             </a:extLst>
           </p:cNvPr>
@@ -6871,66 +6447,14 @@
         </p:blipFill>
         <p:spPr>
           <a:xfrm>
-            <a:off x="6187156" y="2234302"/>
-            <a:ext cx="5307110" cy="3068785"/>
+            <a:off x="5443671" y="2184635"/>
+            <a:ext cx="6166838" cy="3339040"/>
           </a:xfrm>
           <a:prstGeom prst="rect">
             <a:avLst/>
           </a:prstGeom>
         </p:spPr>
       </p:pic>
-      <p:sp>
-        <p:nvSpPr>
-          <p:cNvPr id="9" name="Rectangle 8">
-            <a:extLst>
-              <a:ext uri="{FF2B5EF4-FFF2-40B4-BE49-F238E27FC236}">
-                <a16:creationId xmlns:a16="http://schemas.microsoft.com/office/drawing/2014/main" id="{33F6F801-4B48-4121-8527-B21FABF0224F}"/>
-              </a:ext>
-            </a:extLst>
-          </p:cNvPr>
-          <p:cNvSpPr/>
-          <p:nvPr/>
-        </p:nvSpPr>
-        <p:spPr>
-          <a:xfrm>
-            <a:off x="6204247" y="2169408"/>
-            <a:ext cx="5298392" cy="3154622"/>
-          </a:xfrm>
-          <a:prstGeom prst="rect">
-            <a:avLst/>
-          </a:prstGeom>
-          <a:solidFill>
-            <a:schemeClr val="accent4">
-              <a:alpha val="50000"/>
-            </a:schemeClr>
-          </a:solidFill>
-          <a:ln>
-            <a:noFill/>
-          </a:ln>
-        </p:spPr>
-        <p:style>
-          <a:lnRef idx="0">
-            <a:scrgbClr r="0" g="0" b="0"/>
-          </a:lnRef>
-          <a:fillRef idx="0">
-            <a:scrgbClr r="0" g="0" b="0"/>
-          </a:fillRef>
-          <a:effectRef idx="0">
-            <a:scrgbClr r="0" g="0" b="0"/>
-          </a:effectRef>
-          <a:fontRef idx="minor">
-            <a:schemeClr val="lt1"/>
-          </a:fontRef>
-        </p:style>
-        <p:txBody>
-          <a:bodyPr rtlCol="0" anchor="ctr"/>
-          <a:lstStyle/>
-          <a:p>
-            <a:pPr algn="ctr"/>
-            <a:endParaRPr lang="en-IN"/>
-          </a:p>
-        </p:txBody>
-      </p:sp>
     </p:spTree>
     <p:extLst>
       <p:ext uri="{BB962C8B-B14F-4D97-AF65-F5344CB8AC3E}">
@@ -7014,13 +6538,7 @@
               <a:rPr lang="en-US" b="1" dirty="0">
                 <a:latin typeface="Nunito Sans" pitchFamily="2" charset="0"/>
               </a:rPr>
-              <a:t>[Tabulation] Wine and maximum </a:t>
-            </a:r>
-            <a:r>
-              <a:rPr lang="en-US" b="1">
-                <a:latin typeface="Nunito Sans" pitchFamily="2" charset="0"/>
-              </a:rPr>
-              <a:t>price problem</a:t>
+              <a:t>[Tabulation] Wine and maximum price problem</a:t>
             </a:r>
             <a:endParaRPr lang="en-IN" b="1" dirty="0">
               <a:latin typeface="Nunito Sans" pitchFamily="2" charset="0"/>
@@ -7047,7 +6565,7 @@
         <p:spPr>
           <a:xfrm>
             <a:off x="256374" y="837487"/>
-            <a:ext cx="6033331" cy="6647974"/>
+            <a:ext cx="6033331" cy="4647426"/>
           </a:xfrm>
           <a:prstGeom prst="rect">
             <a:avLst/>
@@ -7274,15 +6792,6 @@
           </a:p>
           <a:p>
             <a:pPr algn="l"/>
-            <a:endParaRPr lang="en-US" sz="1000" i="1" dirty="0">
-              <a:solidFill>
-                <a:srgbClr val="3D3D4E"/>
-              </a:solidFill>
-              <a:latin typeface="+mj-lt"/>
-            </a:endParaRPr>
-          </a:p>
-          <a:p>
-            <a:pPr algn="l"/>
             <a:r>
               <a:rPr lang="en-US" sz="1000" i="1" dirty="0">
                 <a:solidFill>
@@ -7290,232 +6799,7 @@
                 </a:solidFill>
                 <a:latin typeface="+mj-lt"/>
               </a:rPr>
-              <a:t>So, here our approach will be to improve the problem we observed in brute-force approach</a:t>
-            </a:r>
-          </a:p>
-          <a:p>
-            <a:pPr algn="l"/>
-            <a:r>
-              <a:rPr lang="en-US" sz="1000" i="1" dirty="0">
-                <a:solidFill>
-                  <a:srgbClr val="3D3D4E"/>
-                </a:solidFill>
-                <a:latin typeface="+mj-lt"/>
-              </a:rPr>
-              <a:t>Yes, so let’s put down your observation on the overlapping substructure or duplicate recursion calls.</a:t>
-            </a:r>
-          </a:p>
-          <a:p>
-            <a:pPr algn="l"/>
-            <a:endParaRPr lang="en-US" sz="1000" i="1" dirty="0">
-              <a:solidFill>
-                <a:srgbClr val="3D3D4E"/>
-              </a:solidFill>
-              <a:latin typeface="+mj-lt"/>
-            </a:endParaRPr>
-          </a:p>
-          <a:p>
-            <a:pPr algn="l"/>
-            <a:r>
-              <a:rPr lang="en-US" sz="1000" i="1" dirty="0">
-                <a:solidFill>
-                  <a:srgbClr val="3D3D4E"/>
-                </a:solidFill>
-                <a:latin typeface="+mj-lt"/>
-              </a:rPr>
-              <a:t>Observation</a:t>
-            </a:r>
-          </a:p>
-          <a:p>
-            <a:pPr algn="l"/>
-            <a:r>
-              <a:rPr lang="en-US" sz="1000" i="1" dirty="0">
-                <a:solidFill>
-                  <a:srgbClr val="3D3D4E"/>
-                </a:solidFill>
-                <a:latin typeface="+mj-lt"/>
-              </a:rPr>
-              <a:t>Let’s understand the overlapping sub structure using example,</a:t>
-            </a:r>
-          </a:p>
-          <a:p>
-            <a:r>
-              <a:rPr lang="en-US" sz="1000" dirty="0"/>
-              <a:t>Input: coins[] = {9, 6, 5, 1}, N = 13</a:t>
-            </a:r>
-          </a:p>
-          <a:p>
-            <a:pPr algn="l"/>
-            <a:r>
-              <a:rPr lang="en-US" sz="1000" i="1" dirty="0" err="1">
-                <a:solidFill>
-                  <a:srgbClr val="3D3D4E"/>
-                </a:solidFill>
-                <a:latin typeface="+mj-lt"/>
-              </a:rPr>
-              <a:t>Fn</a:t>
-            </a:r>
-            <a:r>
-              <a:rPr lang="en-US" sz="1000" i="1" dirty="0">
-                <a:solidFill>
-                  <a:srgbClr val="3D3D4E"/>
-                </a:solidFill>
-                <a:latin typeface="+mj-lt"/>
-              </a:rPr>
-              <a:t>(13) =  several possibilities </a:t>
-            </a:r>
-          </a:p>
-          <a:p>
-            <a:pPr marL="171450" indent="-171450" algn="l">
-              <a:buFontTx/>
-              <a:buChar char="-"/>
-            </a:pPr>
-            <a:r>
-              <a:rPr lang="en-US" sz="1000" i="1" dirty="0">
-                <a:solidFill>
-                  <a:srgbClr val="3D3D4E"/>
-                </a:solidFill>
-                <a:latin typeface="+mj-lt"/>
-              </a:rPr>
-              <a:t>Picked 9 + </a:t>
-            </a:r>
-            <a:r>
-              <a:rPr lang="en-US" sz="1000" i="1" dirty="0" err="1">
-                <a:solidFill>
-                  <a:srgbClr val="3D3D4E"/>
-                </a:solidFill>
-                <a:latin typeface="+mj-lt"/>
-              </a:rPr>
-              <a:t>Fn</a:t>
-            </a:r>
-            <a:r>
-              <a:rPr lang="en-US" sz="1000" i="1" dirty="0">
-                <a:solidFill>
-                  <a:srgbClr val="3D3D4E"/>
-                </a:solidFill>
-                <a:latin typeface="+mj-lt"/>
-              </a:rPr>
-              <a:t>(4)</a:t>
-            </a:r>
-          </a:p>
-          <a:p>
-            <a:pPr marL="171450" indent="-171450" algn="l">
-              <a:buFontTx/>
-              <a:buChar char="-"/>
-            </a:pPr>
-            <a:r>
-              <a:rPr lang="en-US" sz="1000" i="1" dirty="0">
-                <a:solidFill>
-                  <a:srgbClr val="3D3D4E"/>
-                </a:solidFill>
-                <a:latin typeface="+mj-lt"/>
-              </a:rPr>
-              <a:t>Picked 6 , picked 1 thrice + </a:t>
-            </a:r>
-            <a:r>
-              <a:rPr lang="en-US" sz="1000" i="1" dirty="0" err="1">
-                <a:solidFill>
-                  <a:srgbClr val="3D3D4E"/>
-                </a:solidFill>
-                <a:latin typeface="+mj-lt"/>
-              </a:rPr>
-              <a:t>Fn</a:t>
-            </a:r>
-            <a:r>
-              <a:rPr lang="en-US" sz="1000" i="1" dirty="0">
-                <a:solidFill>
-                  <a:srgbClr val="3D3D4E"/>
-                </a:solidFill>
-                <a:latin typeface="+mj-lt"/>
-              </a:rPr>
-              <a:t>(4)</a:t>
-            </a:r>
-          </a:p>
-          <a:p>
-            <a:pPr marL="171450" indent="-171450" algn="l">
-              <a:buFontTx/>
-              <a:buChar char="-"/>
-            </a:pPr>
-            <a:r>
-              <a:rPr lang="en-US" sz="1000" i="1" dirty="0">
-                <a:solidFill>
-                  <a:srgbClr val="3D3D4E"/>
-                </a:solidFill>
-                <a:latin typeface="+mj-lt"/>
-              </a:rPr>
-              <a:t>Picked 5, picked 1 , 4 times + </a:t>
-            </a:r>
-            <a:r>
-              <a:rPr lang="en-US" sz="1000" i="1" dirty="0" err="1">
-                <a:solidFill>
-                  <a:srgbClr val="3D3D4E"/>
-                </a:solidFill>
-                <a:latin typeface="+mj-lt"/>
-              </a:rPr>
-              <a:t>Fn</a:t>
-            </a:r>
-            <a:r>
-              <a:rPr lang="en-US" sz="1000" i="1" dirty="0">
-                <a:solidFill>
-                  <a:srgbClr val="3D3D4E"/>
-                </a:solidFill>
-                <a:latin typeface="+mj-lt"/>
-              </a:rPr>
-              <a:t>(4)</a:t>
-            </a:r>
-          </a:p>
-          <a:p>
-            <a:pPr marL="171450" indent="-171450" algn="l">
-              <a:buFontTx/>
-              <a:buChar char="-"/>
-            </a:pPr>
-            <a:endParaRPr lang="en-US" sz="1000" i="1" dirty="0">
-              <a:solidFill>
-                <a:srgbClr val="3D3D4E"/>
-              </a:solidFill>
-              <a:latin typeface="+mj-lt"/>
-            </a:endParaRPr>
-          </a:p>
-          <a:p>
-            <a:pPr algn="l"/>
-            <a:r>
-              <a:rPr lang="en-US" sz="1000" i="1" dirty="0">
-                <a:solidFill>
-                  <a:srgbClr val="3D3D4E"/>
-                </a:solidFill>
-                <a:latin typeface="+mj-lt"/>
-              </a:rPr>
-              <a:t>So, you will see that many times we end-up at </a:t>
-            </a:r>
-            <a:r>
-              <a:rPr lang="en-US" sz="1000" i="1" dirty="0" err="1">
-                <a:solidFill>
-                  <a:srgbClr val="3D3D4E"/>
-                </a:solidFill>
-                <a:latin typeface="+mj-lt"/>
-              </a:rPr>
-              <a:t>Fn</a:t>
-            </a:r>
-            <a:r>
-              <a:rPr lang="en-US" sz="1000" i="1" dirty="0">
-                <a:solidFill>
-                  <a:srgbClr val="3D3D4E"/>
-                </a:solidFill>
-                <a:latin typeface="+mj-lt"/>
-              </a:rPr>
-              <a:t>(4)  and this is the same we are trying to observe that </a:t>
-            </a:r>
-          </a:p>
-          <a:p>
-            <a:pPr algn="l"/>
-            <a:r>
-              <a:rPr lang="en-US" sz="1000" i="1" dirty="0">
-                <a:solidFill>
-                  <a:srgbClr val="3D3D4E"/>
-                </a:solidFill>
-                <a:latin typeface="+mj-lt"/>
-              </a:rPr>
-              <a:t>does here overlapping sub structure exist or not? And Yes, it exist so it the candidate of memorization. </a:t>
+              <a:t>TBD. </a:t>
             </a:r>
           </a:p>
           <a:p>
@@ -7817,88 +7101,6 @@
               </a:rPr>
               <a:t>Code link : https://github.com/abmishra1234/4AM_Club_Coding/tree/main/11-02-2022_Project</a:t>
             </a:r>
-          </a:p>
-        </p:txBody>
-      </p:sp>
-      <p:pic>
-        <p:nvPicPr>
-          <p:cNvPr id="5" name="Picture 4">
-            <a:extLst>
-              <a:ext uri="{FF2B5EF4-FFF2-40B4-BE49-F238E27FC236}">
-                <a16:creationId xmlns:a16="http://schemas.microsoft.com/office/drawing/2014/main" id="{1B112772-47F2-49B8-B6FF-C6A473B87C00}"/>
-              </a:ext>
-            </a:extLst>
-          </p:cNvPr>
-          <p:cNvPicPr>
-            <a:picLocks noChangeAspect="1"/>
-          </p:cNvPicPr>
-          <p:nvPr/>
-        </p:nvPicPr>
-        <p:blipFill>
-          <a:blip r:embed="rId2"/>
-          <a:stretch>
-            <a:fillRect/>
-          </a:stretch>
-        </p:blipFill>
-        <p:spPr>
-          <a:xfrm>
-            <a:off x="6674266" y="2215069"/>
-            <a:ext cx="4049736" cy="3107252"/>
-          </a:xfrm>
-          <a:prstGeom prst="rect">
-            <a:avLst/>
-          </a:prstGeom>
-        </p:spPr>
-      </p:pic>
-      <p:sp>
-        <p:nvSpPr>
-          <p:cNvPr id="11" name="Rectangle 10">
-            <a:extLst>
-              <a:ext uri="{FF2B5EF4-FFF2-40B4-BE49-F238E27FC236}">
-                <a16:creationId xmlns:a16="http://schemas.microsoft.com/office/drawing/2014/main" id="{AE62ABE1-6466-4044-B175-AA093B6385B0}"/>
-              </a:ext>
-            </a:extLst>
-          </p:cNvPr>
-          <p:cNvSpPr/>
-          <p:nvPr/>
-        </p:nvSpPr>
-        <p:spPr>
-          <a:xfrm>
-            <a:off x="6648628" y="2118134"/>
-            <a:ext cx="4101981" cy="3214442"/>
-          </a:xfrm>
-          <a:prstGeom prst="rect">
-            <a:avLst/>
-          </a:prstGeom>
-          <a:solidFill>
-            <a:schemeClr val="accent5">
-              <a:alpha val="50000"/>
-            </a:schemeClr>
-          </a:solidFill>
-          <a:ln>
-            <a:noFill/>
-          </a:ln>
-        </p:spPr>
-        <p:style>
-          <a:lnRef idx="0">
-            <a:scrgbClr r="0" g="0" b="0"/>
-          </a:lnRef>
-          <a:fillRef idx="0">
-            <a:scrgbClr r="0" g="0" b="0"/>
-          </a:fillRef>
-          <a:effectRef idx="0">
-            <a:scrgbClr r="0" g="0" b="0"/>
-          </a:effectRef>
-          <a:fontRef idx="minor">
-            <a:schemeClr val="lt1"/>
-          </a:fontRef>
-        </p:style>
-        <p:txBody>
-          <a:bodyPr rtlCol="0" anchor="ctr"/>
-          <a:lstStyle/>
-          <a:p>
-            <a:pPr algn="ctr"/>
-            <a:endParaRPr lang="en-IN" dirty="0"/>
           </a:p>
         </p:txBody>
       </p:sp>

</xml_diff>

<commit_message>
Recursive solution completed for length but yet to complete for subsequence
</commit_message>
<xml_diff>
--- a/Dynamic_Programming/Dynamic Programming.pptx
+++ b/Dynamic_Programming/Dynamic Programming.pptx
@@ -300,7 +300,7 @@
           <a:p>
             <a:fld id="{BDC0887E-30F6-48B0-B326-7E062E530290}" type="datetimeFigureOut">
               <a:rPr lang="en-IN" smtClean="0"/>
-              <a:t>13-02-2022</a:t>
+              <a:t>15-02-2022</a:t>
             </a:fld>
             <a:endParaRPr lang="en-IN"/>
           </a:p>
@@ -500,7 +500,7 @@
           <a:p>
             <a:fld id="{BDC0887E-30F6-48B0-B326-7E062E530290}" type="datetimeFigureOut">
               <a:rPr lang="en-IN" smtClean="0"/>
-              <a:t>13-02-2022</a:t>
+              <a:t>15-02-2022</a:t>
             </a:fld>
             <a:endParaRPr lang="en-IN"/>
           </a:p>
@@ -710,7 +710,7 @@
           <a:p>
             <a:fld id="{BDC0887E-30F6-48B0-B326-7E062E530290}" type="datetimeFigureOut">
               <a:rPr lang="en-IN" smtClean="0"/>
-              <a:t>13-02-2022</a:t>
+              <a:t>15-02-2022</a:t>
             </a:fld>
             <a:endParaRPr lang="en-IN"/>
           </a:p>
@@ -910,7 +910,7 @@
           <a:p>
             <a:fld id="{BDC0887E-30F6-48B0-B326-7E062E530290}" type="datetimeFigureOut">
               <a:rPr lang="en-IN" smtClean="0"/>
-              <a:t>13-02-2022</a:t>
+              <a:t>15-02-2022</a:t>
             </a:fld>
             <a:endParaRPr lang="en-IN"/>
           </a:p>
@@ -1186,7 +1186,7 @@
           <a:p>
             <a:fld id="{BDC0887E-30F6-48B0-B326-7E062E530290}" type="datetimeFigureOut">
               <a:rPr lang="en-IN" smtClean="0"/>
-              <a:t>13-02-2022</a:t>
+              <a:t>15-02-2022</a:t>
             </a:fld>
             <a:endParaRPr lang="en-IN"/>
           </a:p>
@@ -1454,7 +1454,7 @@
           <a:p>
             <a:fld id="{BDC0887E-30F6-48B0-B326-7E062E530290}" type="datetimeFigureOut">
               <a:rPr lang="en-IN" smtClean="0"/>
-              <a:t>13-02-2022</a:t>
+              <a:t>15-02-2022</a:t>
             </a:fld>
             <a:endParaRPr lang="en-IN"/>
           </a:p>
@@ -1869,7 +1869,7 @@
           <a:p>
             <a:fld id="{BDC0887E-30F6-48B0-B326-7E062E530290}" type="datetimeFigureOut">
               <a:rPr lang="en-IN" smtClean="0"/>
-              <a:t>13-02-2022</a:t>
+              <a:t>15-02-2022</a:t>
             </a:fld>
             <a:endParaRPr lang="en-IN"/>
           </a:p>
@@ -2011,7 +2011,7 @@
           <a:p>
             <a:fld id="{BDC0887E-30F6-48B0-B326-7E062E530290}" type="datetimeFigureOut">
               <a:rPr lang="en-IN" smtClean="0"/>
-              <a:t>13-02-2022</a:t>
+              <a:t>15-02-2022</a:t>
             </a:fld>
             <a:endParaRPr lang="en-IN"/>
           </a:p>
@@ -2124,7 +2124,7 @@
           <a:p>
             <a:fld id="{BDC0887E-30F6-48B0-B326-7E062E530290}" type="datetimeFigureOut">
               <a:rPr lang="en-IN" smtClean="0"/>
-              <a:t>13-02-2022</a:t>
+              <a:t>15-02-2022</a:t>
             </a:fld>
             <a:endParaRPr lang="en-IN"/>
           </a:p>
@@ -2437,7 +2437,7 @@
           <a:p>
             <a:fld id="{BDC0887E-30F6-48B0-B326-7E062E530290}" type="datetimeFigureOut">
               <a:rPr lang="en-IN" smtClean="0"/>
-              <a:t>13-02-2022</a:t>
+              <a:t>15-02-2022</a:t>
             </a:fld>
             <a:endParaRPr lang="en-IN"/>
           </a:p>
@@ -2726,7 +2726,7 @@
           <a:p>
             <a:fld id="{BDC0887E-30F6-48B0-B326-7E062E530290}" type="datetimeFigureOut">
               <a:rPr lang="en-IN" smtClean="0"/>
-              <a:t>13-02-2022</a:t>
+              <a:t>15-02-2022</a:t>
             </a:fld>
             <a:endParaRPr lang="en-IN"/>
           </a:p>
@@ -2969,7 +2969,7 @@
           <a:p>
             <a:fld id="{BDC0887E-30F6-48B0-B326-7E062E530290}" type="datetimeFigureOut">
               <a:rPr lang="en-IN" smtClean="0"/>
-              <a:t>13-02-2022</a:t>
+              <a:t>15-02-2022</a:t>
             </a:fld>
             <a:endParaRPr lang="en-IN"/>
           </a:p>
@@ -7220,7 +7220,7 @@
         <p:spPr>
           <a:xfrm>
             <a:off x="256374" y="837487"/>
-            <a:ext cx="6033331" cy="2646878"/>
+            <a:ext cx="6033331" cy="2185214"/>
           </a:xfrm>
           <a:prstGeom prst="rect">
             <a:avLst/>
@@ -7240,33 +7240,6 @@
               </a:rPr>
               <a:t>Problem statement</a:t>
             </a:r>
-          </a:p>
-          <a:p>
-            <a:pPr algn="l"/>
-            <a:endParaRPr lang="en-US" sz="1000" i="1" dirty="0">
-              <a:solidFill>
-                <a:srgbClr val="3D3D4E"/>
-              </a:solidFill>
-              <a:latin typeface="+mj-lt"/>
-            </a:endParaRPr>
-          </a:p>
-          <a:p>
-            <a:pPr algn="l"/>
-            <a:endParaRPr lang="en-US" sz="1000" i="1" dirty="0">
-              <a:solidFill>
-                <a:srgbClr val="3D3D4E"/>
-              </a:solidFill>
-              <a:latin typeface="+mj-lt"/>
-            </a:endParaRPr>
-          </a:p>
-          <a:p>
-            <a:pPr algn="l"/>
-            <a:endParaRPr lang="en-US" sz="1000" i="1" dirty="0">
-              <a:solidFill>
-                <a:srgbClr val="3D3D4E"/>
-              </a:solidFill>
-              <a:latin typeface="+mj-lt"/>
-            </a:endParaRPr>
           </a:p>
           <a:p>
             <a:pPr algn="l"/>

</xml_diff>